<commit_message>
Envoy changes partially made.  MAde minor changes to thge power points which probably break it.  Currently empty final writeup.
Signed-off-by: Nicolas Feltman <nfeltman@gmail.com>
</commit_message>
<xml_diff>
--- a/Presentation/Anonymity In XIA.pptx
+++ b/Presentation/Anonymity In XIA.pptx
@@ -307,7 +307,7 @@
           <a:p>
             <a:fld id="{8D90E91E-F546-DE48-8D89-C19A8E48B43A}" type="datetimeFigureOut">
               <a:rPr lang="en-US" smtClean="0"/>
-              <a:t>12/4/11</a:t>
+              <a:t>12/5/2011</a:t>
             </a:fld>
             <a:endParaRPr lang="en-US"/>
           </a:p>
@@ -477,7 +477,7 @@
           <a:p>
             <a:fld id="{8D90E91E-F546-DE48-8D89-C19A8E48B43A}" type="datetimeFigureOut">
               <a:rPr lang="en-US" smtClean="0"/>
-              <a:t>12/4/11</a:t>
+              <a:t>12/5/2011</a:t>
             </a:fld>
             <a:endParaRPr lang="en-US"/>
           </a:p>
@@ -657,7 +657,7 @@
           <a:p>
             <a:fld id="{8D90E91E-F546-DE48-8D89-C19A8E48B43A}" type="datetimeFigureOut">
               <a:rPr lang="en-US" smtClean="0"/>
-              <a:t>12/4/11</a:t>
+              <a:t>12/5/2011</a:t>
             </a:fld>
             <a:endParaRPr lang="en-US"/>
           </a:p>
@@ -865,7 +865,7 @@
           <a:p>
             <a:fld id="{8D90E91E-F546-DE48-8D89-C19A8E48B43A}" type="datetimeFigureOut">
               <a:rPr lang="en-US" smtClean="0"/>
-              <a:t>12/4/11</a:t>
+              <a:t>12/5/2011</a:t>
             </a:fld>
             <a:endParaRPr lang="en-US"/>
           </a:p>
@@ -1111,7 +1111,7 @@
           <a:p>
             <a:fld id="{8D90E91E-F546-DE48-8D89-C19A8E48B43A}" type="datetimeFigureOut">
               <a:rPr lang="en-US" smtClean="0"/>
-              <a:t>12/4/11</a:t>
+              <a:t>12/5/2011</a:t>
             </a:fld>
             <a:endParaRPr lang="en-US"/>
           </a:p>
@@ -1399,7 +1399,7 @@
           <a:p>
             <a:fld id="{8D90E91E-F546-DE48-8D89-C19A8E48B43A}" type="datetimeFigureOut">
               <a:rPr lang="en-US" smtClean="0"/>
-              <a:t>12/4/11</a:t>
+              <a:t>12/5/2011</a:t>
             </a:fld>
             <a:endParaRPr lang="en-US"/>
           </a:p>
@@ -1821,7 +1821,7 @@
           <a:p>
             <a:fld id="{8D90E91E-F546-DE48-8D89-C19A8E48B43A}" type="datetimeFigureOut">
               <a:rPr lang="en-US" smtClean="0"/>
-              <a:t>12/4/11</a:t>
+              <a:t>12/5/2011</a:t>
             </a:fld>
             <a:endParaRPr lang="en-US"/>
           </a:p>
@@ -1946,7 +1946,7 @@
           <a:p>
             <a:fld id="{8D90E91E-F546-DE48-8D89-C19A8E48B43A}" type="datetimeFigureOut">
               <a:rPr lang="en-US" smtClean="0"/>
-              <a:t>12/4/11</a:t>
+              <a:t>12/5/2011</a:t>
             </a:fld>
             <a:endParaRPr lang="en-US"/>
           </a:p>
@@ -2041,7 +2041,7 @@
           <a:p>
             <a:fld id="{8D90E91E-F546-DE48-8D89-C19A8E48B43A}" type="datetimeFigureOut">
               <a:rPr lang="en-US" smtClean="0"/>
-              <a:t>12/4/11</a:t>
+              <a:t>12/5/2011</a:t>
             </a:fld>
             <a:endParaRPr lang="en-US"/>
           </a:p>
@@ -2318,7 +2318,7 @@
           <a:p>
             <a:fld id="{8D90E91E-F546-DE48-8D89-C19A8E48B43A}" type="datetimeFigureOut">
               <a:rPr lang="en-US" smtClean="0"/>
-              <a:t>12/4/11</a:t>
+              <a:t>12/5/2011</a:t>
             </a:fld>
             <a:endParaRPr lang="en-US"/>
           </a:p>
@@ -2571,7 +2571,7 @@
           <a:p>
             <a:fld id="{8D90E91E-F546-DE48-8D89-C19A8E48B43A}" type="datetimeFigureOut">
               <a:rPr lang="en-US" smtClean="0"/>
-              <a:t>12/4/11</a:t>
+              <a:t>12/5/2011</a:t>
             </a:fld>
             <a:endParaRPr lang="en-US"/>
           </a:p>
@@ -2784,7 +2784,7 @@
           <a:p>
             <a:fld id="{8D90E91E-F546-DE48-8D89-C19A8E48B43A}" type="datetimeFigureOut">
               <a:rPr lang="en-US" smtClean="0"/>
-              <a:t>12/4/11</a:t>
+              <a:t>12/5/2011</a:t>
             </a:fld>
             <a:endParaRPr lang="en-US"/>
           </a:p>
@@ -3293,7 +3293,7 @@
   <p:timing>
     <p:tnLst>
       <p:par>
-        <p:cTn xmlns:p14="http://schemas.microsoft.com/office/powerpoint/2010/main" id="1" dur="indefinite" restart="never" nodeType="tmRoot"/>
+        <p:cTn id="1" dur="indefinite" restart="never" nodeType="tmRoot"/>
       </p:par>
     </p:tnLst>
   </p:timing>
@@ -3576,7 +3576,7 @@
   <p:timing>
     <p:tnLst>
       <p:par>
-        <p:cTn xmlns:p14="http://schemas.microsoft.com/office/powerpoint/2010/main" id="1" dur="indefinite" restart="never" nodeType="tmRoot"/>
+        <p:cTn id="1" dur="indefinite" restart="never" nodeType="tmRoot"/>
       </p:par>
     </p:tnLst>
   </p:timing>
@@ -3767,7 +3767,7 @@
               <a:tailEnd/>
             </a:ln>
             <a:extLst>
-              <a:ext uri="{909E8E84-426E-40dd-AFC4-6F175D3DCCD1}">
+              <a:ext uri="{909E8E84-426E-40DD-AFC4-6F175D3DCCD1}">
                 <a14:hiddenFill xmlns:a14="http://schemas.microsoft.com/office/drawing/2010/main">
                   <a:solidFill>
                     <a:srgbClr val="FFFFFF"/>
@@ -3814,7 +3814,7 @@
               <a:tailEnd/>
             </a:ln>
             <a:extLst>
-              <a:ext uri="{909E8E84-426E-40dd-AFC4-6F175D3DCCD1}">
+              <a:ext uri="{909E8E84-426E-40DD-AFC4-6F175D3DCCD1}">
                 <a14:hiddenFill xmlns:a14="http://schemas.microsoft.com/office/drawing/2010/main">
                   <a:solidFill>
                     <a:srgbClr val="FFFFFF"/>
@@ -3861,7 +3861,7 @@
               <a:tailEnd/>
             </a:ln>
             <a:extLst>
-              <a:ext uri="{909E8E84-426E-40dd-AFC4-6F175D3DCCD1}">
+              <a:ext uri="{909E8E84-426E-40DD-AFC4-6F175D3DCCD1}">
                 <a14:hiddenFill xmlns:a14="http://schemas.microsoft.com/office/drawing/2010/main">
                   <a:solidFill>
                     <a:srgbClr val="FFFFFF"/>
@@ -3911,7 +3911,7 @@
               <a:tailEnd type="arrow" w="med" len="med"/>
             </a:ln>
             <a:extLst>
-              <a:ext uri="{909E8E84-426E-40dd-AFC4-6F175D3DCCD1}">
+              <a:ext uri="{909E8E84-426E-40DD-AFC4-6F175D3DCCD1}">
                 <a14:hiddenFill xmlns:a14="http://schemas.microsoft.com/office/drawing/2010/main">
                   <a:noFill/>
                 </a14:hiddenFill>
@@ -3948,7 +3948,7 @@
               <a:tailEnd type="arrow" w="med" len="med"/>
             </a:ln>
             <a:extLst>
-              <a:ext uri="{909E8E84-426E-40dd-AFC4-6F175D3DCCD1}">
+              <a:ext uri="{909E8E84-426E-40DD-AFC4-6F175D3DCCD1}">
                 <a14:hiddenFill xmlns:a14="http://schemas.microsoft.com/office/drawing/2010/main">
                   <a:noFill/>
                 </a14:hiddenFill>
@@ -3984,7 +3984,7 @@
               <a:tailEnd type="arrow" w="med" len="med"/>
             </a:ln>
             <a:extLst>
-              <a:ext uri="{909E8E84-426E-40dd-AFC4-6F175D3DCCD1}">
+              <a:ext uri="{909E8E84-426E-40DD-AFC4-6F175D3DCCD1}">
                 <a14:hiddenFill xmlns:a14="http://schemas.microsoft.com/office/drawing/2010/main">
                   <a:noFill/>
                 </a14:hiddenFill>
@@ -4020,7 +4020,7 @@
               <a:tailEnd type="arrow" w="med" len="med"/>
             </a:ln>
             <a:extLst>
-              <a:ext uri="{909E8E84-426E-40dd-AFC4-6F175D3DCCD1}">
+              <a:ext uri="{909E8E84-426E-40DD-AFC4-6F175D3DCCD1}">
                 <a14:hiddenFill xmlns:a14="http://schemas.microsoft.com/office/drawing/2010/main">
                   <a:noFill/>
                 </a14:hiddenFill>
@@ -4058,7 +4058,7 @@
               <a:tailEnd type="arrow" w="med" len="med"/>
             </a:ln>
             <a:extLst>
-              <a:ext uri="{909E8E84-426E-40dd-AFC4-6F175D3DCCD1}">
+              <a:ext uri="{909E8E84-426E-40DD-AFC4-6F175D3DCCD1}">
                 <a14:hiddenFill xmlns:a14="http://schemas.microsoft.com/office/drawing/2010/main">
                   <a:noFill/>
                 </a14:hiddenFill>
@@ -4080,7 +4080,7 @@
   <p:timing>
     <p:tnLst>
       <p:par>
-        <p:cTn xmlns:p14="http://schemas.microsoft.com/office/powerpoint/2010/main" id="1" dur="indefinite" restart="never" nodeType="tmRoot"/>
+        <p:cTn id="1" dur="indefinite" restart="never" nodeType="tmRoot"/>
       </p:par>
     </p:tnLst>
   </p:timing>
@@ -4819,14 +4819,7 @@
                 <a:latin typeface="Myriad Pro"/>
                 <a:cs typeface="Myriad Pro"/>
               </a:rPr>
-              <a:t>SRC: </a:t>
-            </a:r>
-            <a:r>
-              <a:rPr lang="en-US" sz="1400" dirty="0" smtClean="0">
-                <a:latin typeface="Myriad Pro"/>
-                <a:cs typeface="Myriad Pro"/>
-              </a:rPr>
-              <a:t>89.22.22.11</a:t>
+              <a:t>SRC: 89.22.22.11</a:t>
             </a:r>
             <a:endParaRPr lang="en-US" sz="1400" dirty="0">
               <a:latin typeface="Myriad Pro"/>
@@ -4979,14 +4972,7 @@
                 <a:latin typeface="Myriad Pro"/>
                 <a:cs typeface="Myriad Pro"/>
               </a:rPr>
-              <a:t>SRC: </a:t>
-            </a:r>
-            <a:r>
-              <a:rPr lang="en-US" sz="1400" dirty="0" smtClean="0">
-                <a:latin typeface="Myriad Pro"/>
-                <a:cs typeface="Myriad Pro"/>
-              </a:rPr>
-              <a:t>187.14.2.1</a:t>
+              <a:t>SRC: 187.14.2.1</a:t>
             </a:r>
             <a:endParaRPr lang="en-US" sz="1400" dirty="0">
               <a:latin typeface="Myriad Pro"/>
@@ -5081,14 +5067,7 @@
                 <a:latin typeface="Myriad Pro"/>
                 <a:cs typeface="Myriad Pro"/>
               </a:rPr>
-              <a:t>SRC: </a:t>
-            </a:r>
-            <a:r>
-              <a:rPr lang="en-US" sz="1400" dirty="0" smtClean="0">
-                <a:latin typeface="Myriad Pro"/>
-                <a:cs typeface="Myriad Pro"/>
-              </a:rPr>
-              <a:t>89.22.22.11</a:t>
+              <a:t>SRC: 89.22.22.11</a:t>
             </a:r>
             <a:endParaRPr lang="en-US" sz="1400" dirty="0">
               <a:latin typeface="Myriad Pro"/>
@@ -5315,7 +5294,7 @@
   <p:timing>
     <p:tnLst>
       <p:par>
-        <p:cTn xmlns:p14="http://schemas.microsoft.com/office/powerpoint/2010/main" id="1" dur="indefinite" restart="never" nodeType="tmRoot"/>
+        <p:cTn id="1" dur="indefinite" restart="never" nodeType="tmRoot"/>
       </p:par>
     </p:tnLst>
   </p:timing>
@@ -5781,7 +5760,7 @@
               <a:tailEnd/>
             </a:ln>
             <a:extLst>
-              <a:ext uri="{909E8E84-426E-40dd-AFC4-6F175D3DCCD1}">
+              <a:ext uri="{909E8E84-426E-40DD-AFC4-6F175D3DCCD1}">
                 <a14:hiddenFill xmlns:a14="http://schemas.microsoft.com/office/drawing/2010/main">
                   <a:solidFill>
                     <a:srgbClr val="FFFFFF"/>
@@ -5847,7 +5826,7 @@
               <a:tailEnd type="arrow" w="med" len="med"/>
             </a:ln>
             <a:extLst>
-              <a:ext uri="{909E8E84-426E-40dd-AFC4-6F175D3DCCD1}">
+              <a:ext uri="{909E8E84-426E-40DD-AFC4-6F175D3DCCD1}">
                 <a14:hiddenFill xmlns:a14="http://schemas.microsoft.com/office/drawing/2010/main">
                   <a:noFill/>
                 </a14:hiddenFill>
@@ -5881,7 +5860,7 @@
               <a:tailEnd/>
             </a:ln>
             <a:extLst>
-              <a:ext uri="{909E8E84-426E-40dd-AFC4-6F175D3DCCD1}">
+              <a:ext uri="{909E8E84-426E-40DD-AFC4-6F175D3DCCD1}">
                 <a14:hiddenFill xmlns:a14="http://schemas.microsoft.com/office/drawing/2010/main">
                   <a:solidFill>
                     <a:srgbClr val="FFFFFF"/>
@@ -5947,7 +5926,7 @@
               <a:tailEnd type="arrow" w="med" len="med"/>
             </a:ln>
             <a:extLst>
-              <a:ext uri="{909E8E84-426E-40dd-AFC4-6F175D3DCCD1}">
+              <a:ext uri="{909E8E84-426E-40DD-AFC4-6F175D3DCCD1}">
                 <a14:hiddenFill xmlns:a14="http://schemas.microsoft.com/office/drawing/2010/main">
                   <a:noFill/>
                 </a14:hiddenFill>
@@ -5981,7 +5960,7 @@
               <a:tailEnd/>
             </a:ln>
             <a:extLst>
-              <a:ext uri="{909E8E84-426E-40dd-AFC4-6F175D3DCCD1}">
+              <a:ext uri="{909E8E84-426E-40DD-AFC4-6F175D3DCCD1}">
                 <a14:hiddenFill xmlns:a14="http://schemas.microsoft.com/office/drawing/2010/main">
                   <a:solidFill>
                     <a:srgbClr val="FFFFFF"/>
@@ -6047,7 +6026,7 @@
               <a:tailEnd type="arrow" w="med" len="med"/>
             </a:ln>
             <a:extLst>
-              <a:ext uri="{909E8E84-426E-40dd-AFC4-6F175D3DCCD1}">
+              <a:ext uri="{909E8E84-426E-40DD-AFC4-6F175D3DCCD1}">
                 <a14:hiddenFill xmlns:a14="http://schemas.microsoft.com/office/drawing/2010/main">
                   <a:noFill/>
                 </a14:hiddenFill>
@@ -6187,7 +6166,7 @@
               <a:tailEnd/>
             </a:ln>
             <a:extLst>
-              <a:ext uri="{909E8E84-426E-40dd-AFC4-6F175D3DCCD1}">
+              <a:ext uri="{909E8E84-426E-40DD-AFC4-6F175D3DCCD1}">
                 <a14:hiddenFill xmlns:a14="http://schemas.microsoft.com/office/drawing/2010/main">
                   <a:solidFill>
                     <a:srgbClr val="FFFFFF"/>
@@ -6253,7 +6232,7 @@
               <a:tailEnd type="arrow" w="med" len="med"/>
             </a:ln>
             <a:extLst>
-              <a:ext uri="{909E8E84-426E-40dd-AFC4-6F175D3DCCD1}">
+              <a:ext uri="{909E8E84-426E-40DD-AFC4-6F175D3DCCD1}">
                 <a14:hiddenFill xmlns:a14="http://schemas.microsoft.com/office/drawing/2010/main">
                   <a:noFill/>
                 </a14:hiddenFill>
@@ -6287,7 +6266,7 @@
               <a:tailEnd/>
             </a:ln>
             <a:extLst>
-              <a:ext uri="{909E8E84-426E-40dd-AFC4-6F175D3DCCD1}">
+              <a:ext uri="{909E8E84-426E-40DD-AFC4-6F175D3DCCD1}">
                 <a14:hiddenFill xmlns:a14="http://schemas.microsoft.com/office/drawing/2010/main">
                   <a:solidFill>
                     <a:srgbClr val="FFFFFF"/>
@@ -6353,7 +6332,7 @@
               <a:tailEnd type="arrow" w="med" len="med"/>
             </a:ln>
             <a:extLst>
-              <a:ext uri="{909E8E84-426E-40dd-AFC4-6F175D3DCCD1}">
+              <a:ext uri="{909E8E84-426E-40DD-AFC4-6F175D3DCCD1}">
                 <a14:hiddenFill xmlns:a14="http://schemas.microsoft.com/office/drawing/2010/main">
                   <a:noFill/>
                 </a14:hiddenFill>
@@ -6387,7 +6366,7 @@
               <a:tailEnd/>
             </a:ln>
             <a:extLst>
-              <a:ext uri="{909E8E84-426E-40dd-AFC4-6F175D3DCCD1}">
+              <a:ext uri="{909E8E84-426E-40DD-AFC4-6F175D3DCCD1}">
                 <a14:hiddenFill xmlns:a14="http://schemas.microsoft.com/office/drawing/2010/main">
                   <a:solidFill>
                     <a:srgbClr val="FFFFFF"/>
@@ -6453,7 +6432,7 @@
               <a:tailEnd type="arrow" w="med" len="med"/>
             </a:ln>
             <a:extLst>
-              <a:ext uri="{909E8E84-426E-40dd-AFC4-6F175D3DCCD1}">
+              <a:ext uri="{909E8E84-426E-40DD-AFC4-6F175D3DCCD1}">
                 <a14:hiddenFill xmlns:a14="http://schemas.microsoft.com/office/drawing/2010/main">
                   <a:noFill/>
                 </a14:hiddenFill>
@@ -6644,7 +6623,7 @@
               <a:tailEnd/>
             </a:ln>
             <a:extLst>
-              <a:ext uri="{909E8E84-426E-40dd-AFC4-6F175D3DCCD1}">
+              <a:ext uri="{909E8E84-426E-40DD-AFC4-6F175D3DCCD1}">
                 <a14:hiddenFill xmlns:a14="http://schemas.microsoft.com/office/drawing/2010/main">
                   <a:solidFill>
                     <a:srgbClr val="FFFFFF"/>
@@ -6710,7 +6689,7 @@
               <a:tailEnd type="arrow" w="med" len="med"/>
             </a:ln>
             <a:extLst>
-              <a:ext uri="{909E8E84-426E-40dd-AFC4-6F175D3DCCD1}">
+              <a:ext uri="{909E8E84-426E-40DD-AFC4-6F175D3DCCD1}">
                 <a14:hiddenFill xmlns:a14="http://schemas.microsoft.com/office/drawing/2010/main">
                   <a:noFill/>
                 </a14:hiddenFill>
@@ -6744,7 +6723,7 @@
               <a:tailEnd/>
             </a:ln>
             <a:extLst>
-              <a:ext uri="{909E8E84-426E-40dd-AFC4-6F175D3DCCD1}">
+              <a:ext uri="{909E8E84-426E-40DD-AFC4-6F175D3DCCD1}">
                 <a14:hiddenFill xmlns:a14="http://schemas.microsoft.com/office/drawing/2010/main">
                   <a:solidFill>
                     <a:srgbClr val="FFFFFF"/>
@@ -6810,7 +6789,7 @@
               <a:tailEnd type="arrow" w="med" len="med"/>
             </a:ln>
             <a:extLst>
-              <a:ext uri="{909E8E84-426E-40dd-AFC4-6F175D3DCCD1}">
+              <a:ext uri="{909E8E84-426E-40DD-AFC4-6F175D3DCCD1}">
                 <a14:hiddenFill xmlns:a14="http://schemas.microsoft.com/office/drawing/2010/main">
                   <a:noFill/>
                 </a14:hiddenFill>
@@ -6844,7 +6823,7 @@
               <a:tailEnd/>
             </a:ln>
             <a:extLst>
-              <a:ext uri="{909E8E84-426E-40dd-AFC4-6F175D3DCCD1}">
+              <a:ext uri="{909E8E84-426E-40DD-AFC4-6F175D3DCCD1}">
                 <a14:hiddenFill xmlns:a14="http://schemas.microsoft.com/office/drawing/2010/main">
                   <a:solidFill>
                     <a:srgbClr val="FFFFFF"/>
@@ -6910,7 +6889,7 @@
               <a:tailEnd type="arrow" w="med" len="med"/>
             </a:ln>
             <a:extLst>
-              <a:ext uri="{909E8E84-426E-40dd-AFC4-6F175D3DCCD1}">
+              <a:ext uri="{909E8E84-426E-40DD-AFC4-6F175D3DCCD1}">
                 <a14:hiddenFill xmlns:a14="http://schemas.microsoft.com/office/drawing/2010/main">
                   <a:noFill/>
                 </a14:hiddenFill>
@@ -7050,7 +7029,7 @@
               <a:tailEnd/>
             </a:ln>
             <a:extLst>
-              <a:ext uri="{909E8E84-426E-40dd-AFC4-6F175D3DCCD1}">
+              <a:ext uri="{909E8E84-426E-40DD-AFC4-6F175D3DCCD1}">
                 <a14:hiddenFill xmlns:a14="http://schemas.microsoft.com/office/drawing/2010/main">
                   <a:solidFill>
                     <a:srgbClr val="FFFFFF"/>
@@ -7116,7 +7095,7 @@
               <a:tailEnd type="arrow" w="med" len="med"/>
             </a:ln>
             <a:extLst>
-              <a:ext uri="{909E8E84-426E-40dd-AFC4-6F175D3DCCD1}">
+              <a:ext uri="{909E8E84-426E-40DD-AFC4-6F175D3DCCD1}">
                 <a14:hiddenFill xmlns:a14="http://schemas.microsoft.com/office/drawing/2010/main">
                   <a:noFill/>
                 </a14:hiddenFill>
@@ -7150,7 +7129,7 @@
               <a:tailEnd/>
             </a:ln>
             <a:extLst>
-              <a:ext uri="{909E8E84-426E-40dd-AFC4-6F175D3DCCD1}">
+              <a:ext uri="{909E8E84-426E-40DD-AFC4-6F175D3DCCD1}">
                 <a14:hiddenFill xmlns:a14="http://schemas.microsoft.com/office/drawing/2010/main">
                   <a:solidFill>
                     <a:srgbClr val="FFFFFF"/>
@@ -7216,7 +7195,7 @@
               <a:tailEnd type="arrow" w="med" len="med"/>
             </a:ln>
             <a:extLst>
-              <a:ext uri="{909E8E84-426E-40dd-AFC4-6F175D3DCCD1}">
+              <a:ext uri="{909E8E84-426E-40DD-AFC4-6F175D3DCCD1}">
                 <a14:hiddenFill xmlns:a14="http://schemas.microsoft.com/office/drawing/2010/main">
                   <a:noFill/>
                 </a14:hiddenFill>
@@ -7250,7 +7229,7 @@
               <a:tailEnd/>
             </a:ln>
             <a:extLst>
-              <a:ext uri="{909E8E84-426E-40dd-AFC4-6F175D3DCCD1}">
+              <a:ext uri="{909E8E84-426E-40DD-AFC4-6F175D3DCCD1}">
                 <a14:hiddenFill xmlns:a14="http://schemas.microsoft.com/office/drawing/2010/main">
                   <a:solidFill>
                     <a:srgbClr val="FFFFFF"/>
@@ -7316,7 +7295,7 @@
               <a:tailEnd type="arrow" w="med" len="med"/>
             </a:ln>
             <a:extLst>
-              <a:ext uri="{909E8E84-426E-40dd-AFC4-6F175D3DCCD1}">
+              <a:ext uri="{909E8E84-426E-40DD-AFC4-6F175D3DCCD1}">
                 <a14:hiddenFill xmlns:a14="http://schemas.microsoft.com/office/drawing/2010/main">
                   <a:noFill/>
                 </a14:hiddenFill>
@@ -7507,7 +7486,7 @@
               <a:tailEnd/>
             </a:ln>
             <a:extLst>
-              <a:ext uri="{909E8E84-426E-40dd-AFC4-6F175D3DCCD1}">
+              <a:ext uri="{909E8E84-426E-40DD-AFC4-6F175D3DCCD1}">
                 <a14:hiddenFill xmlns:a14="http://schemas.microsoft.com/office/drawing/2010/main">
                   <a:solidFill>
                     <a:srgbClr val="FFFFFF"/>
@@ -7573,7 +7552,7 @@
               <a:tailEnd type="arrow" w="med" len="med"/>
             </a:ln>
             <a:extLst>
-              <a:ext uri="{909E8E84-426E-40dd-AFC4-6F175D3DCCD1}">
+              <a:ext uri="{909E8E84-426E-40DD-AFC4-6F175D3DCCD1}">
                 <a14:hiddenFill xmlns:a14="http://schemas.microsoft.com/office/drawing/2010/main">
                   <a:noFill/>
                 </a14:hiddenFill>
@@ -7607,7 +7586,7 @@
               <a:tailEnd/>
             </a:ln>
             <a:extLst>
-              <a:ext uri="{909E8E84-426E-40dd-AFC4-6F175D3DCCD1}">
+              <a:ext uri="{909E8E84-426E-40DD-AFC4-6F175D3DCCD1}">
                 <a14:hiddenFill xmlns:a14="http://schemas.microsoft.com/office/drawing/2010/main">
                   <a:solidFill>
                     <a:srgbClr val="FFFFFF"/>
@@ -7673,7 +7652,7 @@
               <a:tailEnd type="arrow" w="med" len="med"/>
             </a:ln>
             <a:extLst>
-              <a:ext uri="{909E8E84-426E-40dd-AFC4-6F175D3DCCD1}">
+              <a:ext uri="{909E8E84-426E-40DD-AFC4-6F175D3DCCD1}">
                 <a14:hiddenFill xmlns:a14="http://schemas.microsoft.com/office/drawing/2010/main">
                   <a:noFill/>
                 </a14:hiddenFill>
@@ -7707,7 +7686,7 @@
               <a:tailEnd/>
             </a:ln>
             <a:extLst>
-              <a:ext uri="{909E8E84-426E-40dd-AFC4-6F175D3DCCD1}">
+              <a:ext uri="{909E8E84-426E-40DD-AFC4-6F175D3DCCD1}">
                 <a14:hiddenFill xmlns:a14="http://schemas.microsoft.com/office/drawing/2010/main">
                   <a:solidFill>
                     <a:srgbClr val="FFFFFF"/>
@@ -7773,7 +7752,7 @@
               <a:tailEnd type="arrow" w="med" len="med"/>
             </a:ln>
             <a:extLst>
-              <a:ext uri="{909E8E84-426E-40dd-AFC4-6F175D3DCCD1}">
+              <a:ext uri="{909E8E84-426E-40DD-AFC4-6F175D3DCCD1}">
                 <a14:hiddenFill xmlns:a14="http://schemas.microsoft.com/office/drawing/2010/main">
                   <a:noFill/>
                 </a14:hiddenFill>
@@ -7964,7 +7943,7 @@
               <a:tailEnd/>
             </a:ln>
             <a:extLst>
-              <a:ext uri="{909E8E84-426E-40dd-AFC4-6F175D3DCCD1}">
+              <a:ext uri="{909E8E84-426E-40DD-AFC4-6F175D3DCCD1}">
                 <a14:hiddenFill xmlns:a14="http://schemas.microsoft.com/office/drawing/2010/main">
                   <a:solidFill>
                     <a:srgbClr val="FFFFFF"/>
@@ -8025,7 +8004,7 @@
               <a:tailEnd type="arrow" w="med" len="med"/>
             </a:ln>
             <a:extLst>
-              <a:ext uri="{909E8E84-426E-40dd-AFC4-6F175D3DCCD1}">
+              <a:ext uri="{909E8E84-426E-40DD-AFC4-6F175D3DCCD1}">
                 <a14:hiddenFill xmlns:a14="http://schemas.microsoft.com/office/drawing/2010/main">
                   <a:noFill/>
                 </a14:hiddenFill>
@@ -8059,7 +8038,7 @@
               <a:tailEnd/>
             </a:ln>
             <a:extLst>
-              <a:ext uri="{909E8E84-426E-40dd-AFC4-6F175D3DCCD1}">
+              <a:ext uri="{909E8E84-426E-40DD-AFC4-6F175D3DCCD1}">
                 <a14:hiddenFill xmlns:a14="http://schemas.microsoft.com/office/drawing/2010/main">
                   <a:solidFill>
                     <a:srgbClr val="FFFFFF"/>
@@ -8125,7 +8104,7 @@
               <a:tailEnd type="arrow" w="med" len="med"/>
             </a:ln>
             <a:extLst>
-              <a:ext uri="{909E8E84-426E-40dd-AFC4-6F175D3DCCD1}">
+              <a:ext uri="{909E8E84-426E-40DD-AFC4-6F175D3DCCD1}">
                 <a14:hiddenFill xmlns:a14="http://schemas.microsoft.com/office/drawing/2010/main">
                   <a:noFill/>
                 </a14:hiddenFill>
@@ -8159,7 +8138,7 @@
               <a:tailEnd/>
             </a:ln>
             <a:extLst>
-              <a:ext uri="{909E8E84-426E-40dd-AFC4-6F175D3DCCD1}">
+              <a:ext uri="{909E8E84-426E-40DD-AFC4-6F175D3DCCD1}">
                 <a14:hiddenFill xmlns:a14="http://schemas.microsoft.com/office/drawing/2010/main">
                   <a:solidFill>
                     <a:srgbClr val="FFFFFF"/>
@@ -8225,7 +8204,7 @@
               <a:tailEnd type="arrow" w="med" len="med"/>
             </a:ln>
             <a:extLst>
-              <a:ext uri="{909E8E84-426E-40dd-AFC4-6F175D3DCCD1}">
+              <a:ext uri="{909E8E84-426E-40DD-AFC4-6F175D3DCCD1}">
                 <a14:hiddenFill xmlns:a14="http://schemas.microsoft.com/office/drawing/2010/main">
                   <a:noFill/>
                 </a14:hiddenFill>
@@ -8365,7 +8344,7 @@
               <a:tailEnd/>
             </a:ln>
             <a:extLst>
-              <a:ext uri="{909E8E84-426E-40dd-AFC4-6F175D3DCCD1}">
+              <a:ext uri="{909E8E84-426E-40DD-AFC4-6F175D3DCCD1}">
                 <a14:hiddenFill xmlns:a14="http://schemas.microsoft.com/office/drawing/2010/main">
                   <a:solidFill>
                     <a:srgbClr val="FFFFFF"/>
@@ -8431,7 +8410,7 @@
               <a:tailEnd type="arrow" w="med" len="med"/>
             </a:ln>
             <a:extLst>
-              <a:ext uri="{909E8E84-426E-40dd-AFC4-6F175D3DCCD1}">
+              <a:ext uri="{909E8E84-426E-40DD-AFC4-6F175D3DCCD1}">
                 <a14:hiddenFill xmlns:a14="http://schemas.microsoft.com/office/drawing/2010/main">
                   <a:noFill/>
                 </a14:hiddenFill>
@@ -8465,7 +8444,7 @@
               <a:tailEnd/>
             </a:ln>
             <a:extLst>
-              <a:ext uri="{909E8E84-426E-40dd-AFC4-6F175D3DCCD1}">
+              <a:ext uri="{909E8E84-426E-40DD-AFC4-6F175D3DCCD1}">
                 <a14:hiddenFill xmlns:a14="http://schemas.microsoft.com/office/drawing/2010/main">
                   <a:solidFill>
                     <a:srgbClr val="FFFFFF"/>
@@ -8531,7 +8510,7 @@
               <a:tailEnd type="arrow" w="med" len="med"/>
             </a:ln>
             <a:extLst>
-              <a:ext uri="{909E8E84-426E-40dd-AFC4-6F175D3DCCD1}">
+              <a:ext uri="{909E8E84-426E-40DD-AFC4-6F175D3DCCD1}">
                 <a14:hiddenFill xmlns:a14="http://schemas.microsoft.com/office/drawing/2010/main">
                   <a:noFill/>
                 </a14:hiddenFill>
@@ -8565,7 +8544,7 @@
               <a:tailEnd/>
             </a:ln>
             <a:extLst>
-              <a:ext uri="{909E8E84-426E-40dd-AFC4-6F175D3DCCD1}">
+              <a:ext uri="{909E8E84-426E-40DD-AFC4-6F175D3DCCD1}">
                 <a14:hiddenFill xmlns:a14="http://schemas.microsoft.com/office/drawing/2010/main">
                   <a:solidFill>
                     <a:srgbClr val="FFFFFF"/>
@@ -8631,7 +8610,7 @@
               <a:tailEnd type="arrow" w="med" len="med"/>
             </a:ln>
             <a:extLst>
-              <a:ext uri="{909E8E84-426E-40dd-AFC4-6F175D3DCCD1}">
+              <a:ext uri="{909E8E84-426E-40DD-AFC4-6F175D3DCCD1}">
                 <a14:hiddenFill xmlns:a14="http://schemas.microsoft.com/office/drawing/2010/main">
                   <a:noFill/>
                 </a14:hiddenFill>
@@ -8865,7 +8844,7 @@
               <a:tailEnd/>
             </a:ln>
             <a:extLst>
-              <a:ext uri="{909E8E84-426E-40dd-AFC4-6F175D3DCCD1}">
+              <a:ext uri="{909E8E84-426E-40DD-AFC4-6F175D3DCCD1}">
                 <a14:hiddenFill xmlns:a14="http://schemas.microsoft.com/office/drawing/2010/main">
                   <a:solidFill>
                     <a:srgbClr val="FFFFFF"/>
@@ -8931,7 +8910,7 @@
               <a:tailEnd type="arrow" w="med" len="med"/>
             </a:ln>
             <a:extLst>
-              <a:ext uri="{909E8E84-426E-40dd-AFC4-6F175D3DCCD1}">
+              <a:ext uri="{909E8E84-426E-40DD-AFC4-6F175D3DCCD1}">
                 <a14:hiddenFill xmlns:a14="http://schemas.microsoft.com/office/drawing/2010/main">
                   <a:noFill/>
                 </a14:hiddenFill>
@@ -8965,7 +8944,7 @@
               <a:tailEnd/>
             </a:ln>
             <a:extLst>
-              <a:ext uri="{909E8E84-426E-40dd-AFC4-6F175D3DCCD1}">
+              <a:ext uri="{909E8E84-426E-40DD-AFC4-6F175D3DCCD1}">
                 <a14:hiddenFill xmlns:a14="http://schemas.microsoft.com/office/drawing/2010/main">
                   <a:solidFill>
                     <a:srgbClr val="FFFFFF"/>
@@ -9031,7 +9010,7 @@
               <a:tailEnd type="arrow" w="med" len="med"/>
             </a:ln>
             <a:extLst>
-              <a:ext uri="{909E8E84-426E-40dd-AFC4-6F175D3DCCD1}">
+              <a:ext uri="{909E8E84-426E-40DD-AFC4-6F175D3DCCD1}">
                 <a14:hiddenFill xmlns:a14="http://schemas.microsoft.com/office/drawing/2010/main">
                   <a:noFill/>
                 </a14:hiddenFill>
@@ -9065,7 +9044,7 @@
               <a:tailEnd/>
             </a:ln>
             <a:extLst>
-              <a:ext uri="{909E8E84-426E-40dd-AFC4-6F175D3DCCD1}">
+              <a:ext uri="{909E8E84-426E-40DD-AFC4-6F175D3DCCD1}">
                 <a14:hiddenFill xmlns:a14="http://schemas.microsoft.com/office/drawing/2010/main">
                   <a:solidFill>
                     <a:srgbClr val="FFFFFF"/>
@@ -9131,7 +9110,7 @@
               <a:tailEnd type="arrow" w="med" len="med"/>
             </a:ln>
             <a:extLst>
-              <a:ext uri="{909E8E84-426E-40dd-AFC4-6F175D3DCCD1}">
+              <a:ext uri="{909E8E84-426E-40DD-AFC4-6F175D3DCCD1}">
                 <a14:hiddenFill xmlns:a14="http://schemas.microsoft.com/office/drawing/2010/main">
                   <a:noFill/>
                 </a14:hiddenFill>
@@ -9271,7 +9250,7 @@
               <a:tailEnd/>
             </a:ln>
             <a:extLst>
-              <a:ext uri="{909E8E84-426E-40dd-AFC4-6F175D3DCCD1}">
+              <a:ext uri="{909E8E84-426E-40DD-AFC4-6F175D3DCCD1}">
                 <a14:hiddenFill xmlns:a14="http://schemas.microsoft.com/office/drawing/2010/main">
                   <a:solidFill>
                     <a:srgbClr val="FFFFFF"/>
@@ -9337,7 +9316,7 @@
               <a:tailEnd type="arrow" w="med" len="med"/>
             </a:ln>
             <a:extLst>
-              <a:ext uri="{909E8E84-426E-40dd-AFC4-6F175D3DCCD1}">
+              <a:ext uri="{909E8E84-426E-40DD-AFC4-6F175D3DCCD1}">
                 <a14:hiddenFill xmlns:a14="http://schemas.microsoft.com/office/drawing/2010/main">
                   <a:noFill/>
                 </a14:hiddenFill>
@@ -9371,7 +9350,7 @@
               <a:tailEnd/>
             </a:ln>
             <a:extLst>
-              <a:ext uri="{909E8E84-426E-40dd-AFC4-6F175D3DCCD1}">
+              <a:ext uri="{909E8E84-426E-40DD-AFC4-6F175D3DCCD1}">
                 <a14:hiddenFill xmlns:a14="http://schemas.microsoft.com/office/drawing/2010/main">
                   <a:solidFill>
                     <a:srgbClr val="FFFFFF"/>
@@ -9437,7 +9416,7 @@
               <a:tailEnd type="arrow" w="med" len="med"/>
             </a:ln>
             <a:extLst>
-              <a:ext uri="{909E8E84-426E-40dd-AFC4-6F175D3DCCD1}">
+              <a:ext uri="{909E8E84-426E-40DD-AFC4-6F175D3DCCD1}">
                 <a14:hiddenFill xmlns:a14="http://schemas.microsoft.com/office/drawing/2010/main">
                   <a:noFill/>
                 </a14:hiddenFill>
@@ -9471,7 +9450,7 @@
               <a:tailEnd/>
             </a:ln>
             <a:extLst>
-              <a:ext uri="{909E8E84-426E-40dd-AFC4-6F175D3DCCD1}">
+              <a:ext uri="{909E8E84-426E-40DD-AFC4-6F175D3DCCD1}">
                 <a14:hiddenFill xmlns:a14="http://schemas.microsoft.com/office/drawing/2010/main">
                   <a:solidFill>
                     <a:srgbClr val="FFFFFF"/>
@@ -9537,7 +9516,7 @@
               <a:tailEnd type="arrow" w="med" len="med"/>
             </a:ln>
             <a:extLst>
-              <a:ext uri="{909E8E84-426E-40dd-AFC4-6F175D3DCCD1}">
+              <a:ext uri="{909E8E84-426E-40DD-AFC4-6F175D3DCCD1}">
                 <a14:hiddenFill xmlns:a14="http://schemas.microsoft.com/office/drawing/2010/main">
                   <a:noFill/>
                 </a14:hiddenFill>
@@ -9678,7 +9657,7 @@
               <a:tailEnd/>
             </a:ln>
             <a:extLst>
-              <a:ext uri="{909E8E84-426E-40dd-AFC4-6F175D3DCCD1}">
+              <a:ext uri="{909E8E84-426E-40DD-AFC4-6F175D3DCCD1}">
                 <a14:hiddenFill xmlns:a14="http://schemas.microsoft.com/office/drawing/2010/main">
                   <a:solidFill>
                     <a:srgbClr val="FFFFFF"/>
@@ -9739,7 +9718,7 @@
               <a:tailEnd type="arrow" w="med" len="med"/>
             </a:ln>
             <a:extLst>
-              <a:ext uri="{909E8E84-426E-40dd-AFC4-6F175D3DCCD1}">
+              <a:ext uri="{909E8E84-426E-40DD-AFC4-6F175D3DCCD1}">
                 <a14:hiddenFill xmlns:a14="http://schemas.microsoft.com/office/drawing/2010/main">
                   <a:noFill/>
                 </a14:hiddenFill>
@@ -9773,7 +9752,7 @@
               <a:tailEnd/>
             </a:ln>
             <a:extLst>
-              <a:ext uri="{909E8E84-426E-40dd-AFC4-6F175D3DCCD1}">
+              <a:ext uri="{909E8E84-426E-40DD-AFC4-6F175D3DCCD1}">
                 <a14:hiddenFill xmlns:a14="http://schemas.microsoft.com/office/drawing/2010/main">
                   <a:solidFill>
                     <a:srgbClr val="FFFFFF"/>
@@ -9839,7 +9818,7 @@
               <a:tailEnd type="arrow" w="med" len="med"/>
             </a:ln>
             <a:extLst>
-              <a:ext uri="{909E8E84-426E-40dd-AFC4-6F175D3DCCD1}">
+              <a:ext uri="{909E8E84-426E-40DD-AFC4-6F175D3DCCD1}">
                 <a14:hiddenFill xmlns:a14="http://schemas.microsoft.com/office/drawing/2010/main">
                   <a:noFill/>
                 </a14:hiddenFill>
@@ -9873,7 +9852,7 @@
               <a:tailEnd/>
             </a:ln>
             <a:extLst>
-              <a:ext uri="{909E8E84-426E-40dd-AFC4-6F175D3DCCD1}">
+              <a:ext uri="{909E8E84-426E-40DD-AFC4-6F175D3DCCD1}">
                 <a14:hiddenFill xmlns:a14="http://schemas.microsoft.com/office/drawing/2010/main">
                   <a:solidFill>
                     <a:srgbClr val="FFFFFF"/>
@@ -9939,7 +9918,7 @@
               <a:tailEnd type="arrow" w="med" len="med"/>
             </a:ln>
             <a:extLst>
-              <a:ext uri="{909E8E84-426E-40dd-AFC4-6F175D3DCCD1}">
+              <a:ext uri="{909E8E84-426E-40DD-AFC4-6F175D3DCCD1}">
                 <a14:hiddenFill xmlns:a14="http://schemas.microsoft.com/office/drawing/2010/main">
                   <a:noFill/>
                 </a14:hiddenFill>
@@ -10025,7 +10004,7 @@
               <a:tailEnd/>
             </a:ln>
             <a:extLst>
-              <a:ext uri="{909E8E84-426E-40dd-AFC4-6F175D3DCCD1}">
+              <a:ext uri="{909E8E84-426E-40DD-AFC4-6F175D3DCCD1}">
                 <a14:hiddenFill xmlns:a14="http://schemas.microsoft.com/office/drawing/2010/main">
                   <a:solidFill>
                     <a:srgbClr val="FFFFFF"/>
@@ -10075,7 +10054,7 @@
               <a:tailEnd type="arrow" w="med" len="med"/>
             </a:ln>
             <a:extLst>
-              <a:ext uri="{909E8E84-426E-40dd-AFC4-6F175D3DCCD1}">
+              <a:ext uri="{909E8E84-426E-40DD-AFC4-6F175D3DCCD1}">
                 <a14:hiddenFill xmlns:a14="http://schemas.microsoft.com/office/drawing/2010/main">
                   <a:noFill/>
                 </a14:hiddenFill>
@@ -10109,7 +10088,7 @@
               <a:tailEnd/>
             </a:ln>
             <a:extLst>
-              <a:ext uri="{909E8E84-426E-40dd-AFC4-6F175D3DCCD1}">
+              <a:ext uri="{909E8E84-426E-40DD-AFC4-6F175D3DCCD1}">
                 <a14:hiddenFill xmlns:a14="http://schemas.microsoft.com/office/drawing/2010/main">
                   <a:solidFill>
                     <a:srgbClr val="FFFFFF"/>
@@ -10159,7 +10138,7 @@
               <a:tailEnd type="arrow" w="med" len="med"/>
             </a:ln>
             <a:extLst>
-              <a:ext uri="{909E8E84-426E-40dd-AFC4-6F175D3DCCD1}">
+              <a:ext uri="{909E8E84-426E-40DD-AFC4-6F175D3DCCD1}">
                 <a14:hiddenFill xmlns:a14="http://schemas.microsoft.com/office/drawing/2010/main">
                   <a:noFill/>
                 </a14:hiddenFill>
@@ -10193,7 +10172,7 @@
               <a:tailEnd/>
             </a:ln>
             <a:extLst>
-              <a:ext uri="{909E8E84-426E-40dd-AFC4-6F175D3DCCD1}">
+              <a:ext uri="{909E8E84-426E-40DD-AFC4-6F175D3DCCD1}">
                 <a14:hiddenFill xmlns:a14="http://schemas.microsoft.com/office/drawing/2010/main">
                   <a:solidFill>
                     <a:srgbClr val="FFFFFF"/>
@@ -10243,7 +10222,7 @@
               <a:tailEnd type="arrow" w="med" len="med"/>
             </a:ln>
             <a:extLst>
-              <a:ext uri="{909E8E84-426E-40dd-AFC4-6F175D3DCCD1}">
+              <a:ext uri="{909E8E84-426E-40DD-AFC4-6F175D3DCCD1}">
                 <a14:hiddenFill xmlns:a14="http://schemas.microsoft.com/office/drawing/2010/main">
                   <a:noFill/>
                 </a14:hiddenFill>
@@ -10329,7 +10308,7 @@
               <a:tailEnd/>
             </a:ln>
             <a:extLst>
-              <a:ext uri="{909E8E84-426E-40dd-AFC4-6F175D3DCCD1}">
+              <a:ext uri="{909E8E84-426E-40DD-AFC4-6F175D3DCCD1}">
                 <a14:hiddenFill xmlns:a14="http://schemas.microsoft.com/office/drawing/2010/main">
                   <a:solidFill>
                     <a:srgbClr val="FFFFFF"/>
@@ -10379,7 +10358,7 @@
               <a:tailEnd type="arrow" w="med" len="med"/>
             </a:ln>
             <a:extLst>
-              <a:ext uri="{909E8E84-426E-40dd-AFC4-6F175D3DCCD1}">
+              <a:ext uri="{909E8E84-426E-40DD-AFC4-6F175D3DCCD1}">
                 <a14:hiddenFill xmlns:a14="http://schemas.microsoft.com/office/drawing/2010/main">
                   <a:noFill/>
                 </a14:hiddenFill>
@@ -10413,7 +10392,7 @@
               <a:tailEnd/>
             </a:ln>
             <a:extLst>
-              <a:ext uri="{909E8E84-426E-40dd-AFC4-6F175D3DCCD1}">
+              <a:ext uri="{909E8E84-426E-40DD-AFC4-6F175D3DCCD1}">
                 <a14:hiddenFill xmlns:a14="http://schemas.microsoft.com/office/drawing/2010/main">
                   <a:solidFill>
                     <a:srgbClr val="FFFFFF"/>
@@ -10463,7 +10442,7 @@
               <a:tailEnd type="arrow" w="med" len="med"/>
             </a:ln>
             <a:extLst>
-              <a:ext uri="{909E8E84-426E-40dd-AFC4-6F175D3DCCD1}">
+              <a:ext uri="{909E8E84-426E-40DD-AFC4-6F175D3DCCD1}">
                 <a14:hiddenFill xmlns:a14="http://schemas.microsoft.com/office/drawing/2010/main">
                   <a:noFill/>
                 </a14:hiddenFill>
@@ -10497,7 +10476,7 @@
               <a:tailEnd/>
             </a:ln>
             <a:extLst>
-              <a:ext uri="{909E8E84-426E-40dd-AFC4-6F175D3DCCD1}">
+              <a:ext uri="{909E8E84-426E-40DD-AFC4-6F175D3DCCD1}">
                 <a14:hiddenFill xmlns:a14="http://schemas.microsoft.com/office/drawing/2010/main">
                   <a:solidFill>
                     <a:srgbClr val="FFFFFF"/>
@@ -10547,7 +10526,7 @@
               <a:tailEnd type="arrow" w="med" len="med"/>
             </a:ln>
             <a:extLst>
-              <a:ext uri="{909E8E84-426E-40dd-AFC4-6F175D3DCCD1}">
+              <a:ext uri="{909E8E84-426E-40DD-AFC4-6F175D3DCCD1}">
                 <a14:hiddenFill xmlns:a14="http://schemas.microsoft.com/office/drawing/2010/main">
                   <a:noFill/>
                 </a14:hiddenFill>
@@ -10633,7 +10612,7 @@
               <a:tailEnd/>
             </a:ln>
             <a:extLst>
-              <a:ext uri="{909E8E84-426E-40dd-AFC4-6F175D3DCCD1}">
+              <a:ext uri="{909E8E84-426E-40DD-AFC4-6F175D3DCCD1}">
                 <a14:hiddenFill xmlns:a14="http://schemas.microsoft.com/office/drawing/2010/main">
                   <a:solidFill>
                     <a:srgbClr val="FFFFFF"/>
@@ -10683,7 +10662,7 @@
               <a:tailEnd type="arrow" w="med" len="med"/>
             </a:ln>
             <a:extLst>
-              <a:ext uri="{909E8E84-426E-40dd-AFC4-6F175D3DCCD1}">
+              <a:ext uri="{909E8E84-426E-40DD-AFC4-6F175D3DCCD1}">
                 <a14:hiddenFill xmlns:a14="http://schemas.microsoft.com/office/drawing/2010/main">
                   <a:noFill/>
                 </a14:hiddenFill>
@@ -10717,7 +10696,7 @@
               <a:tailEnd/>
             </a:ln>
             <a:extLst>
-              <a:ext uri="{909E8E84-426E-40dd-AFC4-6F175D3DCCD1}">
+              <a:ext uri="{909E8E84-426E-40DD-AFC4-6F175D3DCCD1}">
                 <a14:hiddenFill xmlns:a14="http://schemas.microsoft.com/office/drawing/2010/main">
                   <a:solidFill>
                     <a:srgbClr val="FFFFFF"/>
@@ -10767,7 +10746,7 @@
               <a:tailEnd type="arrow" w="med" len="med"/>
             </a:ln>
             <a:extLst>
-              <a:ext uri="{909E8E84-426E-40dd-AFC4-6F175D3DCCD1}">
+              <a:ext uri="{909E8E84-426E-40DD-AFC4-6F175D3DCCD1}">
                 <a14:hiddenFill xmlns:a14="http://schemas.microsoft.com/office/drawing/2010/main">
                   <a:noFill/>
                 </a14:hiddenFill>
@@ -10801,7 +10780,7 @@
               <a:tailEnd/>
             </a:ln>
             <a:extLst>
-              <a:ext uri="{909E8E84-426E-40dd-AFC4-6F175D3DCCD1}">
+              <a:ext uri="{909E8E84-426E-40DD-AFC4-6F175D3DCCD1}">
                 <a14:hiddenFill xmlns:a14="http://schemas.microsoft.com/office/drawing/2010/main">
                   <a:solidFill>
                     <a:srgbClr val="FFFFFF"/>
@@ -10851,7 +10830,7 @@
               <a:tailEnd type="arrow" w="med" len="med"/>
             </a:ln>
             <a:extLst>
-              <a:ext uri="{909E8E84-426E-40dd-AFC4-6F175D3DCCD1}">
+              <a:ext uri="{909E8E84-426E-40DD-AFC4-6F175D3DCCD1}">
                 <a14:hiddenFill xmlns:a14="http://schemas.microsoft.com/office/drawing/2010/main">
                   <a:noFill/>
                 </a14:hiddenFill>
@@ -10873,7 +10852,7 @@
   <p:timing>
     <p:tnLst>
       <p:par>
-        <p:cTn xmlns:p14="http://schemas.microsoft.com/office/powerpoint/2010/main" id="1" dur="indefinite" restart="never" nodeType="tmRoot"/>
+        <p:cTn id="1" dur="indefinite" restart="never" nodeType="tmRoot"/>
       </p:par>
     </p:tnLst>
   </p:timing>
@@ -10944,15 +10923,7 @@
             <a:pPr lvl="1"/>
             <a:r>
               <a:rPr lang="en-US" dirty="0" smtClean="0"/>
-              <a:t>We can express our intent to have a packet sent first through an </a:t>
-            </a:r>
-            <a:r>
-              <a:rPr lang="en-US" dirty="0" err="1" smtClean="0"/>
-              <a:t>anonymizer</a:t>
-            </a:r>
-            <a:r>
-              <a:rPr lang="en-US" dirty="0" smtClean="0"/>
-              <a:t>, then to the final destination</a:t>
+              <a:t>We can express our intent to have a packet sent first through an anonymizer, then to the final destination</a:t>
             </a:r>
             <a:endParaRPr lang="en-US" dirty="0"/>
           </a:p>
@@ -11035,7 +11006,7 @@
               <a:tailEnd/>
             </a:ln>
             <a:extLst>
-              <a:ext uri="{909E8E84-426E-40dd-AFC4-6F175D3DCCD1}">
+              <a:ext uri="{909E8E84-426E-40DD-AFC4-6F175D3DCCD1}">
                 <a14:hiddenFill xmlns:a14="http://schemas.microsoft.com/office/drawing/2010/main">
                   <a:solidFill>
                     <a:srgbClr val="FFFFFF"/>
@@ -11087,7 +11058,7 @@
               <a:tailEnd/>
             </a:ln>
             <a:extLst>
-              <a:ext uri="{909E8E84-426E-40dd-AFC4-6F175D3DCCD1}">
+              <a:ext uri="{909E8E84-426E-40DD-AFC4-6F175D3DCCD1}">
                 <a14:hiddenFill xmlns:a14="http://schemas.microsoft.com/office/drawing/2010/main">
                   <a:solidFill>
                     <a:srgbClr val="FFFFFF"/>
@@ -11139,7 +11110,7 @@
               <a:tailEnd/>
             </a:ln>
             <a:extLst>
-              <a:ext uri="{909E8E84-426E-40dd-AFC4-6F175D3DCCD1}">
+              <a:ext uri="{909E8E84-426E-40DD-AFC4-6F175D3DCCD1}">
                 <a14:hiddenFill xmlns:a14="http://schemas.microsoft.com/office/drawing/2010/main">
                   <a:solidFill>
                     <a:srgbClr val="FFFFFF"/>
@@ -11194,7 +11165,7 @@
               <a:tailEnd type="arrow" w="med" len="med"/>
             </a:ln>
             <a:extLst>
-              <a:ext uri="{909E8E84-426E-40dd-AFC4-6F175D3DCCD1}">
+              <a:ext uri="{909E8E84-426E-40DD-AFC4-6F175D3DCCD1}">
                 <a14:hiddenFill xmlns:a14="http://schemas.microsoft.com/office/drawing/2010/main">
                   <a:noFill/>
                 </a14:hiddenFill>
@@ -11231,7 +11202,7 @@
               <a:tailEnd type="arrow" w="med" len="med"/>
             </a:ln>
             <a:extLst>
-              <a:ext uri="{909E8E84-426E-40dd-AFC4-6F175D3DCCD1}">
+              <a:ext uri="{909E8E84-426E-40DD-AFC4-6F175D3DCCD1}">
                 <a14:hiddenFill xmlns:a14="http://schemas.microsoft.com/office/drawing/2010/main">
                   <a:noFill/>
                 </a14:hiddenFill>
@@ -11267,7 +11238,7 @@
               <a:tailEnd type="arrow" w="med" len="med"/>
             </a:ln>
             <a:extLst>
-              <a:ext uri="{909E8E84-426E-40dd-AFC4-6F175D3DCCD1}">
+              <a:ext uri="{909E8E84-426E-40DD-AFC4-6F175D3DCCD1}">
                 <a14:hiddenFill xmlns:a14="http://schemas.microsoft.com/office/drawing/2010/main">
                   <a:noFill/>
                 </a14:hiddenFill>
@@ -11303,7 +11274,7 @@
               <a:tailEnd type="arrow" w="med" len="med"/>
             </a:ln>
             <a:extLst>
-              <a:ext uri="{909E8E84-426E-40dd-AFC4-6F175D3DCCD1}">
+              <a:ext uri="{909E8E84-426E-40DD-AFC4-6F175D3DCCD1}">
                 <a14:hiddenFill xmlns:a14="http://schemas.microsoft.com/office/drawing/2010/main">
                   <a:noFill/>
                 </a14:hiddenFill>
@@ -11341,7 +11312,7 @@
               <a:tailEnd type="arrow" w="med" len="med"/>
             </a:ln>
             <a:extLst>
-              <a:ext uri="{909E8E84-426E-40dd-AFC4-6F175D3DCCD1}">
+              <a:ext uri="{909E8E84-426E-40DD-AFC4-6F175D3DCCD1}">
                 <a14:hiddenFill xmlns:a14="http://schemas.microsoft.com/office/drawing/2010/main">
                   <a:noFill/>
                 </a14:hiddenFill>
@@ -11375,7 +11346,7 @@
               <a:tailEnd/>
             </a:ln>
             <a:extLst>
-              <a:ext uri="{909E8E84-426E-40dd-AFC4-6F175D3DCCD1}">
+              <a:ext uri="{909E8E84-426E-40DD-AFC4-6F175D3DCCD1}">
                 <a14:hiddenFill xmlns:a14="http://schemas.microsoft.com/office/drawing/2010/main">
                   <a:solidFill>
                     <a:srgbClr val="FFFFFF"/>
@@ -11427,7 +11398,7 @@
               <a:tailEnd/>
             </a:ln>
             <a:extLst>
-              <a:ext uri="{909E8E84-426E-40dd-AFC4-6F175D3DCCD1}">
+              <a:ext uri="{909E8E84-426E-40DD-AFC4-6F175D3DCCD1}">
                 <a14:hiddenFill xmlns:a14="http://schemas.microsoft.com/office/drawing/2010/main">
                   <a:solidFill>
                     <a:srgbClr val="FFFFFF"/>
@@ -11479,7 +11450,7 @@
               <a:tailEnd/>
             </a:ln>
             <a:extLst>
-              <a:ext uri="{909E8E84-426E-40dd-AFC4-6F175D3DCCD1}">
+              <a:ext uri="{909E8E84-426E-40DD-AFC4-6F175D3DCCD1}">
                 <a14:hiddenFill xmlns:a14="http://schemas.microsoft.com/office/drawing/2010/main">
                   <a:solidFill>
                     <a:srgbClr val="FFFFFF"/>
@@ -11534,7 +11505,7 @@
               <a:tailEnd type="arrow" w="med" len="med"/>
             </a:ln>
             <a:extLst>
-              <a:ext uri="{909E8E84-426E-40dd-AFC4-6F175D3DCCD1}">
+              <a:ext uri="{909E8E84-426E-40DD-AFC4-6F175D3DCCD1}">
                 <a14:hiddenFill xmlns:a14="http://schemas.microsoft.com/office/drawing/2010/main">
                   <a:noFill/>
                 </a14:hiddenFill>
@@ -11571,7 +11542,7 @@
               <a:tailEnd type="arrow" w="med" len="med"/>
             </a:ln>
             <a:extLst>
-              <a:ext uri="{909E8E84-426E-40dd-AFC4-6F175D3DCCD1}">
+              <a:ext uri="{909E8E84-426E-40DD-AFC4-6F175D3DCCD1}">
                 <a14:hiddenFill xmlns:a14="http://schemas.microsoft.com/office/drawing/2010/main">
                   <a:noFill/>
                 </a14:hiddenFill>
@@ -11607,7 +11578,7 @@
               <a:tailEnd type="arrow" w="med" len="med"/>
             </a:ln>
             <a:extLst>
-              <a:ext uri="{909E8E84-426E-40dd-AFC4-6F175D3DCCD1}">
+              <a:ext uri="{909E8E84-426E-40DD-AFC4-6F175D3DCCD1}">
                 <a14:hiddenFill xmlns:a14="http://schemas.microsoft.com/office/drawing/2010/main">
                   <a:noFill/>
                 </a14:hiddenFill>
@@ -11643,7 +11614,7 @@
               <a:tailEnd type="arrow" w="med" len="med"/>
             </a:ln>
             <a:extLst>
-              <a:ext uri="{909E8E84-426E-40dd-AFC4-6F175D3DCCD1}">
+              <a:ext uri="{909E8E84-426E-40DD-AFC4-6F175D3DCCD1}">
                 <a14:hiddenFill xmlns:a14="http://schemas.microsoft.com/office/drawing/2010/main">
                   <a:noFill/>
                 </a14:hiddenFill>
@@ -11681,7 +11652,7 @@
               <a:tailEnd type="arrow" w="med" len="med"/>
             </a:ln>
             <a:extLst>
-              <a:ext uri="{909E8E84-426E-40dd-AFC4-6F175D3DCCD1}">
+              <a:ext uri="{909E8E84-426E-40DD-AFC4-6F175D3DCCD1}">
                 <a14:hiddenFill xmlns:a14="http://schemas.microsoft.com/office/drawing/2010/main">
                   <a:noFill/>
                 </a14:hiddenFill>
@@ -12300,7 +12271,7 @@
               <a:tailEnd/>
             </a:ln>
             <a:extLst>
-              <a:ext uri="{909E8E84-426E-40dd-AFC4-6F175D3DCCD1}">
+              <a:ext uri="{909E8E84-426E-40DD-AFC4-6F175D3DCCD1}">
                 <a14:hiddenFill xmlns:a14="http://schemas.microsoft.com/office/drawing/2010/main">
                   <a:solidFill>
                     <a:srgbClr val="FFFFFF"/>
@@ -12366,7 +12337,7 @@
               <a:tailEnd type="arrow" w="med" len="med"/>
             </a:ln>
             <a:extLst>
-              <a:ext uri="{909E8E84-426E-40dd-AFC4-6F175D3DCCD1}">
+              <a:ext uri="{909E8E84-426E-40DD-AFC4-6F175D3DCCD1}">
                 <a14:hiddenFill xmlns:a14="http://schemas.microsoft.com/office/drawing/2010/main">
                   <a:noFill/>
                 </a14:hiddenFill>
@@ -12400,7 +12371,7 @@
               <a:tailEnd/>
             </a:ln>
             <a:extLst>
-              <a:ext uri="{909E8E84-426E-40dd-AFC4-6F175D3DCCD1}">
+              <a:ext uri="{909E8E84-426E-40DD-AFC4-6F175D3DCCD1}">
                 <a14:hiddenFill xmlns:a14="http://schemas.microsoft.com/office/drawing/2010/main">
                   <a:solidFill>
                     <a:srgbClr val="FFFFFF"/>
@@ -12466,7 +12437,7 @@
               <a:tailEnd type="arrow" w="med" len="med"/>
             </a:ln>
             <a:extLst>
-              <a:ext uri="{909E8E84-426E-40dd-AFC4-6F175D3DCCD1}">
+              <a:ext uri="{909E8E84-426E-40DD-AFC4-6F175D3DCCD1}">
                 <a14:hiddenFill xmlns:a14="http://schemas.microsoft.com/office/drawing/2010/main">
                   <a:noFill/>
                 </a14:hiddenFill>
@@ -12552,7 +12523,7 @@
               <a:tailEnd/>
             </a:ln>
             <a:extLst>
-              <a:ext uri="{909E8E84-426E-40dd-AFC4-6F175D3DCCD1}">
+              <a:ext uri="{909E8E84-426E-40DD-AFC4-6F175D3DCCD1}">
                 <a14:hiddenFill xmlns:a14="http://schemas.microsoft.com/office/drawing/2010/main">
                   <a:solidFill>
                     <a:srgbClr val="FFFFFF"/>
@@ -12602,7 +12573,7 @@
               <a:tailEnd type="arrow" w="med" len="med"/>
             </a:ln>
             <a:extLst>
-              <a:ext uri="{909E8E84-426E-40dd-AFC4-6F175D3DCCD1}">
+              <a:ext uri="{909E8E84-426E-40DD-AFC4-6F175D3DCCD1}">
                 <a14:hiddenFill xmlns:a14="http://schemas.microsoft.com/office/drawing/2010/main">
                   <a:noFill/>
                 </a14:hiddenFill>
@@ -12636,7 +12607,7 @@
               <a:tailEnd/>
             </a:ln>
             <a:extLst>
-              <a:ext uri="{909E8E84-426E-40dd-AFC4-6F175D3DCCD1}">
+              <a:ext uri="{909E8E84-426E-40DD-AFC4-6F175D3DCCD1}">
                 <a14:hiddenFill xmlns:a14="http://schemas.microsoft.com/office/drawing/2010/main">
                   <a:solidFill>
                     <a:srgbClr val="FFFFFF"/>
@@ -12686,7 +12657,7 @@
               <a:tailEnd type="arrow" w="med" len="med"/>
             </a:ln>
             <a:extLst>
-              <a:ext uri="{909E8E84-426E-40dd-AFC4-6F175D3DCCD1}">
+              <a:ext uri="{909E8E84-426E-40DD-AFC4-6F175D3DCCD1}">
                 <a14:hiddenFill xmlns:a14="http://schemas.microsoft.com/office/drawing/2010/main">
                   <a:noFill/>
                 </a14:hiddenFill>
@@ -12720,7 +12691,7 @@
               <a:tailEnd/>
             </a:ln>
             <a:extLst>
-              <a:ext uri="{909E8E84-426E-40dd-AFC4-6F175D3DCCD1}">
+              <a:ext uri="{909E8E84-426E-40DD-AFC4-6F175D3DCCD1}">
                 <a14:hiddenFill xmlns:a14="http://schemas.microsoft.com/office/drawing/2010/main">
                   <a:solidFill>
                     <a:srgbClr val="FFFFFF"/>
@@ -12770,7 +12741,7 @@
               <a:tailEnd type="arrow" w="med" len="med"/>
             </a:ln>
             <a:extLst>
-              <a:ext uri="{909E8E84-426E-40dd-AFC4-6F175D3DCCD1}">
+              <a:ext uri="{909E8E84-426E-40DD-AFC4-6F175D3DCCD1}">
                 <a14:hiddenFill xmlns:a14="http://schemas.microsoft.com/office/drawing/2010/main">
                   <a:noFill/>
                 </a14:hiddenFill>
@@ -12856,7 +12827,7 @@
               <a:tailEnd/>
             </a:ln>
             <a:extLst>
-              <a:ext uri="{909E8E84-426E-40dd-AFC4-6F175D3DCCD1}">
+              <a:ext uri="{909E8E84-426E-40DD-AFC4-6F175D3DCCD1}">
                 <a14:hiddenFill xmlns:a14="http://schemas.microsoft.com/office/drawing/2010/main">
                   <a:solidFill>
                     <a:srgbClr val="FFFFFF"/>
@@ -12906,7 +12877,7 @@
               <a:tailEnd type="arrow" w="med" len="med"/>
             </a:ln>
             <a:extLst>
-              <a:ext uri="{909E8E84-426E-40dd-AFC4-6F175D3DCCD1}">
+              <a:ext uri="{909E8E84-426E-40DD-AFC4-6F175D3DCCD1}">
                 <a14:hiddenFill xmlns:a14="http://schemas.microsoft.com/office/drawing/2010/main">
                   <a:noFill/>
                 </a14:hiddenFill>
@@ -12940,7 +12911,7 @@
               <a:tailEnd/>
             </a:ln>
             <a:extLst>
-              <a:ext uri="{909E8E84-426E-40dd-AFC4-6F175D3DCCD1}">
+              <a:ext uri="{909E8E84-426E-40DD-AFC4-6F175D3DCCD1}">
                 <a14:hiddenFill xmlns:a14="http://schemas.microsoft.com/office/drawing/2010/main">
                   <a:solidFill>
                     <a:srgbClr val="FFFFFF"/>
@@ -12990,7 +12961,7 @@
               <a:tailEnd type="arrow" w="med" len="med"/>
             </a:ln>
             <a:extLst>
-              <a:ext uri="{909E8E84-426E-40dd-AFC4-6F175D3DCCD1}">
+              <a:ext uri="{909E8E84-426E-40DD-AFC4-6F175D3DCCD1}">
                 <a14:hiddenFill xmlns:a14="http://schemas.microsoft.com/office/drawing/2010/main">
                   <a:noFill/>
                 </a14:hiddenFill>
@@ -13024,7 +12995,7 @@
               <a:tailEnd/>
             </a:ln>
             <a:extLst>
-              <a:ext uri="{909E8E84-426E-40dd-AFC4-6F175D3DCCD1}">
+              <a:ext uri="{909E8E84-426E-40DD-AFC4-6F175D3DCCD1}">
                 <a14:hiddenFill xmlns:a14="http://schemas.microsoft.com/office/drawing/2010/main">
                   <a:solidFill>
                     <a:srgbClr val="FFFFFF"/>
@@ -13074,7 +13045,7 @@
               <a:tailEnd type="arrow" w="med" len="med"/>
             </a:ln>
             <a:extLst>
-              <a:ext uri="{909E8E84-426E-40dd-AFC4-6F175D3DCCD1}">
+              <a:ext uri="{909E8E84-426E-40DD-AFC4-6F175D3DCCD1}">
                 <a14:hiddenFill xmlns:a14="http://schemas.microsoft.com/office/drawing/2010/main">
                   <a:noFill/>
                 </a14:hiddenFill>
@@ -13160,7 +13131,7 @@
               <a:tailEnd/>
             </a:ln>
             <a:extLst>
-              <a:ext uri="{909E8E84-426E-40dd-AFC4-6F175D3DCCD1}">
+              <a:ext uri="{909E8E84-426E-40DD-AFC4-6F175D3DCCD1}">
                 <a14:hiddenFill xmlns:a14="http://schemas.microsoft.com/office/drawing/2010/main">
                   <a:solidFill>
                     <a:srgbClr val="FFFFFF"/>
@@ -13210,7 +13181,7 @@
               <a:tailEnd type="arrow" w="med" len="med"/>
             </a:ln>
             <a:extLst>
-              <a:ext uri="{909E8E84-426E-40dd-AFC4-6F175D3DCCD1}">
+              <a:ext uri="{909E8E84-426E-40DD-AFC4-6F175D3DCCD1}">
                 <a14:hiddenFill xmlns:a14="http://schemas.microsoft.com/office/drawing/2010/main">
                   <a:noFill/>
                 </a14:hiddenFill>
@@ -13244,7 +13215,7 @@
               <a:tailEnd/>
             </a:ln>
             <a:extLst>
-              <a:ext uri="{909E8E84-426E-40dd-AFC4-6F175D3DCCD1}">
+              <a:ext uri="{909E8E84-426E-40DD-AFC4-6F175D3DCCD1}">
                 <a14:hiddenFill xmlns:a14="http://schemas.microsoft.com/office/drawing/2010/main">
                   <a:solidFill>
                     <a:srgbClr val="FFFFFF"/>
@@ -13294,7 +13265,7 @@
               <a:tailEnd type="arrow" w="med" len="med"/>
             </a:ln>
             <a:extLst>
-              <a:ext uri="{909E8E84-426E-40dd-AFC4-6F175D3DCCD1}">
+              <a:ext uri="{909E8E84-426E-40DD-AFC4-6F175D3DCCD1}">
                 <a14:hiddenFill xmlns:a14="http://schemas.microsoft.com/office/drawing/2010/main">
                   <a:noFill/>
                 </a14:hiddenFill>
@@ -13328,7 +13299,7 @@
               <a:tailEnd/>
             </a:ln>
             <a:extLst>
-              <a:ext uri="{909E8E84-426E-40dd-AFC4-6F175D3DCCD1}">
+              <a:ext uri="{909E8E84-426E-40DD-AFC4-6F175D3DCCD1}">
                 <a14:hiddenFill xmlns:a14="http://schemas.microsoft.com/office/drawing/2010/main">
                   <a:solidFill>
                     <a:srgbClr val="FFFFFF"/>
@@ -13378,7 +13349,7 @@
               <a:tailEnd type="arrow" w="med" len="med"/>
             </a:ln>
             <a:extLst>
-              <a:ext uri="{909E8E84-426E-40dd-AFC4-6F175D3DCCD1}">
+              <a:ext uri="{909E8E84-426E-40DD-AFC4-6F175D3DCCD1}">
                 <a14:hiddenFill xmlns:a14="http://schemas.microsoft.com/office/drawing/2010/main">
                   <a:noFill/>
                 </a14:hiddenFill>
@@ -13518,7 +13489,7 @@
               <a:tailEnd/>
             </a:ln>
             <a:extLst>
-              <a:ext uri="{909E8E84-426E-40dd-AFC4-6F175D3DCCD1}">
+              <a:ext uri="{909E8E84-426E-40DD-AFC4-6F175D3DCCD1}">
                 <a14:hiddenFill xmlns:a14="http://schemas.microsoft.com/office/drawing/2010/main">
                   <a:solidFill>
                     <a:srgbClr val="FFFFFF"/>
@@ -13584,7 +13555,7 @@
               <a:tailEnd type="arrow" w="med" len="med"/>
             </a:ln>
             <a:extLst>
-              <a:ext uri="{909E8E84-426E-40dd-AFC4-6F175D3DCCD1}">
+              <a:ext uri="{909E8E84-426E-40DD-AFC4-6F175D3DCCD1}">
                 <a14:hiddenFill xmlns:a14="http://schemas.microsoft.com/office/drawing/2010/main">
                   <a:noFill/>
                 </a14:hiddenFill>
@@ -13618,7 +13589,7 @@
               <a:tailEnd/>
             </a:ln>
             <a:extLst>
-              <a:ext uri="{909E8E84-426E-40dd-AFC4-6F175D3DCCD1}">
+              <a:ext uri="{909E8E84-426E-40DD-AFC4-6F175D3DCCD1}">
                 <a14:hiddenFill xmlns:a14="http://schemas.microsoft.com/office/drawing/2010/main">
                   <a:solidFill>
                     <a:srgbClr val="FFFFFF"/>
@@ -13684,7 +13655,7 @@
               <a:tailEnd type="arrow" w="med" len="med"/>
             </a:ln>
             <a:extLst>
-              <a:ext uri="{909E8E84-426E-40dd-AFC4-6F175D3DCCD1}">
+              <a:ext uri="{909E8E84-426E-40DD-AFC4-6F175D3DCCD1}">
                 <a14:hiddenFill xmlns:a14="http://schemas.microsoft.com/office/drawing/2010/main">
                   <a:noFill/>
                 </a14:hiddenFill>
@@ -13718,7 +13689,7 @@
               <a:tailEnd/>
             </a:ln>
             <a:extLst>
-              <a:ext uri="{909E8E84-426E-40dd-AFC4-6F175D3DCCD1}">
+              <a:ext uri="{909E8E84-426E-40DD-AFC4-6F175D3DCCD1}">
                 <a14:hiddenFill xmlns:a14="http://schemas.microsoft.com/office/drawing/2010/main">
                   <a:solidFill>
                     <a:srgbClr val="FFFFFF"/>
@@ -13784,7 +13755,7 @@
               <a:tailEnd type="arrow" w="med" len="med"/>
             </a:ln>
             <a:extLst>
-              <a:ext uri="{909E8E84-426E-40dd-AFC4-6F175D3DCCD1}">
+              <a:ext uri="{909E8E84-426E-40DD-AFC4-6F175D3DCCD1}">
                 <a14:hiddenFill xmlns:a14="http://schemas.microsoft.com/office/drawing/2010/main">
                   <a:noFill/>
                 </a14:hiddenFill>
@@ -13902,10 +13873,10 @@
         </p:nvGrpSpPr>
         <p:grpSpPr>
           <a:xfrm>
-            <a:off x="6012431" y="1865370"/>
-            <a:ext cx="1381207" cy="324990"/>
+            <a:off x="6079171" y="1865370"/>
+            <a:ext cx="920701" cy="324990"/>
             <a:chOff x="880057" y="5427842"/>
-            <a:chExt cx="3886200" cy="914400"/>
+            <a:chExt cx="2590508" cy="914400"/>
           </a:xfrm>
         </p:grpSpPr>
         <p:sp>
@@ -13951,106 +13922,6 @@
         </p:sp>
         <p:sp>
           <p:nvSpPr>
-            <p:cNvPr id="210" name="Oval 106"/>
-            <p:cNvSpPr>
-              <a:spLocks noChangeArrowheads="1"/>
-            </p:cNvSpPr>
-            <p:nvPr/>
-          </p:nvSpPr>
-          <p:spPr bwMode="auto">
-            <a:xfrm>
-              <a:off x="2023057" y="5427842"/>
-              <a:ext cx="914400" cy="914400"/>
-            </a:xfrm>
-            <a:prstGeom prst="ellipse">
-              <a:avLst/>
-            </a:prstGeom>
-            <a:noFill/>
-            <a:ln w="19050">
-              <a:solidFill>
-                <a:schemeClr val="bg1"/>
-              </a:solidFill>
-              <a:round/>
-              <a:headEnd/>
-              <a:tailEnd/>
-            </a:ln>
-            <a:extLst>
-              <a:ext uri="{909E8E84-426E-40dd-AFC4-6F175D3DCCD1}">
-                <a14:hiddenFill xmlns:a14="http://schemas.microsoft.com/office/drawing/2010/main">
-                  <a:solidFill>
-                    <a:srgbClr val="FFFFFF"/>
-                  </a:solidFill>
-                </a14:hiddenFill>
-              </a:ext>
-            </a:extLst>
-          </p:spPr>
-          <p:txBody>
-            <a:bodyPr lIns="0" tIns="0" rIns="0" bIns="0" anchor="ctr"/>
-            <a:lstStyle/>
-            <a:p>
-              <a:pPr algn="ctr" defTabSz="3657600"/>
-              <a:r>
-                <a:rPr lang="en-US" sz="1050" dirty="0" smtClean="0">
-                  <a:solidFill>
-                    <a:srgbClr val="FEFEFE"/>
-                  </a:solidFill>
-                </a:rPr>
-                <a:t>SID</a:t>
-              </a:r>
-              <a:r>
-                <a:rPr lang="en-US" sz="1050" baseline="-25000" dirty="0" smtClean="0">
-                  <a:solidFill>
-                    <a:srgbClr val="FEFEFE"/>
-                  </a:solidFill>
-                </a:rPr>
-                <a:t>P</a:t>
-              </a:r>
-              <a:endParaRPr lang="en-US" sz="1050" baseline="-25000" dirty="0">
-                <a:solidFill>
-                  <a:srgbClr val="FEFEFE"/>
-                </a:solidFill>
-              </a:endParaRPr>
-            </a:p>
-          </p:txBody>
-        </p:sp>
-        <p:cxnSp>
-          <p:nvCxnSpPr>
-            <p:cNvPr id="211" name="Straight Arrow Connector 107"/>
-            <p:cNvCxnSpPr>
-              <a:cxnSpLocks noChangeShapeType="1"/>
-              <a:stCxn id="209" idx="6"/>
-              <a:endCxn id="210" idx="2"/>
-            </p:cNvCxnSpPr>
-            <p:nvPr/>
-          </p:nvCxnSpPr>
-          <p:spPr bwMode="auto">
-            <a:xfrm>
-              <a:off x="1108657" y="5885042"/>
-              <a:ext cx="914400" cy="0"/>
-            </a:xfrm>
-            <a:prstGeom prst="straightConnector1">
-              <a:avLst/>
-            </a:prstGeom>
-            <a:noFill/>
-            <a:ln w="19050">
-              <a:solidFill>
-                <a:schemeClr val="bg1"/>
-              </a:solidFill>
-              <a:round/>
-              <a:headEnd/>
-              <a:tailEnd type="arrow" w="med" len="med"/>
-            </a:ln>
-            <a:extLst>
-              <a:ext uri="{909E8E84-426E-40dd-AFC4-6F175D3DCCD1}">
-                <a14:hiddenFill xmlns:a14="http://schemas.microsoft.com/office/drawing/2010/main">
-                  <a:noFill/>
-                </a14:hiddenFill>
-              </a:ext>
-            </a:extLst>
-          </p:spPr>
-        </p:cxnSp>
-        <p:sp>
-          <p:nvSpPr>
             <p:cNvPr id="212" name="Oval 108"/>
             <p:cNvSpPr>
               <a:spLocks noChangeArrowheads="1"/>
@@ -14059,7 +13930,7 @@
           </p:nvSpPr>
           <p:spPr bwMode="auto">
             <a:xfrm>
-              <a:off x="3851857" y="5427842"/>
+              <a:off x="2556165" y="5427842"/>
               <a:ext cx="914400" cy="914400"/>
             </a:xfrm>
             <a:prstGeom prst="ellipse">
@@ -14075,7 +13946,7 @@
               <a:tailEnd/>
             </a:ln>
             <a:extLst>
-              <a:ext uri="{909E8E84-426E-40dd-AFC4-6F175D3DCCD1}">
+              <a:ext uri="{909E8E84-426E-40DD-AFC4-6F175D3DCCD1}">
                 <a14:hiddenFill xmlns:a14="http://schemas.microsoft.com/office/drawing/2010/main">
                   <a:solidFill>
                     <a:srgbClr val="FFFFFF"/>
@@ -14118,15 +13989,15 @@
             <p:cNvPr id="213" name="Straight Arrow Connector 109"/>
             <p:cNvCxnSpPr>
               <a:cxnSpLocks noChangeShapeType="1"/>
-              <a:stCxn id="210" idx="6"/>
+              <a:stCxn id="209" idx="6"/>
               <a:endCxn id="212" idx="2"/>
             </p:cNvCxnSpPr>
             <p:nvPr/>
           </p:nvCxnSpPr>
           <p:spPr bwMode="auto">
             <a:xfrm>
-              <a:off x="2937457" y="5885042"/>
-              <a:ext cx="914400" cy="0"/>
+              <a:off x="1108656" y="5885042"/>
+              <a:ext cx="1447509" cy="0"/>
             </a:xfrm>
             <a:prstGeom prst="straightConnector1">
               <a:avLst/>
@@ -14141,7 +14012,7 @@
               <a:tailEnd type="arrow" w="med" len="med"/>
             </a:ln>
             <a:extLst>
-              <a:ext uri="{909E8E84-426E-40dd-AFC4-6F175D3DCCD1}">
+              <a:ext uri="{909E8E84-426E-40DD-AFC4-6F175D3DCCD1}">
                 <a14:hiddenFill xmlns:a14="http://schemas.microsoft.com/office/drawing/2010/main">
                   <a:noFill/>
                 </a14:hiddenFill>
@@ -14281,7 +14152,7 @@
               <a:tailEnd/>
             </a:ln>
             <a:extLst>
-              <a:ext uri="{909E8E84-426E-40dd-AFC4-6F175D3DCCD1}">
+              <a:ext uri="{909E8E84-426E-40DD-AFC4-6F175D3DCCD1}">
                 <a14:hiddenFill xmlns:a14="http://schemas.microsoft.com/office/drawing/2010/main">
                   <a:solidFill>
                     <a:srgbClr val="FFFFFF"/>
@@ -14342,7 +14213,7 @@
               <a:tailEnd type="arrow" w="med" len="med"/>
             </a:ln>
             <a:extLst>
-              <a:ext uri="{909E8E84-426E-40dd-AFC4-6F175D3DCCD1}">
+              <a:ext uri="{909E8E84-426E-40DD-AFC4-6F175D3DCCD1}">
                 <a14:hiddenFill xmlns:a14="http://schemas.microsoft.com/office/drawing/2010/main">
                   <a:noFill/>
                 </a14:hiddenFill>
@@ -14376,7 +14247,7 @@
               <a:tailEnd/>
             </a:ln>
             <a:extLst>
-              <a:ext uri="{909E8E84-426E-40dd-AFC4-6F175D3DCCD1}">
+              <a:ext uri="{909E8E84-426E-40DD-AFC4-6F175D3DCCD1}">
                 <a14:hiddenFill xmlns:a14="http://schemas.microsoft.com/office/drawing/2010/main">
                   <a:solidFill>
                     <a:srgbClr val="FFFFFF"/>
@@ -14442,7 +14313,7 @@
               <a:tailEnd type="arrow" w="med" len="med"/>
             </a:ln>
             <a:extLst>
-              <a:ext uri="{909E8E84-426E-40dd-AFC4-6F175D3DCCD1}">
+              <a:ext uri="{909E8E84-426E-40DD-AFC4-6F175D3DCCD1}">
                 <a14:hiddenFill xmlns:a14="http://schemas.microsoft.com/office/drawing/2010/main">
                   <a:noFill/>
                 </a14:hiddenFill>
@@ -14476,7 +14347,7 @@
               <a:tailEnd/>
             </a:ln>
             <a:extLst>
-              <a:ext uri="{909E8E84-426E-40dd-AFC4-6F175D3DCCD1}">
+              <a:ext uri="{909E8E84-426E-40DD-AFC4-6F175D3DCCD1}">
                 <a14:hiddenFill xmlns:a14="http://schemas.microsoft.com/office/drawing/2010/main">
                   <a:solidFill>
                     <a:srgbClr val="FFFFFF"/>
@@ -14542,7 +14413,7 @@
               <a:tailEnd type="arrow" w="med" len="med"/>
             </a:ln>
             <a:extLst>
-              <a:ext uri="{909E8E84-426E-40dd-AFC4-6F175D3DCCD1}">
+              <a:ext uri="{909E8E84-426E-40DD-AFC4-6F175D3DCCD1}">
                 <a14:hiddenFill xmlns:a14="http://schemas.microsoft.com/office/drawing/2010/main">
                   <a:noFill/>
                 </a14:hiddenFill>
@@ -14783,7 +14654,7 @@
               <a:tailEnd/>
             </a:ln>
             <a:extLst>
-              <a:ext uri="{909E8E84-426E-40dd-AFC4-6F175D3DCCD1}">
+              <a:ext uri="{909E8E84-426E-40DD-AFC4-6F175D3DCCD1}">
                 <a14:hiddenFill xmlns:a14="http://schemas.microsoft.com/office/drawing/2010/main">
                   <a:solidFill>
                     <a:srgbClr val="FFFFFF"/>
@@ -14844,7 +14715,7 @@
               <a:tailEnd type="arrow" w="med" len="med"/>
             </a:ln>
             <a:extLst>
-              <a:ext uri="{909E8E84-426E-40dd-AFC4-6F175D3DCCD1}">
+              <a:ext uri="{909E8E84-426E-40DD-AFC4-6F175D3DCCD1}">
                 <a14:hiddenFill xmlns:a14="http://schemas.microsoft.com/office/drawing/2010/main">
                   <a:noFill/>
                 </a14:hiddenFill>
@@ -14878,7 +14749,7 @@
               <a:tailEnd/>
             </a:ln>
             <a:extLst>
-              <a:ext uri="{909E8E84-426E-40dd-AFC4-6F175D3DCCD1}">
+              <a:ext uri="{909E8E84-426E-40DD-AFC4-6F175D3DCCD1}">
                 <a14:hiddenFill xmlns:a14="http://schemas.microsoft.com/office/drawing/2010/main">
                   <a:solidFill>
                     <a:srgbClr val="FFFFFF"/>
@@ -14944,7 +14815,7 @@
               <a:tailEnd type="arrow" w="med" len="med"/>
             </a:ln>
             <a:extLst>
-              <a:ext uri="{909E8E84-426E-40dd-AFC4-6F175D3DCCD1}">
+              <a:ext uri="{909E8E84-426E-40DD-AFC4-6F175D3DCCD1}">
                 <a14:hiddenFill xmlns:a14="http://schemas.microsoft.com/office/drawing/2010/main">
                   <a:noFill/>
                 </a14:hiddenFill>
@@ -14978,7 +14849,7 @@
               <a:tailEnd/>
             </a:ln>
             <a:extLst>
-              <a:ext uri="{909E8E84-426E-40dd-AFC4-6F175D3DCCD1}">
+              <a:ext uri="{909E8E84-426E-40DD-AFC4-6F175D3DCCD1}">
                 <a14:hiddenFill xmlns:a14="http://schemas.microsoft.com/office/drawing/2010/main">
                   <a:solidFill>
                     <a:srgbClr val="FFFFFF"/>
@@ -15044,7 +14915,7 @@
               <a:tailEnd type="arrow" w="med" len="med"/>
             </a:ln>
             <a:extLst>
-              <a:ext uri="{909E8E84-426E-40dd-AFC4-6F175D3DCCD1}">
+              <a:ext uri="{909E8E84-426E-40DD-AFC4-6F175D3DCCD1}">
                 <a14:hiddenFill xmlns:a14="http://schemas.microsoft.com/office/drawing/2010/main">
                   <a:noFill/>
                 </a14:hiddenFill>
@@ -15185,7 +15056,7 @@
               <a:tailEnd/>
             </a:ln>
             <a:extLst>
-              <a:ext uri="{909E8E84-426E-40dd-AFC4-6F175D3DCCD1}">
+              <a:ext uri="{909E8E84-426E-40DD-AFC4-6F175D3DCCD1}">
                 <a14:hiddenFill xmlns:a14="http://schemas.microsoft.com/office/drawing/2010/main">
                   <a:solidFill>
                     <a:srgbClr val="FFFFFF"/>
@@ -15251,7 +15122,7 @@
               <a:tailEnd type="arrow" w="med" len="med"/>
             </a:ln>
             <a:extLst>
-              <a:ext uri="{909E8E84-426E-40dd-AFC4-6F175D3DCCD1}">
+              <a:ext uri="{909E8E84-426E-40DD-AFC4-6F175D3DCCD1}">
                 <a14:hiddenFill xmlns:a14="http://schemas.microsoft.com/office/drawing/2010/main">
                   <a:noFill/>
                 </a14:hiddenFill>
@@ -15285,7 +15156,7 @@
               <a:tailEnd/>
             </a:ln>
             <a:extLst>
-              <a:ext uri="{909E8E84-426E-40dd-AFC4-6F175D3DCCD1}">
+              <a:ext uri="{909E8E84-426E-40DD-AFC4-6F175D3DCCD1}">
                 <a14:hiddenFill xmlns:a14="http://schemas.microsoft.com/office/drawing/2010/main">
                   <a:solidFill>
                     <a:srgbClr val="FFFFFF"/>
@@ -15351,7 +15222,7 @@
               <a:tailEnd type="arrow" w="med" len="med"/>
             </a:ln>
             <a:extLst>
-              <a:ext uri="{909E8E84-426E-40dd-AFC4-6F175D3DCCD1}">
+              <a:ext uri="{909E8E84-426E-40DD-AFC4-6F175D3DCCD1}">
                 <a14:hiddenFill xmlns:a14="http://schemas.microsoft.com/office/drawing/2010/main">
                   <a:noFill/>
                 </a14:hiddenFill>
@@ -15385,7 +15256,7 @@
               <a:tailEnd/>
             </a:ln>
             <a:extLst>
-              <a:ext uri="{909E8E84-426E-40dd-AFC4-6F175D3DCCD1}">
+              <a:ext uri="{909E8E84-426E-40DD-AFC4-6F175D3DCCD1}">
                 <a14:hiddenFill xmlns:a14="http://schemas.microsoft.com/office/drawing/2010/main">
                   <a:solidFill>
                     <a:srgbClr val="FFFFFF"/>
@@ -15451,7 +15322,7 @@
               <a:tailEnd type="arrow" w="med" len="med"/>
             </a:ln>
             <a:extLst>
-              <a:ext uri="{909E8E84-426E-40dd-AFC4-6F175D3DCCD1}">
+              <a:ext uri="{909E8E84-426E-40DD-AFC4-6F175D3DCCD1}">
                 <a14:hiddenFill xmlns:a14="http://schemas.microsoft.com/office/drawing/2010/main">
                   <a:noFill/>
                 </a14:hiddenFill>
@@ -15641,7 +15512,7 @@
               <a:tailEnd/>
             </a:ln>
             <a:extLst>
-              <a:ext uri="{909E8E84-426E-40dd-AFC4-6F175D3DCCD1}">
+              <a:ext uri="{909E8E84-426E-40DD-AFC4-6F175D3DCCD1}">
                 <a14:hiddenFill xmlns:a14="http://schemas.microsoft.com/office/drawing/2010/main">
                   <a:solidFill>
                     <a:srgbClr val="FFFFFF"/>
@@ -15707,7 +15578,7 @@
               <a:tailEnd type="arrow" w="med" len="med"/>
             </a:ln>
             <a:extLst>
-              <a:ext uri="{909E8E84-426E-40dd-AFC4-6F175D3DCCD1}">
+              <a:ext uri="{909E8E84-426E-40DD-AFC4-6F175D3DCCD1}">
                 <a14:hiddenFill xmlns:a14="http://schemas.microsoft.com/office/drawing/2010/main">
                   <a:noFill/>
                 </a14:hiddenFill>
@@ -15741,7 +15612,7 @@
               <a:tailEnd/>
             </a:ln>
             <a:extLst>
-              <a:ext uri="{909E8E84-426E-40dd-AFC4-6F175D3DCCD1}">
+              <a:ext uri="{909E8E84-426E-40DD-AFC4-6F175D3DCCD1}">
                 <a14:hiddenFill xmlns:a14="http://schemas.microsoft.com/office/drawing/2010/main">
                   <a:solidFill>
                     <a:srgbClr val="FFFFFF"/>
@@ -15807,7 +15678,7 @@
               <a:tailEnd type="arrow" w="med" len="med"/>
             </a:ln>
             <a:extLst>
-              <a:ext uri="{909E8E84-426E-40dd-AFC4-6F175D3DCCD1}">
+              <a:ext uri="{909E8E84-426E-40DD-AFC4-6F175D3DCCD1}">
                 <a14:hiddenFill xmlns:a14="http://schemas.microsoft.com/office/drawing/2010/main">
                   <a:noFill/>
                 </a14:hiddenFill>
@@ -15841,7 +15712,7 @@
               <a:tailEnd/>
             </a:ln>
             <a:extLst>
-              <a:ext uri="{909E8E84-426E-40dd-AFC4-6F175D3DCCD1}">
+              <a:ext uri="{909E8E84-426E-40DD-AFC4-6F175D3DCCD1}">
                 <a14:hiddenFill xmlns:a14="http://schemas.microsoft.com/office/drawing/2010/main">
                   <a:solidFill>
                     <a:srgbClr val="FFFFFF"/>
@@ -15907,7 +15778,7 @@
               <a:tailEnd type="arrow" w="med" len="med"/>
             </a:ln>
             <a:extLst>
-              <a:ext uri="{909E8E84-426E-40dd-AFC4-6F175D3DCCD1}">
+              <a:ext uri="{909E8E84-426E-40DD-AFC4-6F175D3DCCD1}">
                 <a14:hiddenFill xmlns:a14="http://schemas.microsoft.com/office/drawing/2010/main">
                   <a:noFill/>
                 </a14:hiddenFill>
@@ -16048,7 +15919,7 @@
               <a:tailEnd/>
             </a:ln>
             <a:extLst>
-              <a:ext uri="{909E8E84-426E-40dd-AFC4-6F175D3DCCD1}">
+              <a:ext uri="{909E8E84-426E-40DD-AFC4-6F175D3DCCD1}">
                 <a14:hiddenFill xmlns:a14="http://schemas.microsoft.com/office/drawing/2010/main">
                   <a:solidFill>
                     <a:srgbClr val="FFFFFF"/>
@@ -16114,7 +15985,7 @@
               <a:tailEnd type="arrow" w="med" len="med"/>
             </a:ln>
             <a:extLst>
-              <a:ext uri="{909E8E84-426E-40dd-AFC4-6F175D3DCCD1}">
+              <a:ext uri="{909E8E84-426E-40DD-AFC4-6F175D3DCCD1}">
                 <a14:hiddenFill xmlns:a14="http://schemas.microsoft.com/office/drawing/2010/main">
                   <a:noFill/>
                 </a14:hiddenFill>
@@ -16148,7 +16019,7 @@
               <a:tailEnd/>
             </a:ln>
             <a:extLst>
-              <a:ext uri="{909E8E84-426E-40dd-AFC4-6F175D3DCCD1}">
+              <a:ext uri="{909E8E84-426E-40DD-AFC4-6F175D3DCCD1}">
                 <a14:hiddenFill xmlns:a14="http://schemas.microsoft.com/office/drawing/2010/main">
                   <a:solidFill>
                     <a:srgbClr val="FFFFFF"/>
@@ -16214,7 +16085,7 @@
               <a:tailEnd type="arrow" w="med" len="med"/>
             </a:ln>
             <a:extLst>
-              <a:ext uri="{909E8E84-426E-40dd-AFC4-6F175D3DCCD1}">
+              <a:ext uri="{909E8E84-426E-40DD-AFC4-6F175D3DCCD1}">
                 <a14:hiddenFill xmlns:a14="http://schemas.microsoft.com/office/drawing/2010/main">
                   <a:noFill/>
                 </a14:hiddenFill>
@@ -16248,7 +16119,7 @@
               <a:tailEnd/>
             </a:ln>
             <a:extLst>
-              <a:ext uri="{909E8E84-426E-40dd-AFC4-6F175D3DCCD1}">
+              <a:ext uri="{909E8E84-426E-40DD-AFC4-6F175D3DCCD1}">
                 <a14:hiddenFill xmlns:a14="http://schemas.microsoft.com/office/drawing/2010/main">
                   <a:solidFill>
                     <a:srgbClr val="FFFFFF"/>
@@ -16314,7 +16185,7 @@
               <a:tailEnd type="arrow" w="med" len="med"/>
             </a:ln>
             <a:extLst>
-              <a:ext uri="{909E8E84-426E-40dd-AFC4-6F175D3DCCD1}">
+              <a:ext uri="{909E8E84-426E-40DD-AFC4-6F175D3DCCD1}">
                 <a14:hiddenFill xmlns:a14="http://schemas.microsoft.com/office/drawing/2010/main">
                   <a:noFill/>
                 </a14:hiddenFill>
@@ -16336,7 +16207,7 @@
   <p:timing>
     <p:tnLst>
       <p:par>
-        <p:cTn xmlns:p14="http://schemas.microsoft.com/office/powerpoint/2010/main" id="1" dur="indefinite" restart="never" nodeType="tmRoot"/>
+        <p:cTn id="1" dur="indefinite" restart="never" nodeType="tmRoot"/>
       </p:par>
     </p:tnLst>
   </p:timing>
@@ -16372,7 +16243,9 @@
         </p:nvSpPr>
         <p:spPr/>
         <p:txBody>
-          <a:bodyPr/>
+          <a:bodyPr>
+            <a:normAutofit fontScale="90000"/>
+          </a:bodyPr>
           <a:lstStyle/>
           <a:p>
             <a:r>

</xml_diff>

<commit_message>
Finished draft of slides. Stole Kayvon font, I think: PDF included so you can see.
</commit_message>
<xml_diff>
--- a/Presentation/Anonymity In XIA.pptx
+++ b/Presentation/Anonymity In XIA.pptx
@@ -4,6 +4,9 @@
   <p:sldMasterIdLst>
     <p:sldMasterId id="2147483648" r:id="rId1"/>
   </p:sldMasterIdLst>
+  <p:notesMasterIdLst>
+    <p:notesMasterId r:id="rId16"/>
+  </p:notesMasterIdLst>
   <p:sldIdLst>
     <p:sldId id="256" r:id="rId2"/>
     <p:sldId id="257" r:id="rId3"/>
@@ -13,9 +16,12 @@
     <p:sldId id="262" r:id="rId7"/>
     <p:sldId id="261" r:id="rId8"/>
     <p:sldId id="263" r:id="rId9"/>
-    <p:sldId id="264" r:id="rId10"/>
-    <p:sldId id="265" r:id="rId11"/>
-    <p:sldId id="266" r:id="rId12"/>
+    <p:sldId id="265" r:id="rId10"/>
+    <p:sldId id="267" r:id="rId11"/>
+    <p:sldId id="264" r:id="rId12"/>
+    <p:sldId id="266" r:id="rId13"/>
+    <p:sldId id="268" r:id="rId14"/>
+    <p:sldId id="269" r:id="rId15"/>
   </p:sldIdLst>
   <p:sldSz cx="9144000" cy="6858000" type="screen4x3"/>
   <p:notesSz cx="6858000" cy="9144000"/>
@@ -117,6 +123,540 @@
 </p:presentation>
 </file>
 
+<file path=ppt/notesMasters/notesMaster1.xml><?xml version="1.0" encoding="utf-8"?>
+<p:notesMaster xmlns:a="http://schemas.openxmlformats.org/drawingml/2006/main" xmlns:r="http://schemas.openxmlformats.org/officeDocument/2006/relationships" xmlns:p="http://schemas.openxmlformats.org/presentationml/2006/main">
+  <p:cSld>
+    <p:bg>
+      <p:bgRef idx="1001">
+        <a:schemeClr val="bg1"/>
+      </p:bgRef>
+    </p:bg>
+    <p:spTree>
+      <p:nvGrpSpPr>
+        <p:cNvPr id="1" name=""/>
+        <p:cNvGrpSpPr/>
+        <p:nvPr/>
+      </p:nvGrpSpPr>
+      <p:grpSpPr>
+        <a:xfrm>
+          <a:off x="0" y="0"/>
+          <a:ext cx="0" cy="0"/>
+          <a:chOff x="0" y="0"/>
+          <a:chExt cx="0" cy="0"/>
+        </a:xfrm>
+      </p:grpSpPr>
+      <p:sp>
+        <p:nvSpPr>
+          <p:cNvPr id="2" name="Header Placeholder 1"/>
+          <p:cNvSpPr>
+            <a:spLocks noGrp="1"/>
+          </p:cNvSpPr>
+          <p:nvPr>
+            <p:ph type="hdr" sz="quarter"/>
+          </p:nvPr>
+        </p:nvSpPr>
+        <p:spPr>
+          <a:xfrm>
+            <a:off x="0" y="0"/>
+            <a:ext cx="2971800" cy="457200"/>
+          </a:xfrm>
+          <a:prstGeom prst="rect">
+            <a:avLst/>
+          </a:prstGeom>
+        </p:spPr>
+        <p:txBody>
+          <a:bodyPr vert="horz" lIns="91440" tIns="45720" rIns="91440" bIns="45720" rtlCol="0"/>
+          <a:lstStyle>
+            <a:lvl1pPr algn="l">
+              <a:defRPr sz="1200"/>
+            </a:lvl1pPr>
+          </a:lstStyle>
+          <a:p>
+            <a:endParaRPr lang="en-US"/>
+          </a:p>
+        </p:txBody>
+      </p:sp>
+      <p:sp>
+        <p:nvSpPr>
+          <p:cNvPr id="3" name="Date Placeholder 2"/>
+          <p:cNvSpPr>
+            <a:spLocks noGrp="1"/>
+          </p:cNvSpPr>
+          <p:nvPr>
+            <p:ph type="dt" idx="1"/>
+          </p:nvPr>
+        </p:nvSpPr>
+        <p:spPr>
+          <a:xfrm>
+            <a:off x="3884613" y="0"/>
+            <a:ext cx="2971800" cy="457200"/>
+          </a:xfrm>
+          <a:prstGeom prst="rect">
+            <a:avLst/>
+          </a:prstGeom>
+        </p:spPr>
+        <p:txBody>
+          <a:bodyPr vert="horz" lIns="91440" tIns="45720" rIns="91440" bIns="45720" rtlCol="0"/>
+          <a:lstStyle>
+            <a:lvl1pPr algn="r">
+              <a:defRPr sz="1200"/>
+            </a:lvl1pPr>
+          </a:lstStyle>
+          <a:p>
+            <a:fld id="{C9B4DBC8-1A40-E64A-BD89-E960D7500B8A}" type="datetimeFigureOut">
+              <a:rPr lang="en-US" smtClean="0"/>
+              <a:t>12/7/11</a:t>
+            </a:fld>
+            <a:endParaRPr lang="en-US"/>
+          </a:p>
+        </p:txBody>
+      </p:sp>
+      <p:sp>
+        <p:nvSpPr>
+          <p:cNvPr id="4" name="Slide Image Placeholder 3"/>
+          <p:cNvSpPr>
+            <a:spLocks noGrp="1" noRot="1" noChangeAspect="1"/>
+          </p:cNvSpPr>
+          <p:nvPr>
+            <p:ph type="sldImg" idx="2"/>
+          </p:nvPr>
+        </p:nvSpPr>
+        <p:spPr>
+          <a:xfrm>
+            <a:off x="1143000" y="685800"/>
+            <a:ext cx="4572000" cy="3429000"/>
+          </a:xfrm>
+          <a:prstGeom prst="rect">
+            <a:avLst/>
+          </a:prstGeom>
+          <a:noFill/>
+          <a:ln w="12700">
+            <a:solidFill>
+              <a:prstClr val="black"/>
+            </a:solidFill>
+          </a:ln>
+        </p:spPr>
+        <p:txBody>
+          <a:bodyPr vert="horz" lIns="91440" tIns="45720" rIns="91440" bIns="45720" rtlCol="0" anchor="ctr"/>
+          <a:lstStyle/>
+          <a:p>
+            <a:endParaRPr lang="en-US"/>
+          </a:p>
+        </p:txBody>
+      </p:sp>
+      <p:sp>
+        <p:nvSpPr>
+          <p:cNvPr id="5" name="Notes Placeholder 4"/>
+          <p:cNvSpPr>
+            <a:spLocks noGrp="1"/>
+          </p:cNvSpPr>
+          <p:nvPr>
+            <p:ph type="body" sz="quarter" idx="3"/>
+          </p:nvPr>
+        </p:nvSpPr>
+        <p:spPr>
+          <a:xfrm>
+            <a:off x="685800" y="4343400"/>
+            <a:ext cx="5486400" cy="4114800"/>
+          </a:xfrm>
+          <a:prstGeom prst="rect">
+            <a:avLst/>
+          </a:prstGeom>
+        </p:spPr>
+        <p:txBody>
+          <a:bodyPr vert="horz" lIns="91440" tIns="45720" rIns="91440" bIns="45720" rtlCol="0"/>
+          <a:lstStyle/>
+          <a:p>
+            <a:pPr lvl="0"/>
+            <a:r>
+              <a:rPr lang="en-US" smtClean="0"/>
+              <a:t>Click to edit Master text styles</a:t>
+            </a:r>
+          </a:p>
+          <a:p>
+            <a:pPr lvl="1"/>
+            <a:r>
+              <a:rPr lang="en-US" smtClean="0"/>
+              <a:t>Second level</a:t>
+            </a:r>
+          </a:p>
+          <a:p>
+            <a:pPr lvl="2"/>
+            <a:r>
+              <a:rPr lang="en-US" smtClean="0"/>
+              <a:t>Third level</a:t>
+            </a:r>
+          </a:p>
+          <a:p>
+            <a:pPr lvl="3"/>
+            <a:r>
+              <a:rPr lang="en-US" smtClean="0"/>
+              <a:t>Fourth level</a:t>
+            </a:r>
+          </a:p>
+          <a:p>
+            <a:pPr lvl="4"/>
+            <a:r>
+              <a:rPr lang="en-US" smtClean="0"/>
+              <a:t>Fifth level</a:t>
+            </a:r>
+            <a:endParaRPr lang="en-US"/>
+          </a:p>
+        </p:txBody>
+      </p:sp>
+      <p:sp>
+        <p:nvSpPr>
+          <p:cNvPr id="6" name="Footer Placeholder 5"/>
+          <p:cNvSpPr>
+            <a:spLocks noGrp="1"/>
+          </p:cNvSpPr>
+          <p:nvPr>
+            <p:ph type="ftr" sz="quarter" idx="4"/>
+          </p:nvPr>
+        </p:nvSpPr>
+        <p:spPr>
+          <a:xfrm>
+            <a:off x="0" y="8685213"/>
+            <a:ext cx="2971800" cy="457200"/>
+          </a:xfrm>
+          <a:prstGeom prst="rect">
+            <a:avLst/>
+          </a:prstGeom>
+        </p:spPr>
+        <p:txBody>
+          <a:bodyPr vert="horz" lIns="91440" tIns="45720" rIns="91440" bIns="45720" rtlCol="0" anchor="b"/>
+          <a:lstStyle>
+            <a:lvl1pPr algn="l">
+              <a:defRPr sz="1200"/>
+            </a:lvl1pPr>
+          </a:lstStyle>
+          <a:p>
+            <a:endParaRPr lang="en-US"/>
+          </a:p>
+        </p:txBody>
+      </p:sp>
+      <p:sp>
+        <p:nvSpPr>
+          <p:cNvPr id="7" name="Slide Number Placeholder 6"/>
+          <p:cNvSpPr>
+            <a:spLocks noGrp="1"/>
+          </p:cNvSpPr>
+          <p:nvPr>
+            <p:ph type="sldNum" sz="quarter" idx="5"/>
+          </p:nvPr>
+        </p:nvSpPr>
+        <p:spPr>
+          <a:xfrm>
+            <a:off x="3884613" y="8685213"/>
+            <a:ext cx="2971800" cy="457200"/>
+          </a:xfrm>
+          <a:prstGeom prst="rect">
+            <a:avLst/>
+          </a:prstGeom>
+        </p:spPr>
+        <p:txBody>
+          <a:bodyPr vert="horz" lIns="91440" tIns="45720" rIns="91440" bIns="45720" rtlCol="0" anchor="b"/>
+          <a:lstStyle>
+            <a:lvl1pPr algn="r">
+              <a:defRPr sz="1200"/>
+            </a:lvl1pPr>
+          </a:lstStyle>
+          <a:p>
+            <a:fld id="{6F9FE819-8FD8-5848-AF3B-D3C41FDB237B}" type="slidenum">
+              <a:rPr lang="en-US" smtClean="0"/>
+              <a:t>‹#›</a:t>
+            </a:fld>
+            <a:endParaRPr lang="en-US"/>
+          </a:p>
+        </p:txBody>
+      </p:sp>
+    </p:spTree>
+    <p:extLst>
+      <p:ext uri="{BB962C8B-B14F-4D97-AF65-F5344CB8AC3E}">
+        <p14:creationId xmlns:p14="http://schemas.microsoft.com/office/powerpoint/2010/main" val="1255103689"/>
+      </p:ext>
+    </p:extLst>
+  </p:cSld>
+  <p:clrMap bg1="lt1" tx1="dk1" bg2="lt2" tx2="dk2" accent1="accent1" accent2="accent2" accent3="accent3" accent4="accent4" accent5="accent5" accent6="accent6" hlink="hlink" folHlink="folHlink"/>
+  <p:notesStyle>
+    <a:lvl1pPr marL="0" algn="l" defTabSz="457200" rtl="0" eaLnBrk="1" latinLnBrk="0" hangingPunct="1">
+      <a:defRPr sz="1200" kern="1200">
+        <a:solidFill>
+          <a:schemeClr val="tx1"/>
+        </a:solidFill>
+        <a:latin typeface="+mn-lt"/>
+        <a:ea typeface="+mn-ea"/>
+        <a:cs typeface="+mn-cs"/>
+      </a:defRPr>
+    </a:lvl1pPr>
+    <a:lvl2pPr marL="457200" algn="l" defTabSz="457200" rtl="0" eaLnBrk="1" latinLnBrk="0" hangingPunct="1">
+      <a:defRPr sz="1200" kern="1200">
+        <a:solidFill>
+          <a:schemeClr val="tx1"/>
+        </a:solidFill>
+        <a:latin typeface="+mn-lt"/>
+        <a:ea typeface="+mn-ea"/>
+        <a:cs typeface="+mn-cs"/>
+      </a:defRPr>
+    </a:lvl2pPr>
+    <a:lvl3pPr marL="914400" algn="l" defTabSz="457200" rtl="0" eaLnBrk="1" latinLnBrk="0" hangingPunct="1">
+      <a:defRPr sz="1200" kern="1200">
+        <a:solidFill>
+          <a:schemeClr val="tx1"/>
+        </a:solidFill>
+        <a:latin typeface="+mn-lt"/>
+        <a:ea typeface="+mn-ea"/>
+        <a:cs typeface="+mn-cs"/>
+      </a:defRPr>
+    </a:lvl3pPr>
+    <a:lvl4pPr marL="1371600" algn="l" defTabSz="457200" rtl="0" eaLnBrk="1" latinLnBrk="0" hangingPunct="1">
+      <a:defRPr sz="1200" kern="1200">
+        <a:solidFill>
+          <a:schemeClr val="tx1"/>
+        </a:solidFill>
+        <a:latin typeface="+mn-lt"/>
+        <a:ea typeface="+mn-ea"/>
+        <a:cs typeface="+mn-cs"/>
+      </a:defRPr>
+    </a:lvl4pPr>
+    <a:lvl5pPr marL="1828800" algn="l" defTabSz="457200" rtl="0" eaLnBrk="1" latinLnBrk="0" hangingPunct="1">
+      <a:defRPr sz="1200" kern="1200">
+        <a:solidFill>
+          <a:schemeClr val="tx1"/>
+        </a:solidFill>
+        <a:latin typeface="+mn-lt"/>
+        <a:ea typeface="+mn-ea"/>
+        <a:cs typeface="+mn-cs"/>
+      </a:defRPr>
+    </a:lvl5pPr>
+    <a:lvl6pPr marL="2286000" algn="l" defTabSz="457200" rtl="0" eaLnBrk="1" latinLnBrk="0" hangingPunct="1">
+      <a:defRPr sz="1200" kern="1200">
+        <a:solidFill>
+          <a:schemeClr val="tx1"/>
+        </a:solidFill>
+        <a:latin typeface="+mn-lt"/>
+        <a:ea typeface="+mn-ea"/>
+        <a:cs typeface="+mn-cs"/>
+      </a:defRPr>
+    </a:lvl6pPr>
+    <a:lvl7pPr marL="2743200" algn="l" defTabSz="457200" rtl="0" eaLnBrk="1" latinLnBrk="0" hangingPunct="1">
+      <a:defRPr sz="1200" kern="1200">
+        <a:solidFill>
+          <a:schemeClr val="tx1"/>
+        </a:solidFill>
+        <a:latin typeface="+mn-lt"/>
+        <a:ea typeface="+mn-ea"/>
+        <a:cs typeface="+mn-cs"/>
+      </a:defRPr>
+    </a:lvl7pPr>
+    <a:lvl8pPr marL="3200400" algn="l" defTabSz="457200" rtl="0" eaLnBrk="1" latinLnBrk="0" hangingPunct="1">
+      <a:defRPr sz="1200" kern="1200">
+        <a:solidFill>
+          <a:schemeClr val="tx1"/>
+        </a:solidFill>
+        <a:latin typeface="+mn-lt"/>
+        <a:ea typeface="+mn-ea"/>
+        <a:cs typeface="+mn-cs"/>
+      </a:defRPr>
+    </a:lvl8pPr>
+    <a:lvl9pPr marL="3657600" algn="l" defTabSz="457200" rtl="0" eaLnBrk="1" latinLnBrk="0" hangingPunct="1">
+      <a:defRPr sz="1200" kern="1200">
+        <a:solidFill>
+          <a:schemeClr val="tx1"/>
+        </a:solidFill>
+        <a:latin typeface="+mn-lt"/>
+        <a:ea typeface="+mn-ea"/>
+        <a:cs typeface="+mn-cs"/>
+      </a:defRPr>
+    </a:lvl9pPr>
+  </p:notesStyle>
+</p:notesMaster>
+</file>
+
+<file path=ppt/notesSlides/notesSlide1.xml><?xml version="1.0" encoding="utf-8"?>
+<p:notes xmlns:a="http://schemas.openxmlformats.org/drawingml/2006/main" xmlns:r="http://schemas.openxmlformats.org/officeDocument/2006/relationships" xmlns:p="http://schemas.openxmlformats.org/presentationml/2006/main">
+  <p:cSld>
+    <p:spTree>
+      <p:nvGrpSpPr>
+        <p:cNvPr id="1" name=""/>
+        <p:cNvGrpSpPr/>
+        <p:nvPr/>
+      </p:nvGrpSpPr>
+      <p:grpSpPr>
+        <a:xfrm>
+          <a:off x="0" y="0"/>
+          <a:ext cx="0" cy="0"/>
+          <a:chOff x="0" y="0"/>
+          <a:chExt cx="0" cy="0"/>
+        </a:xfrm>
+      </p:grpSpPr>
+      <p:sp>
+        <p:nvSpPr>
+          <p:cNvPr id="2" name="Slide Image Placeholder 1"/>
+          <p:cNvSpPr>
+            <a:spLocks noGrp="1" noRot="1" noChangeAspect="1"/>
+          </p:cNvSpPr>
+          <p:nvPr>
+            <p:ph type="sldImg"/>
+          </p:nvPr>
+        </p:nvSpPr>
+        <p:spPr/>
+      </p:sp>
+      <p:sp>
+        <p:nvSpPr>
+          <p:cNvPr id="3" name="Notes Placeholder 2"/>
+          <p:cNvSpPr>
+            <a:spLocks noGrp="1"/>
+          </p:cNvSpPr>
+          <p:nvPr>
+            <p:ph type="body" idx="1"/>
+          </p:nvPr>
+        </p:nvSpPr>
+        <p:spPr/>
+        <p:txBody>
+          <a:bodyPr/>
+          <a:lstStyle/>
+          <a:p>
+            <a:r>
+              <a:rPr lang="en-US" dirty="0" smtClean="0"/>
+              <a:t>Even though it’s not XIA specific, when</a:t>
+            </a:r>
+            <a:r>
+              <a:rPr lang="en-US" baseline="0" dirty="0" smtClean="0"/>
+              <a:t> we’re re-architecting the Internet it’s a good time to build in things users want.</a:t>
+            </a:r>
+            <a:endParaRPr lang="en-US" dirty="0"/>
+          </a:p>
+        </p:txBody>
+      </p:sp>
+      <p:sp>
+        <p:nvSpPr>
+          <p:cNvPr id="4" name="Slide Number Placeholder 3"/>
+          <p:cNvSpPr>
+            <a:spLocks noGrp="1"/>
+          </p:cNvSpPr>
+          <p:nvPr>
+            <p:ph type="sldNum" sz="quarter" idx="10"/>
+          </p:nvPr>
+        </p:nvSpPr>
+        <p:spPr/>
+        <p:txBody>
+          <a:bodyPr/>
+          <a:lstStyle/>
+          <a:p>
+            <a:fld id="{6F9FE819-8FD8-5848-AF3B-D3C41FDB237B}" type="slidenum">
+              <a:rPr lang="en-US" smtClean="0"/>
+              <a:t>9</a:t>
+            </a:fld>
+            <a:endParaRPr lang="en-US"/>
+          </a:p>
+        </p:txBody>
+      </p:sp>
+    </p:spTree>
+    <p:extLst>
+      <p:ext uri="{BB962C8B-B14F-4D97-AF65-F5344CB8AC3E}">
+        <p14:creationId xmlns:p14="http://schemas.microsoft.com/office/powerpoint/2010/main" val="3291498085"/>
+      </p:ext>
+    </p:extLst>
+  </p:cSld>
+  <p:clrMapOvr>
+    <a:masterClrMapping/>
+  </p:clrMapOvr>
+</p:notes>
+</file>
+
+<file path=ppt/notesSlides/notesSlide2.xml><?xml version="1.0" encoding="utf-8"?>
+<p:notes xmlns:a="http://schemas.openxmlformats.org/drawingml/2006/main" xmlns:r="http://schemas.openxmlformats.org/officeDocument/2006/relationships" xmlns:p="http://schemas.openxmlformats.org/presentationml/2006/main">
+  <p:cSld>
+    <p:spTree>
+      <p:nvGrpSpPr>
+        <p:cNvPr id="1" name=""/>
+        <p:cNvGrpSpPr/>
+        <p:nvPr/>
+      </p:nvGrpSpPr>
+      <p:grpSpPr>
+        <a:xfrm>
+          <a:off x="0" y="0"/>
+          <a:ext cx="0" cy="0"/>
+          <a:chOff x="0" y="0"/>
+          <a:chExt cx="0" cy="0"/>
+        </a:xfrm>
+      </p:grpSpPr>
+      <p:sp>
+        <p:nvSpPr>
+          <p:cNvPr id="2" name="Slide Image Placeholder 1"/>
+          <p:cNvSpPr>
+            <a:spLocks noGrp="1" noRot="1" noChangeAspect="1"/>
+          </p:cNvSpPr>
+          <p:nvPr>
+            <p:ph type="sldImg"/>
+          </p:nvPr>
+        </p:nvSpPr>
+        <p:spPr/>
+      </p:sp>
+      <p:sp>
+        <p:nvSpPr>
+          <p:cNvPr id="3" name="Notes Placeholder 2"/>
+          <p:cNvSpPr>
+            <a:spLocks noGrp="1"/>
+          </p:cNvSpPr>
+          <p:nvPr>
+            <p:ph type="body" idx="1"/>
+          </p:nvPr>
+        </p:nvSpPr>
+        <p:spPr/>
+        <p:txBody>
+          <a:bodyPr/>
+          <a:lstStyle/>
+          <a:p>
+            <a:r>
+              <a:rPr lang="en-US" dirty="0" smtClean="0"/>
+              <a:t>Even though it’s not XIA specific, when</a:t>
+            </a:r>
+            <a:r>
+              <a:rPr lang="en-US" baseline="0" dirty="0" smtClean="0"/>
+              <a:t> we’re re-architecting the Internet it’s a good time to build in things users want.</a:t>
+            </a:r>
+            <a:endParaRPr lang="en-US" dirty="0"/>
+          </a:p>
+        </p:txBody>
+      </p:sp>
+      <p:sp>
+        <p:nvSpPr>
+          <p:cNvPr id="4" name="Slide Number Placeholder 3"/>
+          <p:cNvSpPr>
+            <a:spLocks noGrp="1"/>
+          </p:cNvSpPr>
+          <p:nvPr>
+            <p:ph type="sldNum" sz="quarter" idx="10"/>
+          </p:nvPr>
+        </p:nvSpPr>
+        <p:spPr/>
+        <p:txBody>
+          <a:bodyPr/>
+          <a:lstStyle/>
+          <a:p>
+            <a:fld id="{6F9FE819-8FD8-5848-AF3B-D3C41FDB237B}" type="slidenum">
+              <a:rPr lang="en-US" smtClean="0"/>
+              <a:t>10</a:t>
+            </a:fld>
+            <a:endParaRPr lang="en-US"/>
+          </a:p>
+        </p:txBody>
+      </p:sp>
+    </p:spTree>
+    <p:extLst>
+      <p:ext uri="{BB962C8B-B14F-4D97-AF65-F5344CB8AC3E}">
+        <p14:creationId xmlns:p14="http://schemas.microsoft.com/office/powerpoint/2010/main" val="3291498085"/>
+      </p:ext>
+    </p:extLst>
+  </p:cSld>
+  <p:clrMapOvr>
+    <a:masterClrMapping/>
+  </p:clrMapOvr>
+</p:notes>
+</file>
+
 <file path=ppt/slideLayouts/slideLayout1.xml><?xml version="1.0" encoding="utf-8"?>
 <p:sldLayout xmlns:a="http://schemas.openxmlformats.org/drawingml/2006/main" xmlns:r="http://schemas.openxmlformats.org/officeDocument/2006/relationships" xmlns:p="http://schemas.openxmlformats.org/presentationml/2006/main" type="title" preserve="1">
   <p:cSld name="Title Slide">
@@ -154,18 +694,18 @@
           <a:bodyPr/>
           <a:lstStyle>
             <a:lvl1pPr>
-              <a:defRPr>
-                <a:latin typeface="Myriad Pro"/>
-                <a:cs typeface="Myriad Pro"/>
+              <a:defRPr b="1" i="0">
+                <a:latin typeface="Myriad Pro Cond"/>
+                <a:cs typeface="Myriad Pro Cond"/>
               </a:defRPr>
             </a:lvl1pPr>
           </a:lstStyle>
           <a:p>
             <a:r>
-              <a:rPr lang="en-US" smtClean="0"/>
+              <a:rPr lang="en-US" dirty="0" smtClean="0"/>
               <a:t>Click to edit Master title style</a:t>
             </a:r>
-            <a:endParaRPr lang="en-US"/>
+            <a:endParaRPr lang="en-US" dirty="0"/>
           </a:p>
         </p:txBody>
       </p:sp>
@@ -190,14 +730,14 @@
           <a:lstStyle>
             <a:lvl1pPr marL="0" indent="0" algn="ctr">
               <a:buNone/>
-              <a:defRPr>
+              <a:defRPr b="0" i="0">
                 <a:solidFill>
                   <a:schemeClr val="tx1">
                     <a:tint val="75000"/>
                   </a:schemeClr>
                 </a:solidFill>
-                <a:latin typeface="Myriad Pro"/>
-                <a:cs typeface="Myriad Pro"/>
+                <a:latin typeface="Myriad Pro Cond"/>
+                <a:cs typeface="Myriad Pro Cond"/>
               </a:defRPr>
             </a:lvl1pPr>
             <a:lvl2pPr marL="457200" indent="0" algn="ctr">
@@ -307,7 +847,7 @@
           <a:p>
             <a:fld id="{8D90E91E-F546-DE48-8D89-C19A8E48B43A}" type="datetimeFigureOut">
               <a:rPr lang="en-US" smtClean="0"/>
-              <a:t>12/5/2011</a:t>
+              <a:t>12/7/11</a:t>
             </a:fld>
             <a:endParaRPr lang="en-US"/>
           </a:p>
@@ -477,7 +1017,7 @@
           <a:p>
             <a:fld id="{8D90E91E-F546-DE48-8D89-C19A8E48B43A}" type="datetimeFigureOut">
               <a:rPr lang="en-US" smtClean="0"/>
-              <a:t>12/5/2011</a:t>
+              <a:t>12/7/11</a:t>
             </a:fld>
             <a:endParaRPr lang="en-US"/>
           </a:p>
@@ -657,7 +1197,7 @@
           <a:p>
             <a:fld id="{8D90E91E-F546-DE48-8D89-C19A8E48B43A}" type="datetimeFigureOut">
               <a:rPr lang="en-US" smtClean="0"/>
-              <a:t>12/5/2011</a:t>
+              <a:t>12/7/11</a:t>
             </a:fld>
             <a:endParaRPr lang="en-US"/>
           </a:p>
@@ -750,9 +1290,9 @@
           <a:bodyPr/>
           <a:lstStyle>
             <a:lvl1pPr>
-              <a:defRPr>
-                <a:latin typeface="Myriad Pro"/>
-                <a:cs typeface="Myriad Pro"/>
+              <a:defRPr b="1" i="0">
+                <a:latin typeface="Myriad Pro Cond"/>
+                <a:cs typeface="Myriad Pro Cond"/>
               </a:defRPr>
             </a:lvl1pPr>
           </a:lstStyle>
@@ -780,71 +1320,71 @@
           <a:bodyPr/>
           <a:lstStyle>
             <a:lvl1pPr>
-              <a:defRPr>
-                <a:latin typeface="Myriad Pro"/>
-                <a:cs typeface="Myriad Pro"/>
+              <a:defRPr b="0" i="0">
+                <a:latin typeface="Myriad Pro Cond"/>
+                <a:cs typeface="Myriad Pro Cond"/>
               </a:defRPr>
             </a:lvl1pPr>
             <a:lvl2pPr>
-              <a:defRPr>
-                <a:latin typeface="Myriad Pro"/>
-                <a:cs typeface="Myriad Pro"/>
+              <a:defRPr b="0" i="0">
+                <a:latin typeface="Myriad Pro Cond"/>
+                <a:cs typeface="Myriad Pro Cond"/>
               </a:defRPr>
             </a:lvl2pPr>
             <a:lvl3pPr>
-              <a:defRPr>
-                <a:latin typeface="Myriad Pro"/>
-                <a:cs typeface="Myriad Pro"/>
+              <a:defRPr b="0" i="0">
+                <a:latin typeface="Myriad Pro Cond"/>
+                <a:cs typeface="Myriad Pro Cond"/>
               </a:defRPr>
             </a:lvl3pPr>
             <a:lvl4pPr>
-              <a:defRPr>
-                <a:latin typeface="Myriad Pro"/>
-                <a:cs typeface="Myriad Pro"/>
+              <a:defRPr b="0" i="0">
+                <a:latin typeface="Myriad Pro Cond"/>
+                <a:cs typeface="Myriad Pro Cond"/>
               </a:defRPr>
             </a:lvl4pPr>
             <a:lvl5pPr>
-              <a:defRPr>
-                <a:latin typeface="Myriad Pro"/>
-                <a:cs typeface="Myriad Pro"/>
+              <a:defRPr b="0" i="0">
+                <a:latin typeface="Myriad Pro Cond"/>
+                <a:cs typeface="Myriad Pro Cond"/>
               </a:defRPr>
             </a:lvl5pPr>
           </a:lstStyle>
           <a:p>
             <a:pPr lvl="0"/>
             <a:r>
-              <a:rPr lang="en-US" smtClean="0"/>
+              <a:rPr lang="en-US" dirty="0" smtClean="0"/>
               <a:t>Click to edit Master text styles</a:t>
             </a:r>
           </a:p>
           <a:p>
             <a:pPr lvl="1"/>
             <a:r>
-              <a:rPr lang="en-US" smtClean="0"/>
+              <a:rPr lang="en-US" dirty="0" smtClean="0"/>
               <a:t>Second level</a:t>
             </a:r>
           </a:p>
           <a:p>
             <a:pPr lvl="2"/>
             <a:r>
-              <a:rPr lang="en-US" smtClean="0"/>
+              <a:rPr lang="en-US" dirty="0" smtClean="0"/>
               <a:t>Third level</a:t>
             </a:r>
           </a:p>
           <a:p>
             <a:pPr lvl="3"/>
             <a:r>
-              <a:rPr lang="en-US" smtClean="0"/>
+              <a:rPr lang="en-US" dirty="0" smtClean="0"/>
               <a:t>Fourth level</a:t>
             </a:r>
           </a:p>
           <a:p>
             <a:pPr lvl="4"/>
             <a:r>
-              <a:rPr lang="en-US" smtClean="0"/>
+              <a:rPr lang="en-US" dirty="0" smtClean="0"/>
               <a:t>Fifth level</a:t>
             </a:r>
-            <a:endParaRPr lang="en-US"/>
+            <a:endParaRPr lang="en-US" dirty="0"/>
           </a:p>
         </p:txBody>
       </p:sp>
@@ -865,7 +1405,7 @@
           <a:p>
             <a:fld id="{8D90E91E-F546-DE48-8D89-C19A8E48B43A}" type="datetimeFigureOut">
               <a:rPr lang="en-US" smtClean="0"/>
-              <a:t>12/5/2011</a:t>
+              <a:t>12/7/11</a:t>
             </a:fld>
             <a:endParaRPr lang="en-US"/>
           </a:p>
@@ -1111,7 +1651,7 @@
           <a:p>
             <a:fld id="{8D90E91E-F546-DE48-8D89-C19A8E48B43A}" type="datetimeFigureOut">
               <a:rPr lang="en-US" smtClean="0"/>
-              <a:t>12/5/2011</a:t>
+              <a:t>12/7/11</a:t>
             </a:fld>
             <a:endParaRPr lang="en-US"/>
           </a:p>
@@ -1399,7 +1939,7 @@
           <a:p>
             <a:fld id="{8D90E91E-F546-DE48-8D89-C19A8E48B43A}" type="datetimeFigureOut">
               <a:rPr lang="en-US" smtClean="0"/>
-              <a:t>12/5/2011</a:t>
+              <a:t>12/7/11</a:t>
             </a:fld>
             <a:endParaRPr lang="en-US"/>
           </a:p>
@@ -1821,7 +2361,7 @@
           <a:p>
             <a:fld id="{8D90E91E-F546-DE48-8D89-C19A8E48B43A}" type="datetimeFigureOut">
               <a:rPr lang="en-US" smtClean="0"/>
-              <a:t>12/5/2011</a:t>
+              <a:t>12/7/11</a:t>
             </a:fld>
             <a:endParaRPr lang="en-US"/>
           </a:p>
@@ -1946,7 +2486,7 @@
           <a:p>
             <a:fld id="{8D90E91E-F546-DE48-8D89-C19A8E48B43A}" type="datetimeFigureOut">
               <a:rPr lang="en-US" smtClean="0"/>
-              <a:t>12/5/2011</a:t>
+              <a:t>12/7/11</a:t>
             </a:fld>
             <a:endParaRPr lang="en-US"/>
           </a:p>
@@ -2041,7 +2581,7 @@
           <a:p>
             <a:fld id="{8D90E91E-F546-DE48-8D89-C19A8E48B43A}" type="datetimeFigureOut">
               <a:rPr lang="en-US" smtClean="0"/>
-              <a:t>12/5/2011</a:t>
+              <a:t>12/7/11</a:t>
             </a:fld>
             <a:endParaRPr lang="en-US"/>
           </a:p>
@@ -2318,7 +2858,7 @@
           <a:p>
             <a:fld id="{8D90E91E-F546-DE48-8D89-C19A8E48B43A}" type="datetimeFigureOut">
               <a:rPr lang="en-US" smtClean="0"/>
-              <a:t>12/5/2011</a:t>
+              <a:t>12/7/11</a:t>
             </a:fld>
             <a:endParaRPr lang="en-US"/>
           </a:p>
@@ -2571,7 +3111,7 @@
           <a:p>
             <a:fld id="{8D90E91E-F546-DE48-8D89-C19A8E48B43A}" type="datetimeFigureOut">
               <a:rPr lang="en-US" smtClean="0"/>
-              <a:t>12/5/2011</a:t>
+              <a:t>12/7/11</a:t>
             </a:fld>
             <a:endParaRPr lang="en-US"/>
           </a:p>
@@ -2784,7 +3324,7 @@
           <a:p>
             <a:fld id="{8D90E91E-F546-DE48-8D89-C19A8E48B43A}" type="datetimeFigureOut">
               <a:rPr lang="en-US" smtClean="0"/>
-              <a:t>12/5/2011</a:t>
+              <a:t>12/7/11</a:t>
             </a:fld>
             <a:endParaRPr lang="en-US"/>
           </a:p>
@@ -2896,13 +3436,13 @@
           <a:spcPct val="0"/>
         </a:spcBef>
         <a:buNone/>
-        <a:defRPr sz="4800" kern="1200">
+        <a:defRPr sz="4800" b="1" i="0" kern="1200">
           <a:solidFill>
             <a:schemeClr val="tx1"/>
           </a:solidFill>
-          <a:latin typeface="+mj-lt"/>
+          <a:latin typeface="Myriad Pro Cond"/>
           <a:ea typeface="+mj-ea"/>
-          <a:cs typeface="+mj-cs"/>
+          <a:cs typeface="Myriad Pro Cond"/>
         </a:defRPr>
       </a:lvl1pPr>
     </p:titleStyle>
@@ -2913,13 +3453,13 @@
         </a:spcBef>
         <a:buFont typeface="Arial"/>
         <a:buNone/>
-        <a:defRPr sz="3600" kern="1200">
+        <a:defRPr sz="3600" b="0" i="0" kern="1200">
           <a:solidFill>
             <a:schemeClr val="tx1"/>
           </a:solidFill>
-          <a:latin typeface="+mn-lt"/>
+          <a:latin typeface="Myriad Pro Cond"/>
           <a:ea typeface="+mn-ea"/>
-          <a:cs typeface="+mn-cs"/>
+          <a:cs typeface="Myriad Pro Cond"/>
         </a:defRPr>
       </a:lvl1pPr>
       <a:lvl2pPr marL="0" indent="0" algn="l" defTabSz="457200" rtl="0" eaLnBrk="1" latinLnBrk="0" hangingPunct="1">
@@ -2928,16 +3468,16 @@
         </a:spcBef>
         <a:buFont typeface="Arial"/>
         <a:buNone/>
-        <a:defRPr sz="2400" kern="1200" cap="all">
+        <a:defRPr sz="2400" b="0" i="0" kern="1200" cap="all">
           <a:solidFill>
             <a:schemeClr val="tx1">
               <a:lumMod val="50000"/>
               <a:lumOff val="50000"/>
             </a:schemeClr>
           </a:solidFill>
-          <a:latin typeface="+mn-lt"/>
+          <a:latin typeface="Myriad Pro Cond"/>
           <a:ea typeface="+mn-ea"/>
-          <a:cs typeface="+mn-cs"/>
+          <a:cs typeface="Myriad Pro Cond"/>
         </a:defRPr>
       </a:lvl2pPr>
       <a:lvl3pPr marL="455613" indent="0" algn="l" defTabSz="457200" rtl="0" eaLnBrk="1" latinLnBrk="0" hangingPunct="1">
@@ -2946,13 +3486,13 @@
         </a:spcBef>
         <a:buFont typeface="Arial"/>
         <a:buNone/>
-        <a:defRPr sz="2400" kern="1200">
+        <a:defRPr sz="2400" b="0" i="0" kern="1200">
           <a:solidFill>
             <a:schemeClr val="tx1"/>
           </a:solidFill>
-          <a:latin typeface="+mn-lt"/>
+          <a:latin typeface="Myriad Pro Cond"/>
           <a:ea typeface="+mn-ea"/>
-          <a:cs typeface="+mn-cs"/>
+          <a:cs typeface="Myriad Pro Cond"/>
         </a:defRPr>
       </a:lvl3pPr>
       <a:lvl4pPr marL="914400" indent="0" algn="l" defTabSz="457200" rtl="0" eaLnBrk="1" latinLnBrk="0" hangingPunct="1">
@@ -2961,13 +3501,13 @@
         </a:spcBef>
         <a:buFont typeface="Arial"/>
         <a:buNone/>
-        <a:defRPr sz="2000" kern="1200">
+        <a:defRPr sz="2000" b="0" i="0" kern="1200">
           <a:solidFill>
             <a:schemeClr val="tx1"/>
           </a:solidFill>
-          <a:latin typeface="+mn-lt"/>
+          <a:latin typeface="Myriad Pro Cond"/>
           <a:ea typeface="+mn-ea"/>
-          <a:cs typeface="+mn-cs"/>
+          <a:cs typeface="Myriad Pro Cond"/>
         </a:defRPr>
       </a:lvl4pPr>
       <a:lvl5pPr marL="1371600" indent="0" algn="l" defTabSz="457200" rtl="0" eaLnBrk="1" latinLnBrk="0" hangingPunct="1">
@@ -2976,13 +3516,13 @@
         </a:spcBef>
         <a:buFont typeface="Arial"/>
         <a:buNone/>
-        <a:defRPr sz="2000" kern="1200">
+        <a:defRPr sz="2000" b="0" i="0" kern="1200">
           <a:solidFill>
             <a:schemeClr val="tx1"/>
           </a:solidFill>
-          <a:latin typeface="+mn-lt"/>
+          <a:latin typeface="Myriad Pro Cond"/>
           <a:ea typeface="+mn-ea"/>
-          <a:cs typeface="+mn-cs"/>
+          <a:cs typeface="Myriad Pro Cond"/>
         </a:defRPr>
       </a:lvl5pPr>
       <a:lvl6pPr marL="2514600" indent="-228600" algn="l" defTabSz="457200" rtl="0" eaLnBrk="1" latinLnBrk="0" hangingPunct="1">
@@ -3190,7 +3730,9 @@
           </a:xfrm>
         </p:spPr>
         <p:txBody>
-          <a:bodyPr/>
+          <a:bodyPr>
+            <a:normAutofit/>
+          </a:bodyPr>
           <a:lstStyle/>
           <a:p>
             <a:r>
@@ -3293,7 +3835,7 @@
   <p:timing>
     <p:tnLst>
       <p:par>
-        <p:cTn id="1" dur="indefinite" restart="never" nodeType="tmRoot"/>
+        <p:cTn xmlns:p14="http://schemas.microsoft.com/office/powerpoint/2010/main" id="1" dur="indefinite" restart="never" nodeType="tmRoot"/>
       </p:par>
     </p:tnLst>
   </p:timing>
@@ -3357,22 +3899,73 @@
           <a:p>
             <a:r>
               <a:rPr lang="en-US" dirty="0" smtClean="0"/>
-              <a:t>For users</a:t>
+              <a:t>Transparency</a:t>
+            </a:r>
+          </a:p>
+          <a:p>
+            <a:pPr lvl="1"/>
+            <a:r>
+              <a:rPr lang="en-US" dirty="0" smtClean="0"/>
+              <a:t>Users can see exactly</a:t>
+            </a:r>
+          </a:p>
+          <a:p>
+            <a:pPr lvl="1"/>
+            <a:r>
+              <a:rPr lang="en-US" dirty="0" smtClean="0"/>
+              <a:t>What’s happening</a:t>
             </a:r>
             <a:endParaRPr lang="en-US" dirty="0"/>
           </a:p>
         </p:txBody>
       </p:sp>
+      <p:pic>
+        <p:nvPicPr>
+          <p:cNvPr id="6" name="Picture 5" descr="Screen Shot 2011-12-07 at 9.36.54 PM.png"/>
+          <p:cNvPicPr>
+            <a:picLocks noChangeAspect="1"/>
+          </p:cNvPicPr>
+          <p:nvPr/>
+        </p:nvPicPr>
+        <p:blipFill>
+          <a:blip r:embed="rId3">
+            <a:extLst>
+              <a:ext uri="{28A0092B-C50C-407E-A947-70E740481C1C}">
+                <a14:useLocalDpi xmlns:a14="http://schemas.microsoft.com/office/drawing/2010/main" val="0"/>
+              </a:ext>
+            </a:extLst>
+          </a:blip>
+          <a:stretch>
+            <a:fillRect/>
+          </a:stretch>
+        </p:blipFill>
+        <p:spPr>
+          <a:xfrm>
+            <a:off x="3183971" y="1790947"/>
+            <a:ext cx="5502829" cy="4392166"/>
+          </a:xfrm>
+          <a:prstGeom prst="rect">
+            <a:avLst/>
+          </a:prstGeom>
+        </p:spPr>
+      </p:pic>
     </p:spTree>
     <p:extLst>
       <p:ext uri="{BB962C8B-B14F-4D97-AF65-F5344CB8AC3E}">
-        <p14:creationId xmlns:p14="http://schemas.microsoft.com/office/powerpoint/2010/main" val="1201774173"/>
+        <p14:creationId xmlns:p14="http://schemas.microsoft.com/office/powerpoint/2010/main" val="3046543744"/>
       </p:ext>
     </p:extLst>
   </p:cSld>
   <p:clrMapOvr>
     <a:masterClrMapping/>
   </p:clrMapOvr>
+  <p:timing>
+    <p:tnLst>
+      <p:par>
+        <p:cTn xmlns:p14="http://schemas.microsoft.com/office/powerpoint/2010/main" id="1" dur="indefinite" restart="never" nodeType="tmRoot"/>
+      </p:par>
+    </p:tnLst>
+  </p:timing>
 </p:sld>
 </file>
 
@@ -3410,7 +4003,7 @@
           <a:p>
             <a:r>
               <a:rPr lang="en-US" dirty="0" smtClean="0"/>
-              <a:t>Evaluation</a:t>
+              <a:t>Socket API Extension</a:t>
             </a:r>
             <a:endParaRPr lang="en-US" dirty="0"/>
           </a:p>
@@ -3426,23 +4019,867 @@
             <p:ph idx="1"/>
           </p:nvPr>
         </p:nvSpPr>
-        <p:spPr/>
+        <p:spPr>
+          <a:xfrm>
+            <a:off x="457200" y="1600200"/>
+            <a:ext cx="8229600" cy="2502611"/>
+          </a:xfrm>
+        </p:spPr>
         <p:txBody>
           <a:bodyPr/>
           <a:lstStyle/>
           <a:p>
             <a:r>
               <a:rPr lang="en-US" dirty="0" smtClean="0"/>
-              <a:t>???</a:t>
+              <a:t>Using these tools should be dead-easy for developers</a:t>
+            </a:r>
+          </a:p>
+          <a:p>
+            <a:pPr lvl="1"/>
+            <a:r>
+              <a:rPr lang="en-US" dirty="0" smtClean="0"/>
+              <a:t>Extend socket API to allow simple setup for anonymous communication</a:t>
+            </a:r>
+          </a:p>
+          <a:p>
+            <a:r>
+              <a:rPr lang="en-US" dirty="0" smtClean="0"/>
+              <a:t>Competent developers should have the power to do more</a:t>
+            </a:r>
+          </a:p>
+          <a:p>
+            <a:pPr lvl="1"/>
+            <a:r>
+              <a:rPr lang="en-US" dirty="0" smtClean="0"/>
+              <a:t>Applications can request to bypass system </a:t>
+            </a:r>
+            <a:r>
+              <a:rPr lang="en-US" dirty="0" err="1" smtClean="0"/>
+              <a:t>anonymization</a:t>
+            </a:r>
+            <a:r>
+              <a:rPr lang="en-US" dirty="0" smtClean="0"/>
+              <a:t> settings</a:t>
             </a:r>
             <a:endParaRPr lang="en-US" dirty="0"/>
+          </a:p>
+        </p:txBody>
+      </p:sp>
+      <p:sp>
+        <p:nvSpPr>
+          <p:cNvPr id="6" name="Content Placeholder 2"/>
+          <p:cNvSpPr txBox="1">
+            <a:spLocks/>
+          </p:cNvSpPr>
+          <p:nvPr/>
+        </p:nvSpPr>
+        <p:spPr>
+          <a:xfrm>
+            <a:off x="457200" y="4102811"/>
+            <a:ext cx="8229600" cy="2082611"/>
+          </a:xfrm>
+          <a:prstGeom prst="rect">
+            <a:avLst/>
+          </a:prstGeom>
+        </p:spPr>
+        <p:txBody>
+          <a:bodyPr vert="horz" lIns="91440" tIns="45720" rIns="91440" bIns="45720" rtlCol="0" anchor="ctr">
+            <a:normAutofit/>
+          </a:bodyPr>
+          <a:lstStyle>
+            <a:lvl1pPr marL="0" indent="0" algn="l" defTabSz="457200" rtl="0" eaLnBrk="1" latinLnBrk="0" hangingPunct="1">
+              <a:spcBef>
+                <a:spcPts val="1464"/>
+              </a:spcBef>
+              <a:buFont typeface="Arial"/>
+              <a:buNone/>
+              <a:defRPr sz="3600" b="0" i="0" kern="1200">
+                <a:solidFill>
+                  <a:schemeClr val="tx1"/>
+                </a:solidFill>
+                <a:latin typeface="Myriad Pro Cond"/>
+                <a:ea typeface="+mn-ea"/>
+                <a:cs typeface="Myriad Pro Cond"/>
+              </a:defRPr>
+            </a:lvl1pPr>
+            <a:lvl2pPr marL="0" indent="0" algn="l" defTabSz="457200" rtl="0" eaLnBrk="1" latinLnBrk="0" hangingPunct="1">
+              <a:spcBef>
+                <a:spcPts val="0"/>
+              </a:spcBef>
+              <a:buFont typeface="Arial"/>
+              <a:buNone/>
+              <a:defRPr sz="2400" b="0" i="0" kern="1200" cap="all">
+                <a:solidFill>
+                  <a:schemeClr val="tx1">
+                    <a:lumMod val="50000"/>
+                    <a:lumOff val="50000"/>
+                  </a:schemeClr>
+                </a:solidFill>
+                <a:latin typeface="Myriad Pro Cond"/>
+                <a:ea typeface="+mn-ea"/>
+                <a:cs typeface="Myriad Pro Cond"/>
+              </a:defRPr>
+            </a:lvl2pPr>
+            <a:lvl3pPr marL="455613" indent="0" algn="l" defTabSz="457200" rtl="0" eaLnBrk="1" latinLnBrk="0" hangingPunct="1">
+              <a:spcBef>
+                <a:spcPct val="20000"/>
+              </a:spcBef>
+              <a:buFont typeface="Arial"/>
+              <a:buNone/>
+              <a:defRPr sz="2400" b="0" i="0" kern="1200">
+                <a:solidFill>
+                  <a:schemeClr val="tx1"/>
+                </a:solidFill>
+                <a:latin typeface="Myriad Pro Cond"/>
+                <a:ea typeface="+mn-ea"/>
+                <a:cs typeface="Myriad Pro Cond"/>
+              </a:defRPr>
+            </a:lvl3pPr>
+            <a:lvl4pPr marL="914400" indent="0" algn="l" defTabSz="457200" rtl="0" eaLnBrk="1" latinLnBrk="0" hangingPunct="1">
+              <a:spcBef>
+                <a:spcPct val="20000"/>
+              </a:spcBef>
+              <a:buFont typeface="Arial"/>
+              <a:buNone/>
+              <a:defRPr sz="2000" b="0" i="0" kern="1200">
+                <a:solidFill>
+                  <a:schemeClr val="tx1"/>
+                </a:solidFill>
+                <a:latin typeface="Myriad Pro Cond"/>
+                <a:ea typeface="+mn-ea"/>
+                <a:cs typeface="Myriad Pro Cond"/>
+              </a:defRPr>
+            </a:lvl4pPr>
+            <a:lvl5pPr marL="1371600" indent="0" algn="l" defTabSz="457200" rtl="0" eaLnBrk="1" latinLnBrk="0" hangingPunct="1">
+              <a:spcBef>
+                <a:spcPct val="20000"/>
+              </a:spcBef>
+              <a:buFont typeface="Arial"/>
+              <a:buNone/>
+              <a:defRPr sz="2000" b="0" i="0" kern="1200">
+                <a:solidFill>
+                  <a:schemeClr val="tx1"/>
+                </a:solidFill>
+                <a:latin typeface="Myriad Pro Cond"/>
+                <a:ea typeface="+mn-ea"/>
+                <a:cs typeface="Myriad Pro Cond"/>
+              </a:defRPr>
+            </a:lvl5pPr>
+            <a:lvl6pPr marL="2514600" indent="-228600" algn="l" defTabSz="457200" rtl="0" eaLnBrk="1" latinLnBrk="0" hangingPunct="1">
+              <a:spcBef>
+                <a:spcPct val="20000"/>
+              </a:spcBef>
+              <a:buFont typeface="Arial"/>
+              <a:buChar char="•"/>
+              <a:defRPr sz="2000" kern="1200">
+                <a:solidFill>
+                  <a:schemeClr val="tx1"/>
+                </a:solidFill>
+                <a:latin typeface="+mn-lt"/>
+                <a:ea typeface="+mn-ea"/>
+                <a:cs typeface="+mn-cs"/>
+              </a:defRPr>
+            </a:lvl6pPr>
+            <a:lvl7pPr marL="2971800" indent="-228600" algn="l" defTabSz="457200" rtl="0" eaLnBrk="1" latinLnBrk="0" hangingPunct="1">
+              <a:spcBef>
+                <a:spcPct val="20000"/>
+              </a:spcBef>
+              <a:buFont typeface="Arial"/>
+              <a:buChar char="•"/>
+              <a:defRPr sz="2000" kern="1200">
+                <a:solidFill>
+                  <a:schemeClr val="tx1"/>
+                </a:solidFill>
+                <a:latin typeface="+mn-lt"/>
+                <a:ea typeface="+mn-ea"/>
+                <a:cs typeface="+mn-cs"/>
+              </a:defRPr>
+            </a:lvl7pPr>
+            <a:lvl8pPr marL="3429000" indent="-228600" algn="l" defTabSz="457200" rtl="0" eaLnBrk="1" latinLnBrk="0" hangingPunct="1">
+              <a:spcBef>
+                <a:spcPct val="20000"/>
+              </a:spcBef>
+              <a:buFont typeface="Arial"/>
+              <a:buChar char="•"/>
+              <a:defRPr sz="2000" kern="1200">
+                <a:solidFill>
+                  <a:schemeClr val="tx1"/>
+                </a:solidFill>
+                <a:latin typeface="+mn-lt"/>
+                <a:ea typeface="+mn-ea"/>
+                <a:cs typeface="+mn-cs"/>
+              </a:defRPr>
+            </a:lvl8pPr>
+            <a:lvl9pPr marL="3886200" indent="-228600" algn="l" defTabSz="457200" rtl="0" eaLnBrk="1" latinLnBrk="0" hangingPunct="1">
+              <a:spcBef>
+                <a:spcPct val="20000"/>
+              </a:spcBef>
+              <a:buFont typeface="Arial"/>
+              <a:buChar char="•"/>
+              <a:defRPr sz="2000" kern="1200">
+                <a:solidFill>
+                  <a:schemeClr val="tx1"/>
+                </a:solidFill>
+                <a:latin typeface="+mn-lt"/>
+                <a:ea typeface="+mn-ea"/>
+                <a:cs typeface="+mn-cs"/>
+              </a:defRPr>
+            </a:lvl9pPr>
+          </a:lstStyle>
+          <a:p>
+            <a:r>
+              <a:rPr lang="en-US" sz="2000" dirty="0" err="1" smtClean="0">
+                <a:latin typeface="Menlo Regular"/>
+                <a:cs typeface="Menlo Regular"/>
+              </a:rPr>
+              <a:t>Xconnect</a:t>
+            </a:r>
+            <a:r>
+              <a:rPr lang="en-US" sz="2000" dirty="0" smtClean="0">
+                <a:latin typeface="Menlo Regular"/>
+                <a:cs typeface="Menlo Regular"/>
+              </a:rPr>
+              <a:t>(sock, </a:t>
+            </a:r>
+            <a:r>
+              <a:rPr lang="en-US" sz="2000" dirty="0" err="1" smtClean="0">
+                <a:latin typeface="Menlo Regular"/>
+                <a:cs typeface="Menlo Regular"/>
+              </a:rPr>
+              <a:t>dest_DAG</a:t>
+            </a:r>
+            <a:r>
+              <a:rPr lang="en-US" sz="2000" dirty="0">
+                <a:latin typeface="Menlo Regular"/>
+                <a:cs typeface="Menlo Regular"/>
+              </a:rPr>
+              <a:t>)</a:t>
+            </a:r>
+            <a:endParaRPr lang="en-US" sz="2000" dirty="0" smtClean="0">
+              <a:latin typeface="Menlo Regular"/>
+              <a:cs typeface="Menlo Regular"/>
+            </a:endParaRPr>
+          </a:p>
+          <a:p>
+            <a:r>
+              <a:rPr lang="en-US" sz="2000" dirty="0" err="1" smtClean="0">
+                <a:latin typeface="Menlo Regular"/>
+                <a:cs typeface="Menlo Regular"/>
+              </a:rPr>
+              <a:t>XconnectWithAnonymizer</a:t>
+            </a:r>
+            <a:r>
+              <a:rPr lang="en-US" sz="2000" dirty="0" smtClean="0">
+                <a:latin typeface="Menlo Regular"/>
+                <a:cs typeface="Menlo Regular"/>
+              </a:rPr>
+              <a:t>(sock, </a:t>
+            </a:r>
+            <a:r>
+              <a:rPr lang="en-US" sz="2000" dirty="0" err="1" smtClean="0">
+                <a:latin typeface="Menlo Regular"/>
+                <a:cs typeface="Menlo Regular"/>
+              </a:rPr>
+              <a:t>dest_DAG</a:t>
+            </a:r>
+            <a:r>
+              <a:rPr lang="en-US" sz="2000" dirty="0" smtClean="0">
+                <a:latin typeface="Menlo Regular"/>
+                <a:cs typeface="Menlo Regular"/>
+              </a:rPr>
+              <a:t>, </a:t>
+            </a:r>
+            <a:r>
+              <a:rPr lang="en-US" sz="2000" dirty="0" err="1" smtClean="0">
+                <a:latin typeface="Menlo Regular"/>
+                <a:cs typeface="Menlo Regular"/>
+              </a:rPr>
+              <a:t>anon_DAG</a:t>
+            </a:r>
+            <a:r>
+              <a:rPr lang="en-US" sz="2000" dirty="0" smtClean="0">
+                <a:latin typeface="Menlo Regular"/>
+                <a:cs typeface="Menlo Regular"/>
+              </a:rPr>
+              <a:t>)</a:t>
+            </a:r>
+          </a:p>
+          <a:p>
+            <a:r>
+              <a:rPr lang="en-US" sz="2000" dirty="0" err="1" smtClean="0">
+                <a:latin typeface="Menlo Regular"/>
+                <a:cs typeface="Menlo Regular"/>
+              </a:rPr>
+              <a:t>XconnectWithoutAnonymizer</a:t>
+            </a:r>
+            <a:r>
+              <a:rPr lang="en-US" sz="2000" dirty="0" smtClean="0">
+                <a:latin typeface="Menlo Regular"/>
+                <a:cs typeface="Menlo Regular"/>
+              </a:rPr>
+              <a:t>(sock, </a:t>
+            </a:r>
+            <a:r>
+              <a:rPr lang="en-US" sz="2000" dirty="0" err="1" smtClean="0">
+                <a:latin typeface="Menlo Regular"/>
+                <a:cs typeface="Menlo Regular"/>
+              </a:rPr>
+              <a:t>dest_DAG</a:t>
+            </a:r>
+            <a:r>
+              <a:rPr lang="en-US" sz="2000" dirty="0" smtClean="0">
+                <a:latin typeface="Menlo Regular"/>
+                <a:cs typeface="Menlo Regular"/>
+              </a:rPr>
+              <a:t>)</a:t>
+            </a:r>
+            <a:endParaRPr lang="en-US" sz="2000" dirty="0">
+              <a:latin typeface="Menlo Regular"/>
+              <a:cs typeface="Menlo Regular"/>
+            </a:endParaRPr>
           </a:p>
         </p:txBody>
       </p:sp>
     </p:spTree>
     <p:extLst>
       <p:ext uri="{BB962C8B-B14F-4D97-AF65-F5344CB8AC3E}">
+        <p14:creationId xmlns:p14="http://schemas.microsoft.com/office/powerpoint/2010/main" val="162243270"/>
+      </p:ext>
+    </p:extLst>
+  </p:cSld>
+  <p:clrMapOvr>
+    <a:masterClrMapping/>
+  </p:clrMapOvr>
+  <p:timing>
+    <p:tnLst>
+      <p:par>
+        <p:cTn xmlns:p14="http://schemas.microsoft.com/office/powerpoint/2010/main" id="1" dur="indefinite" restart="never" nodeType="tmRoot"/>
+      </p:par>
+    </p:tnLst>
+  </p:timing>
+</p:sld>
+</file>
+
+<file path=ppt/slides/slide12.xml><?xml version="1.0" encoding="utf-8"?>
+<p:sld xmlns:a="http://schemas.openxmlformats.org/drawingml/2006/main" xmlns:r="http://schemas.openxmlformats.org/officeDocument/2006/relationships" xmlns:p="http://schemas.openxmlformats.org/presentationml/2006/main">
+  <p:cSld>
+    <p:spTree>
+      <p:nvGrpSpPr>
+        <p:cNvPr id="1" name=""/>
+        <p:cNvGrpSpPr/>
+        <p:nvPr/>
+      </p:nvGrpSpPr>
+      <p:grpSpPr>
+        <a:xfrm>
+          <a:off x="0" y="0"/>
+          <a:ext cx="0" cy="0"/>
+          <a:chOff x="0" y="0"/>
+          <a:chExt cx="0" cy="0"/>
+        </a:xfrm>
+      </p:grpSpPr>
+      <p:sp>
+        <p:nvSpPr>
+          <p:cNvPr id="2" name="Title 1"/>
+          <p:cNvSpPr>
+            <a:spLocks noGrp="1"/>
+          </p:cNvSpPr>
+          <p:nvPr>
+            <p:ph type="title"/>
+          </p:nvPr>
+        </p:nvSpPr>
+        <p:spPr/>
+        <p:txBody>
+          <a:bodyPr/>
+          <a:lstStyle/>
+          <a:p>
+            <a:r>
+              <a:rPr lang="en-US" dirty="0" smtClean="0"/>
+              <a:t>Comparison</a:t>
+            </a:r>
+            <a:endParaRPr lang="en-US" dirty="0"/>
+          </a:p>
+        </p:txBody>
+      </p:sp>
+      <p:graphicFrame>
+        <p:nvGraphicFramePr>
+          <p:cNvPr id="4" name="Content Placeholder 3"/>
+          <p:cNvGraphicFramePr>
+            <a:graphicFrameLocks noGrp="1"/>
+          </p:cNvGraphicFramePr>
+          <p:nvPr>
+            <p:ph idx="1"/>
+            <p:extLst>
+              <p:ext uri="{D42A27DB-BD31-4B8C-83A1-F6EECF244321}">
+                <p14:modId xmlns:p14="http://schemas.microsoft.com/office/powerpoint/2010/main" val="3662202840"/>
+              </p:ext>
+            </p:extLst>
+          </p:nvPr>
+        </p:nvGraphicFramePr>
+        <p:xfrm>
+          <a:off x="457200" y="2559348"/>
+          <a:ext cx="8229600" cy="2026919"/>
+        </p:xfrm>
+        <a:graphic>
+          <a:graphicData uri="http://schemas.openxmlformats.org/drawingml/2006/table">
+            <a:tbl>
+              <a:tblPr firstRow="1" bandRow="1">
+                <a:tableStyleId>{3B4B98B0-60AC-42C2-AFA5-B58CD77FA1E5}</a:tableStyleId>
+              </a:tblPr>
+              <a:tblGrid>
+                <a:gridCol w="2743200"/>
+                <a:gridCol w="2743200"/>
+                <a:gridCol w="2743200"/>
+              </a:tblGrid>
+              <a:tr h="370840">
+                <a:tc>
+                  <a:txBody>
+                    <a:bodyPr/>
+                    <a:lstStyle/>
+                    <a:p>
+                      <a:endParaRPr lang="en-US" b="0" i="0" dirty="0">
+                        <a:latin typeface="Myriad Pro Cond"/>
+                        <a:cs typeface="Myriad Pro Cond"/>
+                      </a:endParaRPr>
+                    </a:p>
+                  </a:txBody>
+                  <a:tcPr/>
+                </a:tc>
+                <a:tc>
+                  <a:txBody>
+                    <a:bodyPr/>
+                    <a:lstStyle/>
+                    <a:p>
+                      <a:r>
+                        <a:rPr lang="en-US" b="1" i="0" dirty="0" smtClean="0">
+                          <a:latin typeface="Myriad Pro Cond"/>
+                          <a:cs typeface="Myriad Pro Cond"/>
+                        </a:rPr>
+                        <a:t>XIA</a:t>
+                      </a:r>
+                      <a:endParaRPr lang="en-US" b="1" i="0" dirty="0">
+                        <a:latin typeface="Myriad Pro Cond"/>
+                        <a:cs typeface="Myriad Pro Cond"/>
+                      </a:endParaRPr>
+                    </a:p>
+                  </a:txBody>
+                  <a:tcPr/>
+                </a:tc>
+                <a:tc>
+                  <a:txBody>
+                    <a:bodyPr/>
+                    <a:lstStyle/>
+                    <a:p>
+                      <a:r>
+                        <a:rPr lang="en-US" b="1" i="0" dirty="0" smtClean="0">
+                          <a:latin typeface="Myriad Pro Cond"/>
+                          <a:cs typeface="Myriad Pro Cond"/>
+                        </a:rPr>
+                        <a:t>TCP/IP</a:t>
+                      </a:r>
+                      <a:endParaRPr lang="en-US" b="1" i="0" dirty="0">
+                        <a:latin typeface="Myriad Pro Cond"/>
+                        <a:cs typeface="Myriad Pro Cond"/>
+                      </a:endParaRPr>
+                    </a:p>
+                  </a:txBody>
+                  <a:tcPr/>
+                </a:tc>
+              </a:tr>
+              <a:tr h="370840">
+                <a:tc>
+                  <a:txBody>
+                    <a:bodyPr/>
+                    <a:lstStyle/>
+                    <a:p>
+                      <a:r>
+                        <a:rPr lang="en-US" b="0" i="0" dirty="0" smtClean="0">
+                          <a:latin typeface="Myriad Pro Cond"/>
+                          <a:cs typeface="Myriad Pro Cond"/>
+                        </a:rPr>
+                        <a:t>Proxy-based </a:t>
+                      </a:r>
+                      <a:r>
+                        <a:rPr lang="en-US" b="0" i="0" dirty="0" err="1" smtClean="0">
+                          <a:latin typeface="Myriad Pro Cond"/>
+                          <a:cs typeface="Myriad Pro Cond"/>
+                        </a:rPr>
+                        <a:t>anonymizer</a:t>
+                      </a:r>
+                      <a:endParaRPr lang="en-US" b="0" i="0" dirty="0">
+                        <a:latin typeface="Myriad Pro Cond"/>
+                        <a:cs typeface="Myriad Pro Cond"/>
+                      </a:endParaRPr>
+                    </a:p>
+                  </a:txBody>
+                  <a:tcPr/>
+                </a:tc>
+                <a:tc>
+                  <a:txBody>
+                    <a:bodyPr/>
+                    <a:lstStyle/>
+                    <a:p>
+                      <a:pPr marL="285750" indent="-285750">
+                        <a:buFont typeface="Wingdings" charset="2"/>
+                        <a:buChar char="§"/>
+                      </a:pPr>
+                      <a:r>
+                        <a:rPr lang="en-US" b="0" i="0" dirty="0" smtClean="0">
+                          <a:latin typeface="Myriad Pro Cond"/>
+                          <a:cs typeface="Myriad Pro Cond"/>
+                        </a:rPr>
+                        <a:t>In-DAG or next-header</a:t>
+                      </a:r>
+                      <a:endParaRPr lang="en-US" b="0" i="0" dirty="0">
+                        <a:latin typeface="Myriad Pro Cond"/>
+                        <a:cs typeface="Myriad Pro Cond"/>
+                      </a:endParaRPr>
+                    </a:p>
+                  </a:txBody>
+                  <a:tcPr/>
+                </a:tc>
+                <a:tc>
+                  <a:txBody>
+                    <a:bodyPr/>
+                    <a:lstStyle/>
+                    <a:p>
+                      <a:pPr marL="285750" indent="-285750">
+                        <a:buFont typeface="Wingdings" charset="2"/>
+                        <a:buChar char="§"/>
+                      </a:pPr>
+                      <a:r>
+                        <a:rPr lang="en-US" b="0" i="0" dirty="0" smtClean="0">
+                          <a:latin typeface="Myriad Pro Cond"/>
+                          <a:cs typeface="Myriad Pro Cond"/>
+                        </a:rPr>
+                        <a:t>Next-header</a:t>
+                      </a:r>
+                      <a:endParaRPr lang="en-US" b="0" i="0" dirty="0">
+                        <a:latin typeface="Myriad Pro Cond"/>
+                        <a:cs typeface="Myriad Pro Cond"/>
+                      </a:endParaRPr>
+                    </a:p>
+                  </a:txBody>
+                  <a:tcPr/>
+                </a:tc>
+              </a:tr>
+              <a:tr h="370840">
+                <a:tc>
+                  <a:txBody>
+                    <a:bodyPr/>
+                    <a:lstStyle/>
+                    <a:p>
+                      <a:r>
+                        <a:rPr lang="en-US" b="0" i="0" dirty="0" smtClean="0">
+                          <a:latin typeface="Myriad Pro Cond"/>
+                          <a:cs typeface="Myriad Pro Cond"/>
+                        </a:rPr>
+                        <a:t>Temporary source IDs</a:t>
+                      </a:r>
+                      <a:endParaRPr lang="en-US" b="0" i="0" dirty="0">
+                        <a:latin typeface="Myriad Pro Cond"/>
+                        <a:cs typeface="Myriad Pro Cond"/>
+                      </a:endParaRPr>
+                    </a:p>
+                  </a:txBody>
+                  <a:tcPr/>
+                </a:tc>
+                <a:tc>
+                  <a:txBody>
+                    <a:bodyPr/>
+                    <a:lstStyle/>
+                    <a:p>
+                      <a:pPr marL="285750" indent="-285750">
+                        <a:buFont typeface="Wingdings" charset="2"/>
+                        <a:buChar char="§"/>
+                      </a:pPr>
+                      <a:r>
+                        <a:rPr lang="en-US" b="0" i="0" dirty="0" smtClean="0">
+                          <a:latin typeface="Myriad Pro Cond"/>
+                          <a:cs typeface="Myriad Pro Cond"/>
+                        </a:rPr>
+                        <a:t>Register SID with local AD</a:t>
+                      </a:r>
+                    </a:p>
+                    <a:p>
+                      <a:pPr marL="285750" indent="-285750">
+                        <a:buFont typeface="Wingdings" charset="2"/>
+                        <a:buChar char="§"/>
+                      </a:pPr>
+                      <a:r>
+                        <a:rPr lang="en-US" b="0" i="0" dirty="0" smtClean="0">
+                          <a:latin typeface="Myriad Pro Cond"/>
+                          <a:cs typeface="Myriad Pro Cond"/>
+                        </a:rPr>
+                        <a:t>Fine-grained:</a:t>
+                      </a:r>
+                      <a:r>
+                        <a:rPr lang="en-US" b="0" i="0" baseline="0" dirty="0" smtClean="0">
+                          <a:latin typeface="Myriad Pro Cond"/>
+                          <a:cs typeface="Myriad Pro Cond"/>
+                        </a:rPr>
+                        <a:t> different temp. SID per application</a:t>
+                      </a:r>
+                      <a:endParaRPr lang="en-US" b="0" i="0" dirty="0" smtClean="0">
+                        <a:latin typeface="Myriad Pro Cond"/>
+                        <a:cs typeface="Myriad Pro Cond"/>
+                      </a:endParaRPr>
+                    </a:p>
+                  </a:txBody>
+                  <a:tcPr/>
+                </a:tc>
+                <a:tc>
+                  <a:txBody>
+                    <a:bodyPr/>
+                    <a:lstStyle/>
+                    <a:p>
+                      <a:pPr marL="285750" indent="-285750">
+                        <a:buFont typeface="Wingdings" charset="2"/>
+                        <a:buChar char="§"/>
+                      </a:pPr>
+                      <a:r>
+                        <a:rPr lang="en-US" b="0" i="0" dirty="0" smtClean="0">
+                          <a:latin typeface="Myriad Pro Cond"/>
+                          <a:cs typeface="Myriad Pro Cond"/>
+                        </a:rPr>
+                        <a:t>Painful with</a:t>
+                      </a:r>
+                      <a:r>
+                        <a:rPr lang="en-US" b="0" i="0" baseline="0" dirty="0" smtClean="0">
+                          <a:latin typeface="Myriad Pro Cond"/>
+                          <a:cs typeface="Myriad Pro Cond"/>
+                        </a:rPr>
+                        <a:t> static IP addresses</a:t>
+                      </a:r>
+                    </a:p>
+                    <a:p>
+                      <a:pPr marL="285750" indent="-285750">
+                        <a:buFont typeface="Wingdings" charset="2"/>
+                        <a:buChar char="§"/>
+                      </a:pPr>
+                      <a:r>
+                        <a:rPr lang="en-US" b="0" i="0" baseline="0" dirty="0" smtClean="0">
+                          <a:latin typeface="Myriad Pro Cond"/>
+                          <a:cs typeface="Myriad Pro Cond"/>
+                        </a:rPr>
+                        <a:t>Coarse-grained: one IP address for all processes on machine</a:t>
+                      </a:r>
+                      <a:endParaRPr lang="en-US" b="0" i="0" dirty="0">
+                        <a:latin typeface="Myriad Pro Cond"/>
+                        <a:cs typeface="Myriad Pro Cond"/>
+                      </a:endParaRPr>
+                    </a:p>
+                  </a:txBody>
+                  <a:tcPr/>
+                </a:tc>
+              </a:tr>
+              <a:tr h="370840">
+                <a:tc>
+                  <a:txBody>
+                    <a:bodyPr/>
+                    <a:lstStyle/>
+                    <a:p>
+                      <a:r>
+                        <a:rPr lang="en-US" b="0" i="0" dirty="0" smtClean="0">
+                          <a:latin typeface="Myriad Pro Cond"/>
+                          <a:cs typeface="Myriad Pro Cond"/>
+                        </a:rPr>
+                        <a:t>Principal type filtering</a:t>
+                      </a:r>
+                      <a:endParaRPr lang="en-US" b="0" i="0" dirty="0">
+                        <a:latin typeface="Myriad Pro Cond"/>
+                        <a:cs typeface="Myriad Pro Cond"/>
+                      </a:endParaRPr>
+                    </a:p>
+                  </a:txBody>
+                  <a:tcPr/>
+                </a:tc>
+                <a:tc>
+                  <a:txBody>
+                    <a:bodyPr/>
+                    <a:lstStyle/>
+                    <a:p>
+                      <a:pPr marL="285750" indent="-285750">
+                        <a:buFont typeface="Wingdings" charset="2"/>
+                        <a:buChar char="§"/>
+                      </a:pPr>
+                      <a:r>
+                        <a:rPr lang="en-US" b="0" i="0" dirty="0" smtClean="0">
+                          <a:latin typeface="Myriad Pro Cond"/>
+                          <a:cs typeface="Myriad Pro Cond"/>
+                        </a:rPr>
+                        <a:t>Fine-grained traffic</a:t>
+                      </a:r>
+                      <a:r>
+                        <a:rPr lang="en-US" b="0" i="0" baseline="0" dirty="0" smtClean="0">
+                          <a:latin typeface="Myriad Pro Cond"/>
+                          <a:cs typeface="Myriad Pro Cond"/>
+                        </a:rPr>
+                        <a:t> control</a:t>
+                      </a:r>
+                      <a:endParaRPr lang="en-US" b="0" i="0" dirty="0">
+                        <a:latin typeface="Myriad Pro Cond"/>
+                        <a:cs typeface="Myriad Pro Cond"/>
+                      </a:endParaRPr>
+                    </a:p>
+                  </a:txBody>
+                  <a:tcPr/>
+                </a:tc>
+                <a:tc>
+                  <a:txBody>
+                    <a:bodyPr/>
+                    <a:lstStyle/>
+                    <a:p>
+                      <a:pPr marL="285750" indent="-285750">
+                        <a:buFont typeface="Wingdings" charset="2"/>
+                        <a:buChar char="§"/>
+                      </a:pPr>
+                      <a:r>
+                        <a:rPr lang="en-US" b="0" i="0" dirty="0" smtClean="0">
+                          <a:latin typeface="Myriad Pro Cond"/>
+                          <a:cs typeface="Myriad Pro Cond"/>
+                        </a:rPr>
+                        <a:t>N/A</a:t>
+                      </a:r>
+                      <a:endParaRPr lang="en-US" b="0" i="0" dirty="0">
+                        <a:latin typeface="Myriad Pro Cond"/>
+                        <a:cs typeface="Myriad Pro Cond"/>
+                      </a:endParaRPr>
+                    </a:p>
+                  </a:txBody>
+                  <a:tcPr/>
+                </a:tc>
+              </a:tr>
+            </a:tbl>
+          </a:graphicData>
+        </a:graphic>
+      </p:graphicFrame>
+    </p:spTree>
+    <p:extLst>
+      <p:ext uri="{BB962C8B-B14F-4D97-AF65-F5344CB8AC3E}">
         <p14:creationId xmlns:p14="http://schemas.microsoft.com/office/powerpoint/2010/main" val="4098030023"/>
+      </p:ext>
+    </p:extLst>
+  </p:cSld>
+  <p:clrMapOvr>
+    <a:masterClrMapping/>
+  </p:clrMapOvr>
+  <p:timing>
+    <p:tnLst>
+      <p:par>
+        <p:cTn xmlns:p14="http://schemas.microsoft.com/office/powerpoint/2010/main" id="1" dur="indefinite" restart="never" nodeType="tmRoot"/>
+      </p:par>
+    </p:tnLst>
+  </p:timing>
+</p:sld>
+</file>
+
+<file path=ppt/slides/slide13.xml><?xml version="1.0" encoding="utf-8"?>
+<p:sld xmlns:a="http://schemas.openxmlformats.org/drawingml/2006/main" xmlns:r="http://schemas.openxmlformats.org/officeDocument/2006/relationships" xmlns:p="http://schemas.openxmlformats.org/presentationml/2006/main">
+  <p:cSld>
+    <p:spTree>
+      <p:nvGrpSpPr>
+        <p:cNvPr id="1" name=""/>
+        <p:cNvGrpSpPr/>
+        <p:nvPr/>
+      </p:nvGrpSpPr>
+      <p:grpSpPr>
+        <a:xfrm>
+          <a:off x="0" y="0"/>
+          <a:ext cx="0" cy="0"/>
+          <a:chOff x="0" y="0"/>
+          <a:chExt cx="0" cy="0"/>
+        </a:xfrm>
+      </p:grpSpPr>
+      <p:sp>
+        <p:nvSpPr>
+          <p:cNvPr id="2" name="Title 1"/>
+          <p:cNvSpPr>
+            <a:spLocks noGrp="1"/>
+          </p:cNvSpPr>
+          <p:nvPr>
+            <p:ph type="title"/>
+          </p:nvPr>
+        </p:nvSpPr>
+        <p:spPr>
+          <a:xfrm>
+            <a:off x="457200" y="274637"/>
+            <a:ext cx="8229600" cy="6332487"/>
+          </a:xfrm>
+        </p:spPr>
+        <p:txBody>
+          <a:bodyPr/>
+          <a:lstStyle/>
+          <a:p>
+            <a:r>
+              <a:rPr lang="en-US" dirty="0" smtClean="0"/>
+              <a:t>Demo</a:t>
+            </a:r>
+            <a:endParaRPr lang="en-US" dirty="0"/>
+          </a:p>
+        </p:txBody>
+      </p:sp>
+    </p:spTree>
+    <p:extLst>
+      <p:ext uri="{BB962C8B-B14F-4D97-AF65-F5344CB8AC3E}">
+        <p14:creationId xmlns:p14="http://schemas.microsoft.com/office/powerpoint/2010/main" val="2652782660"/>
+      </p:ext>
+    </p:extLst>
+  </p:cSld>
+  <p:clrMapOvr>
+    <a:masterClrMapping/>
+  </p:clrMapOvr>
+</p:sld>
+</file>
+
+<file path=ppt/slides/slide14.xml><?xml version="1.0" encoding="utf-8"?>
+<p:sld xmlns:a="http://schemas.openxmlformats.org/drawingml/2006/main" xmlns:r="http://schemas.openxmlformats.org/officeDocument/2006/relationships" xmlns:p="http://schemas.openxmlformats.org/presentationml/2006/main">
+  <p:cSld>
+    <p:spTree>
+      <p:nvGrpSpPr>
+        <p:cNvPr id="1" name=""/>
+        <p:cNvGrpSpPr/>
+        <p:nvPr/>
+      </p:nvGrpSpPr>
+      <p:grpSpPr>
+        <a:xfrm>
+          <a:off x="0" y="0"/>
+          <a:ext cx="0" cy="0"/>
+          <a:chOff x="0" y="0"/>
+          <a:chExt cx="0" cy="0"/>
+        </a:xfrm>
+      </p:grpSpPr>
+      <p:sp>
+        <p:nvSpPr>
+          <p:cNvPr id="2" name="Title 1"/>
+          <p:cNvSpPr>
+            <a:spLocks noGrp="1"/>
+          </p:cNvSpPr>
+          <p:nvPr>
+            <p:ph type="title"/>
+          </p:nvPr>
+        </p:nvSpPr>
+        <p:spPr>
+          <a:xfrm>
+            <a:off x="457200" y="274637"/>
+            <a:ext cx="8229600" cy="6332487"/>
+          </a:xfrm>
+        </p:spPr>
+        <p:txBody>
+          <a:bodyPr/>
+          <a:lstStyle/>
+          <a:p>
+            <a:r>
+              <a:rPr lang="en-US" dirty="0" smtClean="0"/>
+              <a:t>Questions?</a:t>
+            </a:r>
+            <a:endParaRPr lang="en-US" dirty="0"/>
+          </a:p>
+        </p:txBody>
+      </p:sp>
+    </p:spTree>
+    <p:extLst>
+      <p:ext uri="{BB962C8B-B14F-4D97-AF65-F5344CB8AC3E}">
+        <p14:creationId xmlns:p14="http://schemas.microsoft.com/office/powerpoint/2010/main" val="3938621697"/>
       </p:ext>
     </p:extLst>
   </p:cSld>
@@ -3576,7 +5013,7 @@
   <p:timing>
     <p:tnLst>
       <p:par>
-        <p:cTn id="1" dur="indefinite" restart="never" nodeType="tmRoot"/>
+        <p:cTn xmlns:p14="http://schemas.microsoft.com/office/powerpoint/2010/main" id="1" dur="indefinite" restart="never" nodeType="tmRoot"/>
       </p:par>
     </p:tnLst>
   </p:timing>
@@ -3767,7 +5204,7 @@
               <a:tailEnd/>
             </a:ln>
             <a:extLst>
-              <a:ext uri="{909E8E84-426E-40DD-AFC4-6F175D3DCCD1}">
+              <a:ext uri="{909E8E84-426E-40dd-AFC4-6F175D3DCCD1}">
                 <a14:hiddenFill xmlns:a14="http://schemas.microsoft.com/office/drawing/2010/main">
                   <a:solidFill>
                     <a:srgbClr val="FFFFFF"/>
@@ -3814,7 +5251,7 @@
               <a:tailEnd/>
             </a:ln>
             <a:extLst>
-              <a:ext uri="{909E8E84-426E-40DD-AFC4-6F175D3DCCD1}">
+              <a:ext uri="{909E8E84-426E-40dd-AFC4-6F175D3DCCD1}">
                 <a14:hiddenFill xmlns:a14="http://schemas.microsoft.com/office/drawing/2010/main">
                   <a:solidFill>
                     <a:srgbClr val="FFFFFF"/>
@@ -3861,7 +5298,7 @@
               <a:tailEnd/>
             </a:ln>
             <a:extLst>
-              <a:ext uri="{909E8E84-426E-40DD-AFC4-6F175D3DCCD1}">
+              <a:ext uri="{909E8E84-426E-40dd-AFC4-6F175D3DCCD1}">
                 <a14:hiddenFill xmlns:a14="http://schemas.microsoft.com/office/drawing/2010/main">
                   <a:solidFill>
                     <a:srgbClr val="FFFFFF"/>
@@ -3911,7 +5348,7 @@
               <a:tailEnd type="arrow" w="med" len="med"/>
             </a:ln>
             <a:extLst>
-              <a:ext uri="{909E8E84-426E-40DD-AFC4-6F175D3DCCD1}">
+              <a:ext uri="{909E8E84-426E-40dd-AFC4-6F175D3DCCD1}">
                 <a14:hiddenFill xmlns:a14="http://schemas.microsoft.com/office/drawing/2010/main">
                   <a:noFill/>
                 </a14:hiddenFill>
@@ -3948,7 +5385,7 @@
               <a:tailEnd type="arrow" w="med" len="med"/>
             </a:ln>
             <a:extLst>
-              <a:ext uri="{909E8E84-426E-40DD-AFC4-6F175D3DCCD1}">
+              <a:ext uri="{909E8E84-426E-40dd-AFC4-6F175D3DCCD1}">
                 <a14:hiddenFill xmlns:a14="http://schemas.microsoft.com/office/drawing/2010/main">
                   <a:noFill/>
                 </a14:hiddenFill>
@@ -3984,7 +5421,7 @@
               <a:tailEnd type="arrow" w="med" len="med"/>
             </a:ln>
             <a:extLst>
-              <a:ext uri="{909E8E84-426E-40DD-AFC4-6F175D3DCCD1}">
+              <a:ext uri="{909E8E84-426E-40dd-AFC4-6F175D3DCCD1}">
                 <a14:hiddenFill xmlns:a14="http://schemas.microsoft.com/office/drawing/2010/main">
                   <a:noFill/>
                 </a14:hiddenFill>
@@ -4020,7 +5457,7 @@
               <a:tailEnd type="arrow" w="med" len="med"/>
             </a:ln>
             <a:extLst>
-              <a:ext uri="{909E8E84-426E-40DD-AFC4-6F175D3DCCD1}">
+              <a:ext uri="{909E8E84-426E-40dd-AFC4-6F175D3DCCD1}">
                 <a14:hiddenFill xmlns:a14="http://schemas.microsoft.com/office/drawing/2010/main">
                   <a:noFill/>
                 </a14:hiddenFill>
@@ -4058,7 +5495,7 @@
               <a:tailEnd type="arrow" w="med" len="med"/>
             </a:ln>
             <a:extLst>
-              <a:ext uri="{909E8E84-426E-40DD-AFC4-6F175D3DCCD1}">
+              <a:ext uri="{909E8E84-426E-40dd-AFC4-6F175D3DCCD1}">
                 <a14:hiddenFill xmlns:a14="http://schemas.microsoft.com/office/drawing/2010/main">
                   <a:noFill/>
                 </a14:hiddenFill>
@@ -4080,7 +5517,7 @@
   <p:timing>
     <p:tnLst>
       <p:par>
-        <p:cTn id="1" dur="indefinite" restart="never" nodeType="tmRoot"/>
+        <p:cTn xmlns:p14="http://schemas.microsoft.com/office/powerpoint/2010/main" id="1" dur="indefinite" restart="never" nodeType="tmRoot"/>
       </p:par>
     </p:tnLst>
   </p:timing>
@@ -5294,7 +6731,7 @@
   <p:timing>
     <p:tnLst>
       <p:par>
-        <p:cTn id="1" dur="indefinite" restart="never" nodeType="tmRoot"/>
+        <p:cTn xmlns:p14="http://schemas.microsoft.com/office/powerpoint/2010/main" id="1" dur="indefinite" restart="never" nodeType="tmRoot"/>
       </p:par>
     </p:tnLst>
   </p:timing>
@@ -5760,7 +7197,7 @@
               <a:tailEnd/>
             </a:ln>
             <a:extLst>
-              <a:ext uri="{909E8E84-426E-40DD-AFC4-6F175D3DCCD1}">
+              <a:ext uri="{909E8E84-426E-40dd-AFC4-6F175D3DCCD1}">
                 <a14:hiddenFill xmlns:a14="http://schemas.microsoft.com/office/drawing/2010/main">
                   <a:solidFill>
                     <a:srgbClr val="FFFFFF"/>
@@ -5826,7 +7263,7 @@
               <a:tailEnd type="arrow" w="med" len="med"/>
             </a:ln>
             <a:extLst>
-              <a:ext uri="{909E8E84-426E-40DD-AFC4-6F175D3DCCD1}">
+              <a:ext uri="{909E8E84-426E-40dd-AFC4-6F175D3DCCD1}">
                 <a14:hiddenFill xmlns:a14="http://schemas.microsoft.com/office/drawing/2010/main">
                   <a:noFill/>
                 </a14:hiddenFill>
@@ -5860,7 +7297,7 @@
               <a:tailEnd/>
             </a:ln>
             <a:extLst>
-              <a:ext uri="{909E8E84-426E-40DD-AFC4-6F175D3DCCD1}">
+              <a:ext uri="{909E8E84-426E-40dd-AFC4-6F175D3DCCD1}">
                 <a14:hiddenFill xmlns:a14="http://schemas.microsoft.com/office/drawing/2010/main">
                   <a:solidFill>
                     <a:srgbClr val="FFFFFF"/>
@@ -5926,7 +7363,7 @@
               <a:tailEnd type="arrow" w="med" len="med"/>
             </a:ln>
             <a:extLst>
-              <a:ext uri="{909E8E84-426E-40DD-AFC4-6F175D3DCCD1}">
+              <a:ext uri="{909E8E84-426E-40dd-AFC4-6F175D3DCCD1}">
                 <a14:hiddenFill xmlns:a14="http://schemas.microsoft.com/office/drawing/2010/main">
                   <a:noFill/>
                 </a14:hiddenFill>
@@ -5960,7 +7397,7 @@
               <a:tailEnd/>
             </a:ln>
             <a:extLst>
-              <a:ext uri="{909E8E84-426E-40DD-AFC4-6F175D3DCCD1}">
+              <a:ext uri="{909E8E84-426E-40dd-AFC4-6F175D3DCCD1}">
                 <a14:hiddenFill xmlns:a14="http://schemas.microsoft.com/office/drawing/2010/main">
                   <a:solidFill>
                     <a:srgbClr val="FFFFFF"/>
@@ -6026,7 +7463,7 @@
               <a:tailEnd type="arrow" w="med" len="med"/>
             </a:ln>
             <a:extLst>
-              <a:ext uri="{909E8E84-426E-40DD-AFC4-6F175D3DCCD1}">
+              <a:ext uri="{909E8E84-426E-40dd-AFC4-6F175D3DCCD1}">
                 <a14:hiddenFill xmlns:a14="http://schemas.microsoft.com/office/drawing/2010/main">
                   <a:noFill/>
                 </a14:hiddenFill>
@@ -6166,7 +7603,7 @@
               <a:tailEnd/>
             </a:ln>
             <a:extLst>
-              <a:ext uri="{909E8E84-426E-40DD-AFC4-6F175D3DCCD1}">
+              <a:ext uri="{909E8E84-426E-40dd-AFC4-6F175D3DCCD1}">
                 <a14:hiddenFill xmlns:a14="http://schemas.microsoft.com/office/drawing/2010/main">
                   <a:solidFill>
                     <a:srgbClr val="FFFFFF"/>
@@ -6232,7 +7669,7 @@
               <a:tailEnd type="arrow" w="med" len="med"/>
             </a:ln>
             <a:extLst>
-              <a:ext uri="{909E8E84-426E-40DD-AFC4-6F175D3DCCD1}">
+              <a:ext uri="{909E8E84-426E-40dd-AFC4-6F175D3DCCD1}">
                 <a14:hiddenFill xmlns:a14="http://schemas.microsoft.com/office/drawing/2010/main">
                   <a:noFill/>
                 </a14:hiddenFill>
@@ -6266,7 +7703,7 @@
               <a:tailEnd/>
             </a:ln>
             <a:extLst>
-              <a:ext uri="{909E8E84-426E-40DD-AFC4-6F175D3DCCD1}">
+              <a:ext uri="{909E8E84-426E-40dd-AFC4-6F175D3DCCD1}">
                 <a14:hiddenFill xmlns:a14="http://schemas.microsoft.com/office/drawing/2010/main">
                   <a:solidFill>
                     <a:srgbClr val="FFFFFF"/>
@@ -6332,7 +7769,7 @@
               <a:tailEnd type="arrow" w="med" len="med"/>
             </a:ln>
             <a:extLst>
-              <a:ext uri="{909E8E84-426E-40DD-AFC4-6F175D3DCCD1}">
+              <a:ext uri="{909E8E84-426E-40dd-AFC4-6F175D3DCCD1}">
                 <a14:hiddenFill xmlns:a14="http://schemas.microsoft.com/office/drawing/2010/main">
                   <a:noFill/>
                 </a14:hiddenFill>
@@ -6366,7 +7803,7 @@
               <a:tailEnd/>
             </a:ln>
             <a:extLst>
-              <a:ext uri="{909E8E84-426E-40DD-AFC4-6F175D3DCCD1}">
+              <a:ext uri="{909E8E84-426E-40dd-AFC4-6F175D3DCCD1}">
                 <a14:hiddenFill xmlns:a14="http://schemas.microsoft.com/office/drawing/2010/main">
                   <a:solidFill>
                     <a:srgbClr val="FFFFFF"/>
@@ -6432,7 +7869,7 @@
               <a:tailEnd type="arrow" w="med" len="med"/>
             </a:ln>
             <a:extLst>
-              <a:ext uri="{909E8E84-426E-40DD-AFC4-6F175D3DCCD1}">
+              <a:ext uri="{909E8E84-426E-40dd-AFC4-6F175D3DCCD1}">
                 <a14:hiddenFill xmlns:a14="http://schemas.microsoft.com/office/drawing/2010/main">
                   <a:noFill/>
                 </a14:hiddenFill>
@@ -6623,7 +8060,7 @@
               <a:tailEnd/>
             </a:ln>
             <a:extLst>
-              <a:ext uri="{909E8E84-426E-40DD-AFC4-6F175D3DCCD1}">
+              <a:ext uri="{909E8E84-426E-40dd-AFC4-6F175D3DCCD1}">
                 <a14:hiddenFill xmlns:a14="http://schemas.microsoft.com/office/drawing/2010/main">
                   <a:solidFill>
                     <a:srgbClr val="FFFFFF"/>
@@ -6689,7 +8126,7 @@
               <a:tailEnd type="arrow" w="med" len="med"/>
             </a:ln>
             <a:extLst>
-              <a:ext uri="{909E8E84-426E-40DD-AFC4-6F175D3DCCD1}">
+              <a:ext uri="{909E8E84-426E-40dd-AFC4-6F175D3DCCD1}">
                 <a14:hiddenFill xmlns:a14="http://schemas.microsoft.com/office/drawing/2010/main">
                   <a:noFill/>
                 </a14:hiddenFill>
@@ -6723,7 +8160,7 @@
               <a:tailEnd/>
             </a:ln>
             <a:extLst>
-              <a:ext uri="{909E8E84-426E-40DD-AFC4-6F175D3DCCD1}">
+              <a:ext uri="{909E8E84-426E-40dd-AFC4-6F175D3DCCD1}">
                 <a14:hiddenFill xmlns:a14="http://schemas.microsoft.com/office/drawing/2010/main">
                   <a:solidFill>
                     <a:srgbClr val="FFFFFF"/>
@@ -6789,7 +8226,7 @@
               <a:tailEnd type="arrow" w="med" len="med"/>
             </a:ln>
             <a:extLst>
-              <a:ext uri="{909E8E84-426E-40DD-AFC4-6F175D3DCCD1}">
+              <a:ext uri="{909E8E84-426E-40dd-AFC4-6F175D3DCCD1}">
                 <a14:hiddenFill xmlns:a14="http://schemas.microsoft.com/office/drawing/2010/main">
                   <a:noFill/>
                 </a14:hiddenFill>
@@ -6823,7 +8260,7 @@
               <a:tailEnd/>
             </a:ln>
             <a:extLst>
-              <a:ext uri="{909E8E84-426E-40DD-AFC4-6F175D3DCCD1}">
+              <a:ext uri="{909E8E84-426E-40dd-AFC4-6F175D3DCCD1}">
                 <a14:hiddenFill xmlns:a14="http://schemas.microsoft.com/office/drawing/2010/main">
                   <a:solidFill>
                     <a:srgbClr val="FFFFFF"/>
@@ -6889,7 +8326,7 @@
               <a:tailEnd type="arrow" w="med" len="med"/>
             </a:ln>
             <a:extLst>
-              <a:ext uri="{909E8E84-426E-40DD-AFC4-6F175D3DCCD1}">
+              <a:ext uri="{909E8E84-426E-40dd-AFC4-6F175D3DCCD1}">
                 <a14:hiddenFill xmlns:a14="http://schemas.microsoft.com/office/drawing/2010/main">
                   <a:noFill/>
                 </a14:hiddenFill>
@@ -7029,7 +8466,7 @@
               <a:tailEnd/>
             </a:ln>
             <a:extLst>
-              <a:ext uri="{909E8E84-426E-40DD-AFC4-6F175D3DCCD1}">
+              <a:ext uri="{909E8E84-426E-40dd-AFC4-6F175D3DCCD1}">
                 <a14:hiddenFill xmlns:a14="http://schemas.microsoft.com/office/drawing/2010/main">
                   <a:solidFill>
                     <a:srgbClr val="FFFFFF"/>
@@ -7095,7 +8532,7 @@
               <a:tailEnd type="arrow" w="med" len="med"/>
             </a:ln>
             <a:extLst>
-              <a:ext uri="{909E8E84-426E-40DD-AFC4-6F175D3DCCD1}">
+              <a:ext uri="{909E8E84-426E-40dd-AFC4-6F175D3DCCD1}">
                 <a14:hiddenFill xmlns:a14="http://schemas.microsoft.com/office/drawing/2010/main">
                   <a:noFill/>
                 </a14:hiddenFill>
@@ -7129,7 +8566,7 @@
               <a:tailEnd/>
             </a:ln>
             <a:extLst>
-              <a:ext uri="{909E8E84-426E-40DD-AFC4-6F175D3DCCD1}">
+              <a:ext uri="{909E8E84-426E-40dd-AFC4-6F175D3DCCD1}">
                 <a14:hiddenFill xmlns:a14="http://schemas.microsoft.com/office/drawing/2010/main">
                   <a:solidFill>
                     <a:srgbClr val="FFFFFF"/>
@@ -7195,7 +8632,7 @@
               <a:tailEnd type="arrow" w="med" len="med"/>
             </a:ln>
             <a:extLst>
-              <a:ext uri="{909E8E84-426E-40DD-AFC4-6F175D3DCCD1}">
+              <a:ext uri="{909E8E84-426E-40dd-AFC4-6F175D3DCCD1}">
                 <a14:hiddenFill xmlns:a14="http://schemas.microsoft.com/office/drawing/2010/main">
                   <a:noFill/>
                 </a14:hiddenFill>
@@ -7229,7 +8666,7 @@
               <a:tailEnd/>
             </a:ln>
             <a:extLst>
-              <a:ext uri="{909E8E84-426E-40DD-AFC4-6F175D3DCCD1}">
+              <a:ext uri="{909E8E84-426E-40dd-AFC4-6F175D3DCCD1}">
                 <a14:hiddenFill xmlns:a14="http://schemas.microsoft.com/office/drawing/2010/main">
                   <a:solidFill>
                     <a:srgbClr val="FFFFFF"/>
@@ -7295,7 +8732,7 @@
               <a:tailEnd type="arrow" w="med" len="med"/>
             </a:ln>
             <a:extLst>
-              <a:ext uri="{909E8E84-426E-40DD-AFC4-6F175D3DCCD1}">
+              <a:ext uri="{909E8E84-426E-40dd-AFC4-6F175D3DCCD1}">
                 <a14:hiddenFill xmlns:a14="http://schemas.microsoft.com/office/drawing/2010/main">
                   <a:noFill/>
                 </a14:hiddenFill>
@@ -7486,7 +8923,7 @@
               <a:tailEnd/>
             </a:ln>
             <a:extLst>
-              <a:ext uri="{909E8E84-426E-40DD-AFC4-6F175D3DCCD1}">
+              <a:ext uri="{909E8E84-426E-40dd-AFC4-6F175D3DCCD1}">
                 <a14:hiddenFill xmlns:a14="http://schemas.microsoft.com/office/drawing/2010/main">
                   <a:solidFill>
                     <a:srgbClr val="FFFFFF"/>
@@ -7552,7 +8989,7 @@
               <a:tailEnd type="arrow" w="med" len="med"/>
             </a:ln>
             <a:extLst>
-              <a:ext uri="{909E8E84-426E-40DD-AFC4-6F175D3DCCD1}">
+              <a:ext uri="{909E8E84-426E-40dd-AFC4-6F175D3DCCD1}">
                 <a14:hiddenFill xmlns:a14="http://schemas.microsoft.com/office/drawing/2010/main">
                   <a:noFill/>
                 </a14:hiddenFill>
@@ -7586,7 +9023,7 @@
               <a:tailEnd/>
             </a:ln>
             <a:extLst>
-              <a:ext uri="{909E8E84-426E-40DD-AFC4-6F175D3DCCD1}">
+              <a:ext uri="{909E8E84-426E-40dd-AFC4-6F175D3DCCD1}">
                 <a14:hiddenFill xmlns:a14="http://schemas.microsoft.com/office/drawing/2010/main">
                   <a:solidFill>
                     <a:srgbClr val="FFFFFF"/>
@@ -7652,7 +9089,7 @@
               <a:tailEnd type="arrow" w="med" len="med"/>
             </a:ln>
             <a:extLst>
-              <a:ext uri="{909E8E84-426E-40DD-AFC4-6F175D3DCCD1}">
+              <a:ext uri="{909E8E84-426E-40dd-AFC4-6F175D3DCCD1}">
                 <a14:hiddenFill xmlns:a14="http://schemas.microsoft.com/office/drawing/2010/main">
                   <a:noFill/>
                 </a14:hiddenFill>
@@ -7686,7 +9123,7 @@
               <a:tailEnd/>
             </a:ln>
             <a:extLst>
-              <a:ext uri="{909E8E84-426E-40DD-AFC4-6F175D3DCCD1}">
+              <a:ext uri="{909E8E84-426E-40dd-AFC4-6F175D3DCCD1}">
                 <a14:hiddenFill xmlns:a14="http://schemas.microsoft.com/office/drawing/2010/main">
                   <a:solidFill>
                     <a:srgbClr val="FFFFFF"/>
@@ -7752,7 +9189,7 @@
               <a:tailEnd type="arrow" w="med" len="med"/>
             </a:ln>
             <a:extLst>
-              <a:ext uri="{909E8E84-426E-40DD-AFC4-6F175D3DCCD1}">
+              <a:ext uri="{909E8E84-426E-40dd-AFC4-6F175D3DCCD1}">
                 <a14:hiddenFill xmlns:a14="http://schemas.microsoft.com/office/drawing/2010/main">
                   <a:noFill/>
                 </a14:hiddenFill>
@@ -7943,7 +9380,7 @@
               <a:tailEnd/>
             </a:ln>
             <a:extLst>
-              <a:ext uri="{909E8E84-426E-40DD-AFC4-6F175D3DCCD1}">
+              <a:ext uri="{909E8E84-426E-40dd-AFC4-6F175D3DCCD1}">
                 <a14:hiddenFill xmlns:a14="http://schemas.microsoft.com/office/drawing/2010/main">
                   <a:solidFill>
                     <a:srgbClr val="FFFFFF"/>
@@ -8004,7 +9441,7 @@
               <a:tailEnd type="arrow" w="med" len="med"/>
             </a:ln>
             <a:extLst>
-              <a:ext uri="{909E8E84-426E-40DD-AFC4-6F175D3DCCD1}">
+              <a:ext uri="{909E8E84-426E-40dd-AFC4-6F175D3DCCD1}">
                 <a14:hiddenFill xmlns:a14="http://schemas.microsoft.com/office/drawing/2010/main">
                   <a:noFill/>
                 </a14:hiddenFill>
@@ -8038,7 +9475,7 @@
               <a:tailEnd/>
             </a:ln>
             <a:extLst>
-              <a:ext uri="{909E8E84-426E-40DD-AFC4-6F175D3DCCD1}">
+              <a:ext uri="{909E8E84-426E-40dd-AFC4-6F175D3DCCD1}">
                 <a14:hiddenFill xmlns:a14="http://schemas.microsoft.com/office/drawing/2010/main">
                   <a:solidFill>
                     <a:srgbClr val="FFFFFF"/>
@@ -8104,7 +9541,7 @@
               <a:tailEnd type="arrow" w="med" len="med"/>
             </a:ln>
             <a:extLst>
-              <a:ext uri="{909E8E84-426E-40DD-AFC4-6F175D3DCCD1}">
+              <a:ext uri="{909E8E84-426E-40dd-AFC4-6F175D3DCCD1}">
                 <a14:hiddenFill xmlns:a14="http://schemas.microsoft.com/office/drawing/2010/main">
                   <a:noFill/>
                 </a14:hiddenFill>
@@ -8138,7 +9575,7 @@
               <a:tailEnd/>
             </a:ln>
             <a:extLst>
-              <a:ext uri="{909E8E84-426E-40DD-AFC4-6F175D3DCCD1}">
+              <a:ext uri="{909E8E84-426E-40dd-AFC4-6F175D3DCCD1}">
                 <a14:hiddenFill xmlns:a14="http://schemas.microsoft.com/office/drawing/2010/main">
                   <a:solidFill>
                     <a:srgbClr val="FFFFFF"/>
@@ -8204,7 +9641,7 @@
               <a:tailEnd type="arrow" w="med" len="med"/>
             </a:ln>
             <a:extLst>
-              <a:ext uri="{909E8E84-426E-40DD-AFC4-6F175D3DCCD1}">
+              <a:ext uri="{909E8E84-426E-40dd-AFC4-6F175D3DCCD1}">
                 <a14:hiddenFill xmlns:a14="http://schemas.microsoft.com/office/drawing/2010/main">
                   <a:noFill/>
                 </a14:hiddenFill>
@@ -8344,7 +9781,7 @@
               <a:tailEnd/>
             </a:ln>
             <a:extLst>
-              <a:ext uri="{909E8E84-426E-40DD-AFC4-6F175D3DCCD1}">
+              <a:ext uri="{909E8E84-426E-40dd-AFC4-6F175D3DCCD1}">
                 <a14:hiddenFill xmlns:a14="http://schemas.microsoft.com/office/drawing/2010/main">
                   <a:solidFill>
                     <a:srgbClr val="FFFFFF"/>
@@ -8410,7 +9847,7 @@
               <a:tailEnd type="arrow" w="med" len="med"/>
             </a:ln>
             <a:extLst>
-              <a:ext uri="{909E8E84-426E-40DD-AFC4-6F175D3DCCD1}">
+              <a:ext uri="{909E8E84-426E-40dd-AFC4-6F175D3DCCD1}">
                 <a14:hiddenFill xmlns:a14="http://schemas.microsoft.com/office/drawing/2010/main">
                   <a:noFill/>
                 </a14:hiddenFill>
@@ -8444,7 +9881,7 @@
               <a:tailEnd/>
             </a:ln>
             <a:extLst>
-              <a:ext uri="{909E8E84-426E-40DD-AFC4-6F175D3DCCD1}">
+              <a:ext uri="{909E8E84-426E-40dd-AFC4-6F175D3DCCD1}">
                 <a14:hiddenFill xmlns:a14="http://schemas.microsoft.com/office/drawing/2010/main">
                   <a:solidFill>
                     <a:srgbClr val="FFFFFF"/>
@@ -8510,7 +9947,7 @@
               <a:tailEnd type="arrow" w="med" len="med"/>
             </a:ln>
             <a:extLst>
-              <a:ext uri="{909E8E84-426E-40DD-AFC4-6F175D3DCCD1}">
+              <a:ext uri="{909E8E84-426E-40dd-AFC4-6F175D3DCCD1}">
                 <a14:hiddenFill xmlns:a14="http://schemas.microsoft.com/office/drawing/2010/main">
                   <a:noFill/>
                 </a14:hiddenFill>
@@ -8544,7 +9981,7 @@
               <a:tailEnd/>
             </a:ln>
             <a:extLst>
-              <a:ext uri="{909E8E84-426E-40DD-AFC4-6F175D3DCCD1}">
+              <a:ext uri="{909E8E84-426E-40dd-AFC4-6F175D3DCCD1}">
                 <a14:hiddenFill xmlns:a14="http://schemas.microsoft.com/office/drawing/2010/main">
                   <a:solidFill>
                     <a:srgbClr val="FFFFFF"/>
@@ -8610,7 +10047,7 @@
               <a:tailEnd type="arrow" w="med" len="med"/>
             </a:ln>
             <a:extLst>
-              <a:ext uri="{909E8E84-426E-40DD-AFC4-6F175D3DCCD1}">
+              <a:ext uri="{909E8E84-426E-40dd-AFC4-6F175D3DCCD1}">
                 <a14:hiddenFill xmlns:a14="http://schemas.microsoft.com/office/drawing/2010/main">
                   <a:noFill/>
                 </a14:hiddenFill>
@@ -8844,7 +10281,7 @@
               <a:tailEnd/>
             </a:ln>
             <a:extLst>
-              <a:ext uri="{909E8E84-426E-40DD-AFC4-6F175D3DCCD1}">
+              <a:ext uri="{909E8E84-426E-40dd-AFC4-6F175D3DCCD1}">
                 <a14:hiddenFill xmlns:a14="http://schemas.microsoft.com/office/drawing/2010/main">
                   <a:solidFill>
                     <a:srgbClr val="FFFFFF"/>
@@ -8910,7 +10347,7 @@
               <a:tailEnd type="arrow" w="med" len="med"/>
             </a:ln>
             <a:extLst>
-              <a:ext uri="{909E8E84-426E-40DD-AFC4-6F175D3DCCD1}">
+              <a:ext uri="{909E8E84-426E-40dd-AFC4-6F175D3DCCD1}">
                 <a14:hiddenFill xmlns:a14="http://schemas.microsoft.com/office/drawing/2010/main">
                   <a:noFill/>
                 </a14:hiddenFill>
@@ -8944,7 +10381,7 @@
               <a:tailEnd/>
             </a:ln>
             <a:extLst>
-              <a:ext uri="{909E8E84-426E-40DD-AFC4-6F175D3DCCD1}">
+              <a:ext uri="{909E8E84-426E-40dd-AFC4-6F175D3DCCD1}">
                 <a14:hiddenFill xmlns:a14="http://schemas.microsoft.com/office/drawing/2010/main">
                   <a:solidFill>
                     <a:srgbClr val="FFFFFF"/>
@@ -9010,7 +10447,7 @@
               <a:tailEnd type="arrow" w="med" len="med"/>
             </a:ln>
             <a:extLst>
-              <a:ext uri="{909E8E84-426E-40DD-AFC4-6F175D3DCCD1}">
+              <a:ext uri="{909E8E84-426E-40dd-AFC4-6F175D3DCCD1}">
                 <a14:hiddenFill xmlns:a14="http://schemas.microsoft.com/office/drawing/2010/main">
                   <a:noFill/>
                 </a14:hiddenFill>
@@ -9044,7 +10481,7 @@
               <a:tailEnd/>
             </a:ln>
             <a:extLst>
-              <a:ext uri="{909E8E84-426E-40DD-AFC4-6F175D3DCCD1}">
+              <a:ext uri="{909E8E84-426E-40dd-AFC4-6F175D3DCCD1}">
                 <a14:hiddenFill xmlns:a14="http://schemas.microsoft.com/office/drawing/2010/main">
                   <a:solidFill>
                     <a:srgbClr val="FFFFFF"/>
@@ -9110,7 +10547,7 @@
               <a:tailEnd type="arrow" w="med" len="med"/>
             </a:ln>
             <a:extLst>
-              <a:ext uri="{909E8E84-426E-40DD-AFC4-6F175D3DCCD1}">
+              <a:ext uri="{909E8E84-426E-40dd-AFC4-6F175D3DCCD1}">
                 <a14:hiddenFill xmlns:a14="http://schemas.microsoft.com/office/drawing/2010/main">
                   <a:noFill/>
                 </a14:hiddenFill>
@@ -9250,7 +10687,7 @@
               <a:tailEnd/>
             </a:ln>
             <a:extLst>
-              <a:ext uri="{909E8E84-426E-40DD-AFC4-6F175D3DCCD1}">
+              <a:ext uri="{909E8E84-426E-40dd-AFC4-6F175D3DCCD1}">
                 <a14:hiddenFill xmlns:a14="http://schemas.microsoft.com/office/drawing/2010/main">
                   <a:solidFill>
                     <a:srgbClr val="FFFFFF"/>
@@ -9316,7 +10753,7 @@
               <a:tailEnd type="arrow" w="med" len="med"/>
             </a:ln>
             <a:extLst>
-              <a:ext uri="{909E8E84-426E-40DD-AFC4-6F175D3DCCD1}">
+              <a:ext uri="{909E8E84-426E-40dd-AFC4-6F175D3DCCD1}">
                 <a14:hiddenFill xmlns:a14="http://schemas.microsoft.com/office/drawing/2010/main">
                   <a:noFill/>
                 </a14:hiddenFill>
@@ -9350,7 +10787,7 @@
               <a:tailEnd/>
             </a:ln>
             <a:extLst>
-              <a:ext uri="{909E8E84-426E-40DD-AFC4-6F175D3DCCD1}">
+              <a:ext uri="{909E8E84-426E-40dd-AFC4-6F175D3DCCD1}">
                 <a14:hiddenFill xmlns:a14="http://schemas.microsoft.com/office/drawing/2010/main">
                   <a:solidFill>
                     <a:srgbClr val="FFFFFF"/>
@@ -9416,7 +10853,7 @@
               <a:tailEnd type="arrow" w="med" len="med"/>
             </a:ln>
             <a:extLst>
-              <a:ext uri="{909E8E84-426E-40DD-AFC4-6F175D3DCCD1}">
+              <a:ext uri="{909E8E84-426E-40dd-AFC4-6F175D3DCCD1}">
                 <a14:hiddenFill xmlns:a14="http://schemas.microsoft.com/office/drawing/2010/main">
                   <a:noFill/>
                 </a14:hiddenFill>
@@ -9450,7 +10887,7 @@
               <a:tailEnd/>
             </a:ln>
             <a:extLst>
-              <a:ext uri="{909E8E84-426E-40DD-AFC4-6F175D3DCCD1}">
+              <a:ext uri="{909E8E84-426E-40dd-AFC4-6F175D3DCCD1}">
                 <a14:hiddenFill xmlns:a14="http://schemas.microsoft.com/office/drawing/2010/main">
                   <a:solidFill>
                     <a:srgbClr val="FFFFFF"/>
@@ -9516,7 +10953,7 @@
               <a:tailEnd type="arrow" w="med" len="med"/>
             </a:ln>
             <a:extLst>
-              <a:ext uri="{909E8E84-426E-40DD-AFC4-6F175D3DCCD1}">
+              <a:ext uri="{909E8E84-426E-40dd-AFC4-6F175D3DCCD1}">
                 <a14:hiddenFill xmlns:a14="http://schemas.microsoft.com/office/drawing/2010/main">
                   <a:noFill/>
                 </a14:hiddenFill>
@@ -9657,7 +11094,7 @@
               <a:tailEnd/>
             </a:ln>
             <a:extLst>
-              <a:ext uri="{909E8E84-426E-40DD-AFC4-6F175D3DCCD1}">
+              <a:ext uri="{909E8E84-426E-40dd-AFC4-6F175D3DCCD1}">
                 <a14:hiddenFill xmlns:a14="http://schemas.microsoft.com/office/drawing/2010/main">
                   <a:solidFill>
                     <a:srgbClr val="FFFFFF"/>
@@ -9718,7 +11155,7 @@
               <a:tailEnd type="arrow" w="med" len="med"/>
             </a:ln>
             <a:extLst>
-              <a:ext uri="{909E8E84-426E-40DD-AFC4-6F175D3DCCD1}">
+              <a:ext uri="{909E8E84-426E-40dd-AFC4-6F175D3DCCD1}">
                 <a14:hiddenFill xmlns:a14="http://schemas.microsoft.com/office/drawing/2010/main">
                   <a:noFill/>
                 </a14:hiddenFill>
@@ -9752,7 +11189,7 @@
               <a:tailEnd/>
             </a:ln>
             <a:extLst>
-              <a:ext uri="{909E8E84-426E-40DD-AFC4-6F175D3DCCD1}">
+              <a:ext uri="{909E8E84-426E-40dd-AFC4-6F175D3DCCD1}">
                 <a14:hiddenFill xmlns:a14="http://schemas.microsoft.com/office/drawing/2010/main">
                   <a:solidFill>
                     <a:srgbClr val="FFFFFF"/>
@@ -9818,7 +11255,7 @@
               <a:tailEnd type="arrow" w="med" len="med"/>
             </a:ln>
             <a:extLst>
-              <a:ext uri="{909E8E84-426E-40DD-AFC4-6F175D3DCCD1}">
+              <a:ext uri="{909E8E84-426E-40dd-AFC4-6F175D3DCCD1}">
                 <a14:hiddenFill xmlns:a14="http://schemas.microsoft.com/office/drawing/2010/main">
                   <a:noFill/>
                 </a14:hiddenFill>
@@ -9852,7 +11289,7 @@
               <a:tailEnd/>
             </a:ln>
             <a:extLst>
-              <a:ext uri="{909E8E84-426E-40DD-AFC4-6F175D3DCCD1}">
+              <a:ext uri="{909E8E84-426E-40dd-AFC4-6F175D3DCCD1}">
                 <a14:hiddenFill xmlns:a14="http://schemas.microsoft.com/office/drawing/2010/main">
                   <a:solidFill>
                     <a:srgbClr val="FFFFFF"/>
@@ -9918,7 +11355,7 @@
               <a:tailEnd type="arrow" w="med" len="med"/>
             </a:ln>
             <a:extLst>
-              <a:ext uri="{909E8E84-426E-40DD-AFC4-6F175D3DCCD1}">
+              <a:ext uri="{909E8E84-426E-40dd-AFC4-6F175D3DCCD1}">
                 <a14:hiddenFill xmlns:a14="http://schemas.microsoft.com/office/drawing/2010/main">
                   <a:noFill/>
                 </a14:hiddenFill>
@@ -10004,7 +11441,7 @@
               <a:tailEnd/>
             </a:ln>
             <a:extLst>
-              <a:ext uri="{909E8E84-426E-40DD-AFC4-6F175D3DCCD1}">
+              <a:ext uri="{909E8E84-426E-40dd-AFC4-6F175D3DCCD1}">
                 <a14:hiddenFill xmlns:a14="http://schemas.microsoft.com/office/drawing/2010/main">
                   <a:solidFill>
                     <a:srgbClr val="FFFFFF"/>
@@ -10054,7 +11491,7 @@
               <a:tailEnd type="arrow" w="med" len="med"/>
             </a:ln>
             <a:extLst>
-              <a:ext uri="{909E8E84-426E-40DD-AFC4-6F175D3DCCD1}">
+              <a:ext uri="{909E8E84-426E-40dd-AFC4-6F175D3DCCD1}">
                 <a14:hiddenFill xmlns:a14="http://schemas.microsoft.com/office/drawing/2010/main">
                   <a:noFill/>
                 </a14:hiddenFill>
@@ -10088,7 +11525,7 @@
               <a:tailEnd/>
             </a:ln>
             <a:extLst>
-              <a:ext uri="{909E8E84-426E-40DD-AFC4-6F175D3DCCD1}">
+              <a:ext uri="{909E8E84-426E-40dd-AFC4-6F175D3DCCD1}">
                 <a14:hiddenFill xmlns:a14="http://schemas.microsoft.com/office/drawing/2010/main">
                   <a:solidFill>
                     <a:srgbClr val="FFFFFF"/>
@@ -10138,7 +11575,7 @@
               <a:tailEnd type="arrow" w="med" len="med"/>
             </a:ln>
             <a:extLst>
-              <a:ext uri="{909E8E84-426E-40DD-AFC4-6F175D3DCCD1}">
+              <a:ext uri="{909E8E84-426E-40dd-AFC4-6F175D3DCCD1}">
                 <a14:hiddenFill xmlns:a14="http://schemas.microsoft.com/office/drawing/2010/main">
                   <a:noFill/>
                 </a14:hiddenFill>
@@ -10172,7 +11609,7 @@
               <a:tailEnd/>
             </a:ln>
             <a:extLst>
-              <a:ext uri="{909E8E84-426E-40DD-AFC4-6F175D3DCCD1}">
+              <a:ext uri="{909E8E84-426E-40dd-AFC4-6F175D3DCCD1}">
                 <a14:hiddenFill xmlns:a14="http://schemas.microsoft.com/office/drawing/2010/main">
                   <a:solidFill>
                     <a:srgbClr val="FFFFFF"/>
@@ -10222,7 +11659,7 @@
               <a:tailEnd type="arrow" w="med" len="med"/>
             </a:ln>
             <a:extLst>
-              <a:ext uri="{909E8E84-426E-40DD-AFC4-6F175D3DCCD1}">
+              <a:ext uri="{909E8E84-426E-40dd-AFC4-6F175D3DCCD1}">
                 <a14:hiddenFill xmlns:a14="http://schemas.microsoft.com/office/drawing/2010/main">
                   <a:noFill/>
                 </a14:hiddenFill>
@@ -10308,7 +11745,7 @@
               <a:tailEnd/>
             </a:ln>
             <a:extLst>
-              <a:ext uri="{909E8E84-426E-40DD-AFC4-6F175D3DCCD1}">
+              <a:ext uri="{909E8E84-426E-40dd-AFC4-6F175D3DCCD1}">
                 <a14:hiddenFill xmlns:a14="http://schemas.microsoft.com/office/drawing/2010/main">
                   <a:solidFill>
                     <a:srgbClr val="FFFFFF"/>
@@ -10358,7 +11795,7 @@
               <a:tailEnd type="arrow" w="med" len="med"/>
             </a:ln>
             <a:extLst>
-              <a:ext uri="{909E8E84-426E-40DD-AFC4-6F175D3DCCD1}">
+              <a:ext uri="{909E8E84-426E-40dd-AFC4-6F175D3DCCD1}">
                 <a14:hiddenFill xmlns:a14="http://schemas.microsoft.com/office/drawing/2010/main">
                   <a:noFill/>
                 </a14:hiddenFill>
@@ -10392,7 +11829,7 @@
               <a:tailEnd/>
             </a:ln>
             <a:extLst>
-              <a:ext uri="{909E8E84-426E-40DD-AFC4-6F175D3DCCD1}">
+              <a:ext uri="{909E8E84-426E-40dd-AFC4-6F175D3DCCD1}">
                 <a14:hiddenFill xmlns:a14="http://schemas.microsoft.com/office/drawing/2010/main">
                   <a:solidFill>
                     <a:srgbClr val="FFFFFF"/>
@@ -10442,7 +11879,7 @@
               <a:tailEnd type="arrow" w="med" len="med"/>
             </a:ln>
             <a:extLst>
-              <a:ext uri="{909E8E84-426E-40DD-AFC4-6F175D3DCCD1}">
+              <a:ext uri="{909E8E84-426E-40dd-AFC4-6F175D3DCCD1}">
                 <a14:hiddenFill xmlns:a14="http://schemas.microsoft.com/office/drawing/2010/main">
                   <a:noFill/>
                 </a14:hiddenFill>
@@ -10476,7 +11913,7 @@
               <a:tailEnd/>
             </a:ln>
             <a:extLst>
-              <a:ext uri="{909E8E84-426E-40DD-AFC4-6F175D3DCCD1}">
+              <a:ext uri="{909E8E84-426E-40dd-AFC4-6F175D3DCCD1}">
                 <a14:hiddenFill xmlns:a14="http://schemas.microsoft.com/office/drawing/2010/main">
                   <a:solidFill>
                     <a:srgbClr val="FFFFFF"/>
@@ -10526,7 +11963,7 @@
               <a:tailEnd type="arrow" w="med" len="med"/>
             </a:ln>
             <a:extLst>
-              <a:ext uri="{909E8E84-426E-40DD-AFC4-6F175D3DCCD1}">
+              <a:ext uri="{909E8E84-426E-40dd-AFC4-6F175D3DCCD1}">
                 <a14:hiddenFill xmlns:a14="http://schemas.microsoft.com/office/drawing/2010/main">
                   <a:noFill/>
                 </a14:hiddenFill>
@@ -10612,7 +12049,7 @@
               <a:tailEnd/>
             </a:ln>
             <a:extLst>
-              <a:ext uri="{909E8E84-426E-40DD-AFC4-6F175D3DCCD1}">
+              <a:ext uri="{909E8E84-426E-40dd-AFC4-6F175D3DCCD1}">
                 <a14:hiddenFill xmlns:a14="http://schemas.microsoft.com/office/drawing/2010/main">
                   <a:solidFill>
                     <a:srgbClr val="FFFFFF"/>
@@ -10662,7 +12099,7 @@
               <a:tailEnd type="arrow" w="med" len="med"/>
             </a:ln>
             <a:extLst>
-              <a:ext uri="{909E8E84-426E-40DD-AFC4-6F175D3DCCD1}">
+              <a:ext uri="{909E8E84-426E-40dd-AFC4-6F175D3DCCD1}">
                 <a14:hiddenFill xmlns:a14="http://schemas.microsoft.com/office/drawing/2010/main">
                   <a:noFill/>
                 </a14:hiddenFill>
@@ -10696,7 +12133,7 @@
               <a:tailEnd/>
             </a:ln>
             <a:extLst>
-              <a:ext uri="{909E8E84-426E-40DD-AFC4-6F175D3DCCD1}">
+              <a:ext uri="{909E8E84-426E-40dd-AFC4-6F175D3DCCD1}">
                 <a14:hiddenFill xmlns:a14="http://schemas.microsoft.com/office/drawing/2010/main">
                   <a:solidFill>
                     <a:srgbClr val="FFFFFF"/>
@@ -10746,7 +12183,7 @@
               <a:tailEnd type="arrow" w="med" len="med"/>
             </a:ln>
             <a:extLst>
-              <a:ext uri="{909E8E84-426E-40DD-AFC4-6F175D3DCCD1}">
+              <a:ext uri="{909E8E84-426E-40dd-AFC4-6F175D3DCCD1}">
                 <a14:hiddenFill xmlns:a14="http://schemas.microsoft.com/office/drawing/2010/main">
                   <a:noFill/>
                 </a14:hiddenFill>
@@ -10780,7 +12217,7 @@
               <a:tailEnd/>
             </a:ln>
             <a:extLst>
-              <a:ext uri="{909E8E84-426E-40DD-AFC4-6F175D3DCCD1}">
+              <a:ext uri="{909E8E84-426E-40dd-AFC4-6F175D3DCCD1}">
                 <a14:hiddenFill xmlns:a14="http://schemas.microsoft.com/office/drawing/2010/main">
                   <a:solidFill>
                     <a:srgbClr val="FFFFFF"/>
@@ -10830,7 +12267,7 @@
               <a:tailEnd type="arrow" w="med" len="med"/>
             </a:ln>
             <a:extLst>
-              <a:ext uri="{909E8E84-426E-40DD-AFC4-6F175D3DCCD1}">
+              <a:ext uri="{909E8E84-426E-40dd-AFC4-6F175D3DCCD1}">
                 <a14:hiddenFill xmlns:a14="http://schemas.microsoft.com/office/drawing/2010/main">
                   <a:noFill/>
                 </a14:hiddenFill>
@@ -10852,7 +12289,7 @@
   <p:timing>
     <p:tnLst>
       <p:par>
-        <p:cTn id="1" dur="indefinite" restart="never" nodeType="tmRoot"/>
+        <p:cTn xmlns:p14="http://schemas.microsoft.com/office/powerpoint/2010/main" id="1" dur="indefinite" restart="never" nodeType="tmRoot"/>
       </p:par>
     </p:tnLst>
   </p:timing>
@@ -11006,7 +12443,7 @@
               <a:tailEnd/>
             </a:ln>
             <a:extLst>
-              <a:ext uri="{909E8E84-426E-40DD-AFC4-6F175D3DCCD1}">
+              <a:ext uri="{909E8E84-426E-40dd-AFC4-6F175D3DCCD1}">
                 <a14:hiddenFill xmlns:a14="http://schemas.microsoft.com/office/drawing/2010/main">
                   <a:solidFill>
                     <a:srgbClr val="FFFFFF"/>
@@ -11058,7 +12495,7 @@
               <a:tailEnd/>
             </a:ln>
             <a:extLst>
-              <a:ext uri="{909E8E84-426E-40DD-AFC4-6F175D3DCCD1}">
+              <a:ext uri="{909E8E84-426E-40dd-AFC4-6F175D3DCCD1}">
                 <a14:hiddenFill xmlns:a14="http://schemas.microsoft.com/office/drawing/2010/main">
                   <a:solidFill>
                     <a:srgbClr val="FFFFFF"/>
@@ -11110,7 +12547,7 @@
               <a:tailEnd/>
             </a:ln>
             <a:extLst>
-              <a:ext uri="{909E8E84-426E-40DD-AFC4-6F175D3DCCD1}">
+              <a:ext uri="{909E8E84-426E-40dd-AFC4-6F175D3DCCD1}">
                 <a14:hiddenFill xmlns:a14="http://schemas.microsoft.com/office/drawing/2010/main">
                   <a:solidFill>
                     <a:srgbClr val="FFFFFF"/>
@@ -11165,7 +12602,7 @@
               <a:tailEnd type="arrow" w="med" len="med"/>
             </a:ln>
             <a:extLst>
-              <a:ext uri="{909E8E84-426E-40DD-AFC4-6F175D3DCCD1}">
+              <a:ext uri="{909E8E84-426E-40dd-AFC4-6F175D3DCCD1}">
                 <a14:hiddenFill xmlns:a14="http://schemas.microsoft.com/office/drawing/2010/main">
                   <a:noFill/>
                 </a14:hiddenFill>
@@ -11202,7 +12639,7 @@
               <a:tailEnd type="arrow" w="med" len="med"/>
             </a:ln>
             <a:extLst>
-              <a:ext uri="{909E8E84-426E-40DD-AFC4-6F175D3DCCD1}">
+              <a:ext uri="{909E8E84-426E-40dd-AFC4-6F175D3DCCD1}">
                 <a14:hiddenFill xmlns:a14="http://schemas.microsoft.com/office/drawing/2010/main">
                   <a:noFill/>
                 </a14:hiddenFill>
@@ -11238,7 +12675,7 @@
               <a:tailEnd type="arrow" w="med" len="med"/>
             </a:ln>
             <a:extLst>
-              <a:ext uri="{909E8E84-426E-40DD-AFC4-6F175D3DCCD1}">
+              <a:ext uri="{909E8E84-426E-40dd-AFC4-6F175D3DCCD1}">
                 <a14:hiddenFill xmlns:a14="http://schemas.microsoft.com/office/drawing/2010/main">
                   <a:noFill/>
                 </a14:hiddenFill>
@@ -11274,7 +12711,7 @@
               <a:tailEnd type="arrow" w="med" len="med"/>
             </a:ln>
             <a:extLst>
-              <a:ext uri="{909E8E84-426E-40DD-AFC4-6F175D3DCCD1}">
+              <a:ext uri="{909E8E84-426E-40dd-AFC4-6F175D3DCCD1}">
                 <a14:hiddenFill xmlns:a14="http://schemas.microsoft.com/office/drawing/2010/main">
                   <a:noFill/>
                 </a14:hiddenFill>
@@ -11312,7 +12749,7 @@
               <a:tailEnd type="arrow" w="med" len="med"/>
             </a:ln>
             <a:extLst>
-              <a:ext uri="{909E8E84-426E-40DD-AFC4-6F175D3DCCD1}">
+              <a:ext uri="{909E8E84-426E-40dd-AFC4-6F175D3DCCD1}">
                 <a14:hiddenFill xmlns:a14="http://schemas.microsoft.com/office/drawing/2010/main">
                   <a:noFill/>
                 </a14:hiddenFill>
@@ -11346,7 +12783,7 @@
               <a:tailEnd/>
             </a:ln>
             <a:extLst>
-              <a:ext uri="{909E8E84-426E-40DD-AFC4-6F175D3DCCD1}">
+              <a:ext uri="{909E8E84-426E-40dd-AFC4-6F175D3DCCD1}">
                 <a14:hiddenFill xmlns:a14="http://schemas.microsoft.com/office/drawing/2010/main">
                   <a:solidFill>
                     <a:srgbClr val="FFFFFF"/>
@@ -11398,7 +12835,7 @@
               <a:tailEnd/>
             </a:ln>
             <a:extLst>
-              <a:ext uri="{909E8E84-426E-40DD-AFC4-6F175D3DCCD1}">
+              <a:ext uri="{909E8E84-426E-40dd-AFC4-6F175D3DCCD1}">
                 <a14:hiddenFill xmlns:a14="http://schemas.microsoft.com/office/drawing/2010/main">
                   <a:solidFill>
                     <a:srgbClr val="FFFFFF"/>
@@ -11450,7 +12887,7 @@
               <a:tailEnd/>
             </a:ln>
             <a:extLst>
-              <a:ext uri="{909E8E84-426E-40DD-AFC4-6F175D3DCCD1}">
+              <a:ext uri="{909E8E84-426E-40dd-AFC4-6F175D3DCCD1}">
                 <a14:hiddenFill xmlns:a14="http://schemas.microsoft.com/office/drawing/2010/main">
                   <a:solidFill>
                     <a:srgbClr val="FFFFFF"/>
@@ -11505,7 +12942,7 @@
               <a:tailEnd type="arrow" w="med" len="med"/>
             </a:ln>
             <a:extLst>
-              <a:ext uri="{909E8E84-426E-40DD-AFC4-6F175D3DCCD1}">
+              <a:ext uri="{909E8E84-426E-40dd-AFC4-6F175D3DCCD1}">
                 <a14:hiddenFill xmlns:a14="http://schemas.microsoft.com/office/drawing/2010/main">
                   <a:noFill/>
                 </a14:hiddenFill>
@@ -11542,7 +12979,7 @@
               <a:tailEnd type="arrow" w="med" len="med"/>
             </a:ln>
             <a:extLst>
-              <a:ext uri="{909E8E84-426E-40DD-AFC4-6F175D3DCCD1}">
+              <a:ext uri="{909E8E84-426E-40dd-AFC4-6F175D3DCCD1}">
                 <a14:hiddenFill xmlns:a14="http://schemas.microsoft.com/office/drawing/2010/main">
                   <a:noFill/>
                 </a14:hiddenFill>
@@ -11578,7 +13015,7 @@
               <a:tailEnd type="arrow" w="med" len="med"/>
             </a:ln>
             <a:extLst>
-              <a:ext uri="{909E8E84-426E-40DD-AFC4-6F175D3DCCD1}">
+              <a:ext uri="{909E8E84-426E-40dd-AFC4-6F175D3DCCD1}">
                 <a14:hiddenFill xmlns:a14="http://schemas.microsoft.com/office/drawing/2010/main">
                   <a:noFill/>
                 </a14:hiddenFill>
@@ -11614,7 +13051,7 @@
               <a:tailEnd type="arrow" w="med" len="med"/>
             </a:ln>
             <a:extLst>
-              <a:ext uri="{909E8E84-426E-40DD-AFC4-6F175D3DCCD1}">
+              <a:ext uri="{909E8E84-426E-40dd-AFC4-6F175D3DCCD1}">
                 <a14:hiddenFill xmlns:a14="http://schemas.microsoft.com/office/drawing/2010/main">
                   <a:noFill/>
                 </a14:hiddenFill>
@@ -11652,7 +13089,7 @@
               <a:tailEnd type="arrow" w="med" len="med"/>
             </a:ln>
             <a:extLst>
-              <a:ext uri="{909E8E84-426E-40DD-AFC4-6F175D3DCCD1}">
+              <a:ext uri="{909E8E84-426E-40dd-AFC4-6F175D3DCCD1}">
                 <a14:hiddenFill xmlns:a14="http://schemas.microsoft.com/office/drawing/2010/main">
                   <a:noFill/>
                 </a14:hiddenFill>
@@ -11853,6 +13290,13 @@
   <p:clrMapOvr>
     <a:masterClrMapping/>
   </p:clrMapOvr>
+  <p:timing>
+    <p:tnLst>
+      <p:par>
+        <p:cTn xmlns:p14="http://schemas.microsoft.com/office/powerpoint/2010/main" id="1" dur="indefinite" restart="never" nodeType="tmRoot"/>
+      </p:par>
+    </p:tnLst>
+  </p:timing>
 </p:sld>
 </file>
 
@@ -12271,7 +13715,7 @@
               <a:tailEnd/>
             </a:ln>
             <a:extLst>
-              <a:ext uri="{909E8E84-426E-40DD-AFC4-6F175D3DCCD1}">
+              <a:ext uri="{909E8E84-426E-40dd-AFC4-6F175D3DCCD1}">
                 <a14:hiddenFill xmlns:a14="http://schemas.microsoft.com/office/drawing/2010/main">
                   <a:solidFill>
                     <a:srgbClr val="FFFFFF"/>
@@ -12337,7 +13781,7 @@
               <a:tailEnd type="arrow" w="med" len="med"/>
             </a:ln>
             <a:extLst>
-              <a:ext uri="{909E8E84-426E-40DD-AFC4-6F175D3DCCD1}">
+              <a:ext uri="{909E8E84-426E-40dd-AFC4-6F175D3DCCD1}">
                 <a14:hiddenFill xmlns:a14="http://schemas.microsoft.com/office/drawing/2010/main">
                   <a:noFill/>
                 </a14:hiddenFill>
@@ -12371,7 +13815,7 @@
               <a:tailEnd/>
             </a:ln>
             <a:extLst>
-              <a:ext uri="{909E8E84-426E-40DD-AFC4-6F175D3DCCD1}">
+              <a:ext uri="{909E8E84-426E-40dd-AFC4-6F175D3DCCD1}">
                 <a14:hiddenFill xmlns:a14="http://schemas.microsoft.com/office/drawing/2010/main">
                   <a:solidFill>
                     <a:srgbClr val="FFFFFF"/>
@@ -12437,7 +13881,7 @@
               <a:tailEnd type="arrow" w="med" len="med"/>
             </a:ln>
             <a:extLst>
-              <a:ext uri="{909E8E84-426E-40DD-AFC4-6F175D3DCCD1}">
+              <a:ext uri="{909E8E84-426E-40dd-AFC4-6F175D3DCCD1}">
                 <a14:hiddenFill xmlns:a14="http://schemas.microsoft.com/office/drawing/2010/main">
                   <a:noFill/>
                 </a14:hiddenFill>
@@ -12523,7 +13967,7 @@
               <a:tailEnd/>
             </a:ln>
             <a:extLst>
-              <a:ext uri="{909E8E84-426E-40DD-AFC4-6F175D3DCCD1}">
+              <a:ext uri="{909E8E84-426E-40dd-AFC4-6F175D3DCCD1}">
                 <a14:hiddenFill xmlns:a14="http://schemas.microsoft.com/office/drawing/2010/main">
                   <a:solidFill>
                     <a:srgbClr val="FFFFFF"/>
@@ -12573,7 +14017,7 @@
               <a:tailEnd type="arrow" w="med" len="med"/>
             </a:ln>
             <a:extLst>
-              <a:ext uri="{909E8E84-426E-40DD-AFC4-6F175D3DCCD1}">
+              <a:ext uri="{909E8E84-426E-40dd-AFC4-6F175D3DCCD1}">
                 <a14:hiddenFill xmlns:a14="http://schemas.microsoft.com/office/drawing/2010/main">
                   <a:noFill/>
                 </a14:hiddenFill>
@@ -12607,7 +14051,7 @@
               <a:tailEnd/>
             </a:ln>
             <a:extLst>
-              <a:ext uri="{909E8E84-426E-40DD-AFC4-6F175D3DCCD1}">
+              <a:ext uri="{909E8E84-426E-40dd-AFC4-6F175D3DCCD1}">
                 <a14:hiddenFill xmlns:a14="http://schemas.microsoft.com/office/drawing/2010/main">
                   <a:solidFill>
                     <a:srgbClr val="FFFFFF"/>
@@ -12657,7 +14101,7 @@
               <a:tailEnd type="arrow" w="med" len="med"/>
             </a:ln>
             <a:extLst>
-              <a:ext uri="{909E8E84-426E-40DD-AFC4-6F175D3DCCD1}">
+              <a:ext uri="{909E8E84-426E-40dd-AFC4-6F175D3DCCD1}">
                 <a14:hiddenFill xmlns:a14="http://schemas.microsoft.com/office/drawing/2010/main">
                   <a:noFill/>
                 </a14:hiddenFill>
@@ -12691,7 +14135,7 @@
               <a:tailEnd/>
             </a:ln>
             <a:extLst>
-              <a:ext uri="{909E8E84-426E-40DD-AFC4-6F175D3DCCD1}">
+              <a:ext uri="{909E8E84-426E-40dd-AFC4-6F175D3DCCD1}">
                 <a14:hiddenFill xmlns:a14="http://schemas.microsoft.com/office/drawing/2010/main">
                   <a:solidFill>
                     <a:srgbClr val="FFFFFF"/>
@@ -12741,7 +14185,7 @@
               <a:tailEnd type="arrow" w="med" len="med"/>
             </a:ln>
             <a:extLst>
-              <a:ext uri="{909E8E84-426E-40DD-AFC4-6F175D3DCCD1}">
+              <a:ext uri="{909E8E84-426E-40dd-AFC4-6F175D3DCCD1}">
                 <a14:hiddenFill xmlns:a14="http://schemas.microsoft.com/office/drawing/2010/main">
                   <a:noFill/>
                 </a14:hiddenFill>
@@ -12827,7 +14271,7 @@
               <a:tailEnd/>
             </a:ln>
             <a:extLst>
-              <a:ext uri="{909E8E84-426E-40DD-AFC4-6F175D3DCCD1}">
+              <a:ext uri="{909E8E84-426E-40dd-AFC4-6F175D3DCCD1}">
                 <a14:hiddenFill xmlns:a14="http://schemas.microsoft.com/office/drawing/2010/main">
                   <a:solidFill>
                     <a:srgbClr val="FFFFFF"/>
@@ -12877,7 +14321,7 @@
               <a:tailEnd type="arrow" w="med" len="med"/>
             </a:ln>
             <a:extLst>
-              <a:ext uri="{909E8E84-426E-40DD-AFC4-6F175D3DCCD1}">
+              <a:ext uri="{909E8E84-426E-40dd-AFC4-6F175D3DCCD1}">
                 <a14:hiddenFill xmlns:a14="http://schemas.microsoft.com/office/drawing/2010/main">
                   <a:noFill/>
                 </a14:hiddenFill>
@@ -12911,7 +14355,7 @@
               <a:tailEnd/>
             </a:ln>
             <a:extLst>
-              <a:ext uri="{909E8E84-426E-40DD-AFC4-6F175D3DCCD1}">
+              <a:ext uri="{909E8E84-426E-40dd-AFC4-6F175D3DCCD1}">
                 <a14:hiddenFill xmlns:a14="http://schemas.microsoft.com/office/drawing/2010/main">
                   <a:solidFill>
                     <a:srgbClr val="FFFFFF"/>
@@ -12961,7 +14405,7 @@
               <a:tailEnd type="arrow" w="med" len="med"/>
             </a:ln>
             <a:extLst>
-              <a:ext uri="{909E8E84-426E-40DD-AFC4-6F175D3DCCD1}">
+              <a:ext uri="{909E8E84-426E-40dd-AFC4-6F175D3DCCD1}">
                 <a14:hiddenFill xmlns:a14="http://schemas.microsoft.com/office/drawing/2010/main">
                   <a:noFill/>
                 </a14:hiddenFill>
@@ -12995,7 +14439,7 @@
               <a:tailEnd/>
             </a:ln>
             <a:extLst>
-              <a:ext uri="{909E8E84-426E-40DD-AFC4-6F175D3DCCD1}">
+              <a:ext uri="{909E8E84-426E-40dd-AFC4-6F175D3DCCD1}">
                 <a14:hiddenFill xmlns:a14="http://schemas.microsoft.com/office/drawing/2010/main">
                   <a:solidFill>
                     <a:srgbClr val="FFFFFF"/>
@@ -13045,7 +14489,7 @@
               <a:tailEnd type="arrow" w="med" len="med"/>
             </a:ln>
             <a:extLst>
-              <a:ext uri="{909E8E84-426E-40DD-AFC4-6F175D3DCCD1}">
+              <a:ext uri="{909E8E84-426E-40dd-AFC4-6F175D3DCCD1}">
                 <a14:hiddenFill xmlns:a14="http://schemas.microsoft.com/office/drawing/2010/main">
                   <a:noFill/>
                 </a14:hiddenFill>
@@ -13131,7 +14575,7 @@
               <a:tailEnd/>
             </a:ln>
             <a:extLst>
-              <a:ext uri="{909E8E84-426E-40DD-AFC4-6F175D3DCCD1}">
+              <a:ext uri="{909E8E84-426E-40dd-AFC4-6F175D3DCCD1}">
                 <a14:hiddenFill xmlns:a14="http://schemas.microsoft.com/office/drawing/2010/main">
                   <a:solidFill>
                     <a:srgbClr val="FFFFFF"/>
@@ -13181,7 +14625,7 @@
               <a:tailEnd type="arrow" w="med" len="med"/>
             </a:ln>
             <a:extLst>
-              <a:ext uri="{909E8E84-426E-40DD-AFC4-6F175D3DCCD1}">
+              <a:ext uri="{909E8E84-426E-40dd-AFC4-6F175D3DCCD1}">
                 <a14:hiddenFill xmlns:a14="http://schemas.microsoft.com/office/drawing/2010/main">
                   <a:noFill/>
                 </a14:hiddenFill>
@@ -13215,7 +14659,7 @@
               <a:tailEnd/>
             </a:ln>
             <a:extLst>
-              <a:ext uri="{909E8E84-426E-40DD-AFC4-6F175D3DCCD1}">
+              <a:ext uri="{909E8E84-426E-40dd-AFC4-6F175D3DCCD1}">
                 <a14:hiddenFill xmlns:a14="http://schemas.microsoft.com/office/drawing/2010/main">
                   <a:solidFill>
                     <a:srgbClr val="FFFFFF"/>
@@ -13265,7 +14709,7 @@
               <a:tailEnd type="arrow" w="med" len="med"/>
             </a:ln>
             <a:extLst>
-              <a:ext uri="{909E8E84-426E-40DD-AFC4-6F175D3DCCD1}">
+              <a:ext uri="{909E8E84-426E-40dd-AFC4-6F175D3DCCD1}">
                 <a14:hiddenFill xmlns:a14="http://schemas.microsoft.com/office/drawing/2010/main">
                   <a:noFill/>
                 </a14:hiddenFill>
@@ -13299,7 +14743,7 @@
               <a:tailEnd/>
             </a:ln>
             <a:extLst>
-              <a:ext uri="{909E8E84-426E-40DD-AFC4-6F175D3DCCD1}">
+              <a:ext uri="{909E8E84-426E-40dd-AFC4-6F175D3DCCD1}">
                 <a14:hiddenFill xmlns:a14="http://schemas.microsoft.com/office/drawing/2010/main">
                   <a:solidFill>
                     <a:srgbClr val="FFFFFF"/>
@@ -13349,7 +14793,7 @@
               <a:tailEnd type="arrow" w="med" len="med"/>
             </a:ln>
             <a:extLst>
-              <a:ext uri="{909E8E84-426E-40DD-AFC4-6F175D3DCCD1}">
+              <a:ext uri="{909E8E84-426E-40dd-AFC4-6F175D3DCCD1}">
                 <a14:hiddenFill xmlns:a14="http://schemas.microsoft.com/office/drawing/2010/main">
                   <a:noFill/>
                 </a14:hiddenFill>
@@ -13489,7 +14933,7 @@
               <a:tailEnd/>
             </a:ln>
             <a:extLst>
-              <a:ext uri="{909E8E84-426E-40DD-AFC4-6F175D3DCCD1}">
+              <a:ext uri="{909E8E84-426E-40dd-AFC4-6F175D3DCCD1}">
                 <a14:hiddenFill xmlns:a14="http://schemas.microsoft.com/office/drawing/2010/main">
                   <a:solidFill>
                     <a:srgbClr val="FFFFFF"/>
@@ -13555,7 +14999,7 @@
               <a:tailEnd type="arrow" w="med" len="med"/>
             </a:ln>
             <a:extLst>
-              <a:ext uri="{909E8E84-426E-40DD-AFC4-6F175D3DCCD1}">
+              <a:ext uri="{909E8E84-426E-40dd-AFC4-6F175D3DCCD1}">
                 <a14:hiddenFill xmlns:a14="http://schemas.microsoft.com/office/drawing/2010/main">
                   <a:noFill/>
                 </a14:hiddenFill>
@@ -13589,7 +15033,7 @@
               <a:tailEnd/>
             </a:ln>
             <a:extLst>
-              <a:ext uri="{909E8E84-426E-40DD-AFC4-6F175D3DCCD1}">
+              <a:ext uri="{909E8E84-426E-40dd-AFC4-6F175D3DCCD1}">
                 <a14:hiddenFill xmlns:a14="http://schemas.microsoft.com/office/drawing/2010/main">
                   <a:solidFill>
                     <a:srgbClr val="FFFFFF"/>
@@ -13655,7 +15099,7 @@
               <a:tailEnd type="arrow" w="med" len="med"/>
             </a:ln>
             <a:extLst>
-              <a:ext uri="{909E8E84-426E-40DD-AFC4-6F175D3DCCD1}">
+              <a:ext uri="{909E8E84-426E-40dd-AFC4-6F175D3DCCD1}">
                 <a14:hiddenFill xmlns:a14="http://schemas.microsoft.com/office/drawing/2010/main">
                   <a:noFill/>
                 </a14:hiddenFill>
@@ -13689,7 +15133,7 @@
               <a:tailEnd/>
             </a:ln>
             <a:extLst>
-              <a:ext uri="{909E8E84-426E-40DD-AFC4-6F175D3DCCD1}">
+              <a:ext uri="{909E8E84-426E-40dd-AFC4-6F175D3DCCD1}">
                 <a14:hiddenFill xmlns:a14="http://schemas.microsoft.com/office/drawing/2010/main">
                   <a:solidFill>
                     <a:srgbClr val="FFFFFF"/>
@@ -13755,7 +15199,7 @@
               <a:tailEnd type="arrow" w="med" len="med"/>
             </a:ln>
             <a:extLst>
-              <a:ext uri="{909E8E84-426E-40DD-AFC4-6F175D3DCCD1}">
+              <a:ext uri="{909E8E84-426E-40dd-AFC4-6F175D3DCCD1}">
                 <a14:hiddenFill xmlns:a14="http://schemas.microsoft.com/office/drawing/2010/main">
                   <a:noFill/>
                 </a14:hiddenFill>
@@ -13946,7 +15390,7 @@
               <a:tailEnd/>
             </a:ln>
             <a:extLst>
-              <a:ext uri="{909E8E84-426E-40DD-AFC4-6F175D3DCCD1}">
+              <a:ext uri="{909E8E84-426E-40dd-AFC4-6F175D3DCCD1}">
                 <a14:hiddenFill xmlns:a14="http://schemas.microsoft.com/office/drawing/2010/main">
                   <a:solidFill>
                     <a:srgbClr val="FFFFFF"/>
@@ -14012,7 +15456,7 @@
               <a:tailEnd type="arrow" w="med" len="med"/>
             </a:ln>
             <a:extLst>
-              <a:ext uri="{909E8E84-426E-40DD-AFC4-6F175D3DCCD1}">
+              <a:ext uri="{909E8E84-426E-40dd-AFC4-6F175D3DCCD1}">
                 <a14:hiddenFill xmlns:a14="http://schemas.microsoft.com/office/drawing/2010/main">
                   <a:noFill/>
                 </a14:hiddenFill>
@@ -14152,7 +15596,7 @@
               <a:tailEnd/>
             </a:ln>
             <a:extLst>
-              <a:ext uri="{909E8E84-426E-40DD-AFC4-6F175D3DCCD1}">
+              <a:ext uri="{909E8E84-426E-40dd-AFC4-6F175D3DCCD1}">
                 <a14:hiddenFill xmlns:a14="http://schemas.microsoft.com/office/drawing/2010/main">
                   <a:solidFill>
                     <a:srgbClr val="FFFFFF"/>
@@ -14213,7 +15657,7 @@
               <a:tailEnd type="arrow" w="med" len="med"/>
             </a:ln>
             <a:extLst>
-              <a:ext uri="{909E8E84-426E-40DD-AFC4-6F175D3DCCD1}">
+              <a:ext uri="{909E8E84-426E-40dd-AFC4-6F175D3DCCD1}">
                 <a14:hiddenFill xmlns:a14="http://schemas.microsoft.com/office/drawing/2010/main">
                   <a:noFill/>
                 </a14:hiddenFill>
@@ -14247,7 +15691,7 @@
               <a:tailEnd/>
             </a:ln>
             <a:extLst>
-              <a:ext uri="{909E8E84-426E-40DD-AFC4-6F175D3DCCD1}">
+              <a:ext uri="{909E8E84-426E-40dd-AFC4-6F175D3DCCD1}">
                 <a14:hiddenFill xmlns:a14="http://schemas.microsoft.com/office/drawing/2010/main">
                   <a:solidFill>
                     <a:srgbClr val="FFFFFF"/>
@@ -14313,7 +15757,7 @@
               <a:tailEnd type="arrow" w="med" len="med"/>
             </a:ln>
             <a:extLst>
-              <a:ext uri="{909E8E84-426E-40DD-AFC4-6F175D3DCCD1}">
+              <a:ext uri="{909E8E84-426E-40dd-AFC4-6F175D3DCCD1}">
                 <a14:hiddenFill xmlns:a14="http://schemas.microsoft.com/office/drawing/2010/main">
                   <a:noFill/>
                 </a14:hiddenFill>
@@ -14347,7 +15791,7 @@
               <a:tailEnd/>
             </a:ln>
             <a:extLst>
-              <a:ext uri="{909E8E84-426E-40DD-AFC4-6F175D3DCCD1}">
+              <a:ext uri="{909E8E84-426E-40dd-AFC4-6F175D3DCCD1}">
                 <a14:hiddenFill xmlns:a14="http://schemas.microsoft.com/office/drawing/2010/main">
                   <a:solidFill>
                     <a:srgbClr val="FFFFFF"/>
@@ -14413,7 +15857,7 @@
               <a:tailEnd type="arrow" w="med" len="med"/>
             </a:ln>
             <a:extLst>
-              <a:ext uri="{909E8E84-426E-40DD-AFC4-6F175D3DCCD1}">
+              <a:ext uri="{909E8E84-426E-40dd-AFC4-6F175D3DCCD1}">
                 <a14:hiddenFill xmlns:a14="http://schemas.microsoft.com/office/drawing/2010/main">
                   <a:noFill/>
                 </a14:hiddenFill>
@@ -14654,7 +16098,7 @@
               <a:tailEnd/>
             </a:ln>
             <a:extLst>
-              <a:ext uri="{909E8E84-426E-40DD-AFC4-6F175D3DCCD1}">
+              <a:ext uri="{909E8E84-426E-40dd-AFC4-6F175D3DCCD1}">
                 <a14:hiddenFill xmlns:a14="http://schemas.microsoft.com/office/drawing/2010/main">
                   <a:solidFill>
                     <a:srgbClr val="FFFFFF"/>
@@ -14715,7 +16159,7 @@
               <a:tailEnd type="arrow" w="med" len="med"/>
             </a:ln>
             <a:extLst>
-              <a:ext uri="{909E8E84-426E-40DD-AFC4-6F175D3DCCD1}">
+              <a:ext uri="{909E8E84-426E-40dd-AFC4-6F175D3DCCD1}">
                 <a14:hiddenFill xmlns:a14="http://schemas.microsoft.com/office/drawing/2010/main">
                   <a:noFill/>
                 </a14:hiddenFill>
@@ -14749,7 +16193,7 @@
               <a:tailEnd/>
             </a:ln>
             <a:extLst>
-              <a:ext uri="{909E8E84-426E-40DD-AFC4-6F175D3DCCD1}">
+              <a:ext uri="{909E8E84-426E-40dd-AFC4-6F175D3DCCD1}">
                 <a14:hiddenFill xmlns:a14="http://schemas.microsoft.com/office/drawing/2010/main">
                   <a:solidFill>
                     <a:srgbClr val="FFFFFF"/>
@@ -14815,7 +16259,7 @@
               <a:tailEnd type="arrow" w="med" len="med"/>
             </a:ln>
             <a:extLst>
-              <a:ext uri="{909E8E84-426E-40DD-AFC4-6F175D3DCCD1}">
+              <a:ext uri="{909E8E84-426E-40dd-AFC4-6F175D3DCCD1}">
                 <a14:hiddenFill xmlns:a14="http://schemas.microsoft.com/office/drawing/2010/main">
                   <a:noFill/>
                 </a14:hiddenFill>
@@ -14849,7 +16293,7 @@
               <a:tailEnd/>
             </a:ln>
             <a:extLst>
-              <a:ext uri="{909E8E84-426E-40DD-AFC4-6F175D3DCCD1}">
+              <a:ext uri="{909E8E84-426E-40dd-AFC4-6F175D3DCCD1}">
                 <a14:hiddenFill xmlns:a14="http://schemas.microsoft.com/office/drawing/2010/main">
                   <a:solidFill>
                     <a:srgbClr val="FFFFFF"/>
@@ -14915,7 +16359,7 @@
               <a:tailEnd type="arrow" w="med" len="med"/>
             </a:ln>
             <a:extLst>
-              <a:ext uri="{909E8E84-426E-40DD-AFC4-6F175D3DCCD1}">
+              <a:ext uri="{909E8E84-426E-40dd-AFC4-6F175D3DCCD1}">
                 <a14:hiddenFill xmlns:a14="http://schemas.microsoft.com/office/drawing/2010/main">
                   <a:noFill/>
                 </a14:hiddenFill>
@@ -15056,7 +16500,7 @@
               <a:tailEnd/>
             </a:ln>
             <a:extLst>
-              <a:ext uri="{909E8E84-426E-40DD-AFC4-6F175D3DCCD1}">
+              <a:ext uri="{909E8E84-426E-40dd-AFC4-6F175D3DCCD1}">
                 <a14:hiddenFill xmlns:a14="http://schemas.microsoft.com/office/drawing/2010/main">
                   <a:solidFill>
                     <a:srgbClr val="FFFFFF"/>
@@ -15122,7 +16566,7 @@
               <a:tailEnd type="arrow" w="med" len="med"/>
             </a:ln>
             <a:extLst>
-              <a:ext uri="{909E8E84-426E-40DD-AFC4-6F175D3DCCD1}">
+              <a:ext uri="{909E8E84-426E-40dd-AFC4-6F175D3DCCD1}">
                 <a14:hiddenFill xmlns:a14="http://schemas.microsoft.com/office/drawing/2010/main">
                   <a:noFill/>
                 </a14:hiddenFill>
@@ -15156,7 +16600,7 @@
               <a:tailEnd/>
             </a:ln>
             <a:extLst>
-              <a:ext uri="{909E8E84-426E-40DD-AFC4-6F175D3DCCD1}">
+              <a:ext uri="{909E8E84-426E-40dd-AFC4-6F175D3DCCD1}">
                 <a14:hiddenFill xmlns:a14="http://schemas.microsoft.com/office/drawing/2010/main">
                   <a:solidFill>
                     <a:srgbClr val="FFFFFF"/>
@@ -15222,7 +16666,7 @@
               <a:tailEnd type="arrow" w="med" len="med"/>
             </a:ln>
             <a:extLst>
-              <a:ext uri="{909E8E84-426E-40DD-AFC4-6F175D3DCCD1}">
+              <a:ext uri="{909E8E84-426E-40dd-AFC4-6F175D3DCCD1}">
                 <a14:hiddenFill xmlns:a14="http://schemas.microsoft.com/office/drawing/2010/main">
                   <a:noFill/>
                 </a14:hiddenFill>
@@ -15256,7 +16700,7 @@
               <a:tailEnd/>
             </a:ln>
             <a:extLst>
-              <a:ext uri="{909E8E84-426E-40DD-AFC4-6F175D3DCCD1}">
+              <a:ext uri="{909E8E84-426E-40dd-AFC4-6F175D3DCCD1}">
                 <a14:hiddenFill xmlns:a14="http://schemas.microsoft.com/office/drawing/2010/main">
                   <a:solidFill>
                     <a:srgbClr val="FFFFFF"/>
@@ -15322,7 +16766,7 @@
               <a:tailEnd type="arrow" w="med" len="med"/>
             </a:ln>
             <a:extLst>
-              <a:ext uri="{909E8E84-426E-40DD-AFC4-6F175D3DCCD1}">
+              <a:ext uri="{909E8E84-426E-40dd-AFC4-6F175D3DCCD1}">
                 <a14:hiddenFill xmlns:a14="http://schemas.microsoft.com/office/drawing/2010/main">
                   <a:noFill/>
                 </a14:hiddenFill>
@@ -15512,7 +16956,7 @@
               <a:tailEnd/>
             </a:ln>
             <a:extLst>
-              <a:ext uri="{909E8E84-426E-40DD-AFC4-6F175D3DCCD1}">
+              <a:ext uri="{909E8E84-426E-40dd-AFC4-6F175D3DCCD1}">
                 <a14:hiddenFill xmlns:a14="http://schemas.microsoft.com/office/drawing/2010/main">
                   <a:solidFill>
                     <a:srgbClr val="FFFFFF"/>
@@ -15578,7 +17022,7 @@
               <a:tailEnd type="arrow" w="med" len="med"/>
             </a:ln>
             <a:extLst>
-              <a:ext uri="{909E8E84-426E-40DD-AFC4-6F175D3DCCD1}">
+              <a:ext uri="{909E8E84-426E-40dd-AFC4-6F175D3DCCD1}">
                 <a14:hiddenFill xmlns:a14="http://schemas.microsoft.com/office/drawing/2010/main">
                   <a:noFill/>
                 </a14:hiddenFill>
@@ -15612,7 +17056,7 @@
               <a:tailEnd/>
             </a:ln>
             <a:extLst>
-              <a:ext uri="{909E8E84-426E-40DD-AFC4-6F175D3DCCD1}">
+              <a:ext uri="{909E8E84-426E-40dd-AFC4-6F175D3DCCD1}">
                 <a14:hiddenFill xmlns:a14="http://schemas.microsoft.com/office/drawing/2010/main">
                   <a:solidFill>
                     <a:srgbClr val="FFFFFF"/>
@@ -15678,7 +17122,7 @@
               <a:tailEnd type="arrow" w="med" len="med"/>
             </a:ln>
             <a:extLst>
-              <a:ext uri="{909E8E84-426E-40DD-AFC4-6F175D3DCCD1}">
+              <a:ext uri="{909E8E84-426E-40dd-AFC4-6F175D3DCCD1}">
                 <a14:hiddenFill xmlns:a14="http://schemas.microsoft.com/office/drawing/2010/main">
                   <a:noFill/>
                 </a14:hiddenFill>
@@ -15712,7 +17156,7 @@
               <a:tailEnd/>
             </a:ln>
             <a:extLst>
-              <a:ext uri="{909E8E84-426E-40DD-AFC4-6F175D3DCCD1}">
+              <a:ext uri="{909E8E84-426E-40dd-AFC4-6F175D3DCCD1}">
                 <a14:hiddenFill xmlns:a14="http://schemas.microsoft.com/office/drawing/2010/main">
                   <a:solidFill>
                     <a:srgbClr val="FFFFFF"/>
@@ -15778,7 +17222,7 @@
               <a:tailEnd type="arrow" w="med" len="med"/>
             </a:ln>
             <a:extLst>
-              <a:ext uri="{909E8E84-426E-40DD-AFC4-6F175D3DCCD1}">
+              <a:ext uri="{909E8E84-426E-40dd-AFC4-6F175D3DCCD1}">
                 <a14:hiddenFill xmlns:a14="http://schemas.microsoft.com/office/drawing/2010/main">
                   <a:noFill/>
                 </a14:hiddenFill>
@@ -15919,7 +17363,7 @@
               <a:tailEnd/>
             </a:ln>
             <a:extLst>
-              <a:ext uri="{909E8E84-426E-40DD-AFC4-6F175D3DCCD1}">
+              <a:ext uri="{909E8E84-426E-40dd-AFC4-6F175D3DCCD1}">
                 <a14:hiddenFill xmlns:a14="http://schemas.microsoft.com/office/drawing/2010/main">
                   <a:solidFill>
                     <a:srgbClr val="FFFFFF"/>
@@ -15985,7 +17429,7 @@
               <a:tailEnd type="arrow" w="med" len="med"/>
             </a:ln>
             <a:extLst>
-              <a:ext uri="{909E8E84-426E-40DD-AFC4-6F175D3DCCD1}">
+              <a:ext uri="{909E8E84-426E-40dd-AFC4-6F175D3DCCD1}">
                 <a14:hiddenFill xmlns:a14="http://schemas.microsoft.com/office/drawing/2010/main">
                   <a:noFill/>
                 </a14:hiddenFill>
@@ -16019,7 +17463,7 @@
               <a:tailEnd/>
             </a:ln>
             <a:extLst>
-              <a:ext uri="{909E8E84-426E-40DD-AFC4-6F175D3DCCD1}">
+              <a:ext uri="{909E8E84-426E-40dd-AFC4-6F175D3DCCD1}">
                 <a14:hiddenFill xmlns:a14="http://schemas.microsoft.com/office/drawing/2010/main">
                   <a:solidFill>
                     <a:srgbClr val="FFFFFF"/>
@@ -16085,7 +17529,7 @@
               <a:tailEnd type="arrow" w="med" len="med"/>
             </a:ln>
             <a:extLst>
-              <a:ext uri="{909E8E84-426E-40DD-AFC4-6F175D3DCCD1}">
+              <a:ext uri="{909E8E84-426E-40dd-AFC4-6F175D3DCCD1}">
                 <a14:hiddenFill xmlns:a14="http://schemas.microsoft.com/office/drawing/2010/main">
                   <a:noFill/>
                 </a14:hiddenFill>
@@ -16119,7 +17563,7 @@
               <a:tailEnd/>
             </a:ln>
             <a:extLst>
-              <a:ext uri="{909E8E84-426E-40DD-AFC4-6F175D3DCCD1}">
+              <a:ext uri="{909E8E84-426E-40dd-AFC4-6F175D3DCCD1}">
                 <a14:hiddenFill xmlns:a14="http://schemas.microsoft.com/office/drawing/2010/main">
                   <a:solidFill>
                     <a:srgbClr val="FFFFFF"/>
@@ -16185,7 +17629,7 @@
               <a:tailEnd type="arrow" w="med" len="med"/>
             </a:ln>
             <a:extLst>
-              <a:ext uri="{909E8E84-426E-40DD-AFC4-6F175D3DCCD1}">
+              <a:ext uri="{909E8E84-426E-40dd-AFC4-6F175D3DCCD1}">
                 <a14:hiddenFill xmlns:a14="http://schemas.microsoft.com/office/drawing/2010/main">
                   <a:noFill/>
                 </a14:hiddenFill>
@@ -16207,7 +17651,7 @@
   <p:timing>
     <p:tnLst>
       <p:par>
-        <p:cTn id="1" dur="indefinite" restart="never" nodeType="tmRoot"/>
+        <p:cTn xmlns:p14="http://schemas.microsoft.com/office/powerpoint/2010/main" id="1" dur="indefinite" restart="never" nodeType="tmRoot"/>
       </p:par>
     </p:tnLst>
   </p:timing>
@@ -16244,7 +17688,7 @@
         <p:spPr/>
         <p:txBody>
           <a:bodyPr>
-            <a:normAutofit fontScale="90000"/>
+            <a:normAutofit/>
           </a:bodyPr>
           <a:lstStyle/>
           <a:p>
@@ -16273,12 +17717,904 @@
           <a:p>
             <a:r>
               <a:rPr lang="en-US" dirty="0" smtClean="0"/>
-              <a:t>Briefly mention this?</a:t>
+              <a:t>Use a temp. service ID in place of host ID</a:t>
+            </a:r>
+          </a:p>
+          <a:p>
+            <a:endParaRPr lang="en-US" dirty="0" smtClean="0"/>
+          </a:p>
+          <a:p>
+            <a:endParaRPr lang="en-US" dirty="0"/>
+          </a:p>
+          <a:p>
+            <a:endParaRPr lang="en-US" dirty="0" smtClean="0"/>
+          </a:p>
+          <a:p>
+            <a:r>
+              <a:rPr lang="en-US" dirty="0" smtClean="0"/>
+              <a:t>Register temp. SID with local AD</a:t>
+            </a:r>
+          </a:p>
+          <a:p>
+            <a:pPr lvl="1"/>
+            <a:r>
+              <a:rPr lang="en-US" dirty="0" smtClean="0"/>
+              <a:t>Places trust in local AD instead of remote 3</a:t>
+            </a:r>
+            <a:r>
+              <a:rPr lang="en-US" baseline="30000" dirty="0" smtClean="0"/>
+              <a:t>rd</a:t>
+            </a:r>
+            <a:r>
+              <a:rPr lang="en-US" dirty="0" smtClean="0"/>
+              <a:t> party</a:t>
             </a:r>
             <a:endParaRPr lang="en-US" dirty="0"/>
           </a:p>
         </p:txBody>
       </p:sp>
+      <p:grpSp>
+        <p:nvGrpSpPr>
+          <p:cNvPr id="40" name="Group 39"/>
+          <p:cNvGrpSpPr/>
+          <p:nvPr/>
+        </p:nvGrpSpPr>
+        <p:grpSpPr>
+          <a:xfrm>
+            <a:off x="1519942" y="2753799"/>
+            <a:ext cx="6104116" cy="1455384"/>
+            <a:chOff x="1330627" y="2753799"/>
+            <a:chExt cx="6104116" cy="1455384"/>
+          </a:xfrm>
+        </p:grpSpPr>
+        <p:sp>
+          <p:nvSpPr>
+            <p:cNvPr id="4" name="Rectangle 3"/>
+            <p:cNvSpPr/>
+            <p:nvPr/>
+          </p:nvSpPr>
+          <p:spPr>
+            <a:xfrm>
+              <a:off x="1330627" y="2754403"/>
+              <a:ext cx="2061878" cy="483674"/>
+            </a:xfrm>
+            <a:prstGeom prst="rect">
+              <a:avLst/>
+            </a:prstGeom>
+            <a:ln/>
+          </p:spPr>
+          <p:style>
+            <a:lnRef idx="2">
+              <a:schemeClr val="accent2">
+                <a:shade val="50000"/>
+              </a:schemeClr>
+            </a:lnRef>
+            <a:fillRef idx="1">
+              <a:schemeClr val="accent2"/>
+            </a:fillRef>
+            <a:effectRef idx="0">
+              <a:schemeClr val="accent2"/>
+            </a:effectRef>
+            <a:fontRef idx="minor">
+              <a:schemeClr val="lt1"/>
+            </a:fontRef>
+          </p:style>
+          <p:txBody>
+            <a:bodyPr rtlCol="0" anchor="ctr"/>
+            <a:lstStyle/>
+            <a:p>
+              <a:r>
+                <a:rPr lang="en-US" sz="1400" dirty="0" smtClean="0">
+                  <a:latin typeface="Myriad Pro"/>
+                  <a:cs typeface="Myriad Pro"/>
+                </a:rPr>
+                <a:t>DEST</a:t>
+              </a:r>
+              <a:r>
+                <a:rPr lang="en-US" sz="1400" dirty="0" smtClean="0">
+                  <a:latin typeface="Myriad Pro"/>
+                  <a:cs typeface="Myriad Pro"/>
+                </a:rPr>
+                <a:t>:            …</a:t>
+              </a:r>
+              <a:endParaRPr lang="en-US" sz="1400" dirty="0">
+                <a:latin typeface="Myriad Pro"/>
+                <a:cs typeface="Myriad Pro"/>
+              </a:endParaRPr>
+            </a:p>
+          </p:txBody>
+        </p:sp>
+        <p:sp>
+          <p:nvSpPr>
+            <p:cNvPr id="11" name="Rectangle 10"/>
+            <p:cNvSpPr/>
+            <p:nvPr/>
+          </p:nvSpPr>
+          <p:spPr>
+            <a:xfrm>
+              <a:off x="1330629" y="3237473"/>
+              <a:ext cx="2061876" cy="483674"/>
+            </a:xfrm>
+            <a:prstGeom prst="rect">
+              <a:avLst/>
+            </a:prstGeom>
+            <a:ln/>
+          </p:spPr>
+          <p:style>
+            <a:lnRef idx="2">
+              <a:schemeClr val="accent2">
+                <a:shade val="50000"/>
+              </a:schemeClr>
+            </a:lnRef>
+            <a:fillRef idx="1">
+              <a:schemeClr val="accent2"/>
+            </a:fillRef>
+            <a:effectRef idx="0">
+              <a:schemeClr val="accent2"/>
+            </a:effectRef>
+            <a:fontRef idx="minor">
+              <a:schemeClr val="lt1"/>
+            </a:fontRef>
+          </p:style>
+          <p:txBody>
+            <a:bodyPr rtlCol="0" anchor="ctr"/>
+            <a:lstStyle/>
+            <a:p>
+              <a:r>
+                <a:rPr lang="en-US" sz="1400" dirty="0" smtClean="0">
+                  <a:latin typeface="Myriad Pro"/>
+                  <a:cs typeface="Myriad Pro"/>
+                </a:rPr>
+                <a:t>SRC:</a:t>
+              </a:r>
+              <a:endParaRPr lang="en-US" sz="1400" dirty="0">
+                <a:latin typeface="Myriad Pro"/>
+                <a:cs typeface="Myriad Pro"/>
+              </a:endParaRPr>
+            </a:p>
+          </p:txBody>
+        </p:sp>
+        <p:grpSp>
+          <p:nvGrpSpPr>
+            <p:cNvPr id="12" name="Group 11"/>
+            <p:cNvGrpSpPr/>
+            <p:nvPr/>
+          </p:nvGrpSpPr>
+          <p:grpSpPr>
+            <a:xfrm>
+              <a:off x="1853384" y="3316850"/>
+              <a:ext cx="1405907" cy="330802"/>
+              <a:chOff x="880057" y="5427842"/>
+              <a:chExt cx="3886203" cy="914400"/>
+            </a:xfrm>
+          </p:grpSpPr>
+          <p:sp>
+            <p:nvSpPr>
+              <p:cNvPr id="13" name="Oval 105"/>
+              <p:cNvSpPr>
+                <a:spLocks noChangeAspect="1"/>
+              </p:cNvSpPr>
+              <p:nvPr/>
+            </p:nvSpPr>
+            <p:spPr bwMode="auto">
+              <a:xfrm>
+                <a:off x="880057" y="5770742"/>
+                <a:ext cx="228600" cy="228600"/>
+              </a:xfrm>
+              <a:prstGeom prst="ellipse">
+                <a:avLst/>
+              </a:prstGeom>
+              <a:solidFill>
+                <a:srgbClr val="FFFFFF"/>
+              </a:solidFill>
+              <a:ln w="9525">
+                <a:solidFill>
+                  <a:schemeClr val="bg1"/>
+                </a:solidFill>
+                <a:round/>
+                <a:headEnd/>
+                <a:tailEnd/>
+              </a:ln>
+            </p:spPr>
+            <p:txBody>
+              <a:bodyPr/>
+              <a:lstStyle/>
+              <a:p>
+                <a:pPr defTabSz="3657600"/>
+                <a:endParaRPr lang="en-US" sz="1000">
+                  <a:solidFill>
+                    <a:srgbClr val="FEFEFE"/>
+                  </a:solidFill>
+                </a:endParaRPr>
+              </a:p>
+            </p:txBody>
+          </p:sp>
+          <p:sp>
+            <p:nvSpPr>
+              <p:cNvPr id="14" name="Oval 106"/>
+              <p:cNvSpPr>
+                <a:spLocks noChangeArrowheads="1"/>
+              </p:cNvSpPr>
+              <p:nvPr/>
+            </p:nvSpPr>
+            <p:spPr bwMode="auto">
+              <a:xfrm>
+                <a:off x="2023057" y="5427842"/>
+                <a:ext cx="914400" cy="914400"/>
+              </a:xfrm>
+              <a:prstGeom prst="ellipse">
+                <a:avLst/>
+              </a:prstGeom>
+              <a:noFill/>
+              <a:ln w="19050">
+                <a:solidFill>
+                  <a:schemeClr val="bg1"/>
+                </a:solidFill>
+                <a:round/>
+                <a:headEnd/>
+                <a:tailEnd/>
+              </a:ln>
+              <a:extLst>
+                <a:ext uri="{909E8E84-426E-40dd-AFC4-6F175D3DCCD1}">
+                  <a14:hiddenFill xmlns:a14="http://schemas.microsoft.com/office/drawing/2010/main">
+                    <a:solidFill>
+                      <a:srgbClr val="FFFFFF"/>
+                    </a:solidFill>
+                  </a14:hiddenFill>
+                </a:ext>
+              </a:extLst>
+            </p:spPr>
+            <p:txBody>
+              <a:bodyPr lIns="0" tIns="0" rIns="0" bIns="0" anchor="ctr"/>
+              <a:lstStyle/>
+              <a:p>
+                <a:pPr algn="ctr" defTabSz="3657600"/>
+                <a:r>
+                  <a:rPr lang="en-US" sz="1200" dirty="0" smtClean="0">
+                    <a:solidFill>
+                      <a:srgbClr val="FEFEFE"/>
+                    </a:solidFill>
+                  </a:rPr>
+                  <a:t>AD</a:t>
+                </a:r>
+                <a:endParaRPr lang="en-US" sz="1200" baseline="-25000" dirty="0">
+                  <a:solidFill>
+                    <a:srgbClr val="FEFEFE"/>
+                  </a:solidFill>
+                </a:endParaRPr>
+              </a:p>
+            </p:txBody>
+          </p:sp>
+          <p:cxnSp>
+            <p:nvCxnSpPr>
+              <p:cNvPr id="15" name="Straight Arrow Connector 107"/>
+              <p:cNvCxnSpPr>
+                <a:cxnSpLocks noChangeShapeType="1"/>
+                <a:stCxn id="13" idx="6"/>
+                <a:endCxn id="14" idx="2"/>
+              </p:cNvCxnSpPr>
+              <p:nvPr/>
+            </p:nvCxnSpPr>
+            <p:spPr bwMode="auto">
+              <a:xfrm>
+                <a:off x="1108657" y="5885042"/>
+                <a:ext cx="914400" cy="0"/>
+              </a:xfrm>
+              <a:prstGeom prst="straightConnector1">
+                <a:avLst/>
+              </a:prstGeom>
+              <a:noFill/>
+              <a:ln w="19050">
+                <a:solidFill>
+                  <a:schemeClr val="bg1"/>
+                </a:solidFill>
+                <a:round/>
+                <a:headEnd/>
+                <a:tailEnd type="arrow" w="med" len="med"/>
+              </a:ln>
+              <a:extLst>
+                <a:ext uri="{909E8E84-426E-40dd-AFC4-6F175D3DCCD1}">
+                  <a14:hiddenFill xmlns:a14="http://schemas.microsoft.com/office/drawing/2010/main">
+                    <a:noFill/>
+                  </a14:hiddenFill>
+                </a:ext>
+              </a:extLst>
+            </p:spPr>
+          </p:cxnSp>
+          <p:sp>
+            <p:nvSpPr>
+              <p:cNvPr id="16" name="Oval 108"/>
+              <p:cNvSpPr>
+                <a:spLocks noChangeArrowheads="1"/>
+              </p:cNvSpPr>
+              <p:nvPr/>
+            </p:nvSpPr>
+            <p:spPr bwMode="auto">
+              <a:xfrm>
+                <a:off x="3756349" y="5427842"/>
+                <a:ext cx="1009911" cy="914400"/>
+              </a:xfrm>
+              <a:prstGeom prst="ellipse">
+                <a:avLst/>
+              </a:prstGeom>
+              <a:noFill/>
+              <a:ln w="38100" cmpd="sng">
+                <a:solidFill>
+                  <a:schemeClr val="bg1"/>
+                </a:solidFill>
+                <a:round/>
+                <a:headEnd/>
+                <a:tailEnd/>
+              </a:ln>
+              <a:extLst>
+                <a:ext uri="{909E8E84-426E-40dd-AFC4-6F175D3DCCD1}">
+                  <a14:hiddenFill xmlns:a14="http://schemas.microsoft.com/office/drawing/2010/main">
+                    <a:solidFill>
+                      <a:srgbClr val="FFFFFF"/>
+                    </a:solidFill>
+                  </a14:hiddenFill>
+                </a:ext>
+              </a:extLst>
+            </p:spPr>
+            <p:txBody>
+              <a:bodyPr lIns="0" tIns="0" rIns="0" bIns="0" anchor="ctr"/>
+              <a:lstStyle/>
+              <a:p>
+                <a:pPr algn="ctr" defTabSz="3657600"/>
+                <a:r>
+                  <a:rPr lang="en-US" sz="1200" b="1" dirty="0" smtClean="0">
+                    <a:solidFill>
+                      <a:srgbClr val="FEFEFE"/>
+                    </a:solidFill>
+                  </a:rPr>
+                  <a:t>HID</a:t>
+                </a:r>
+                <a:endParaRPr lang="en-US" sz="1200" b="1" baseline="-25000" dirty="0">
+                  <a:solidFill>
+                    <a:srgbClr val="FEFEFE"/>
+                  </a:solidFill>
+                </a:endParaRPr>
+              </a:p>
+            </p:txBody>
+          </p:sp>
+          <p:cxnSp>
+            <p:nvCxnSpPr>
+              <p:cNvPr id="17" name="Straight Arrow Connector 109"/>
+              <p:cNvCxnSpPr>
+                <a:cxnSpLocks noChangeShapeType="1"/>
+                <a:stCxn id="14" idx="6"/>
+                <a:endCxn id="16" idx="2"/>
+              </p:cNvCxnSpPr>
+              <p:nvPr/>
+            </p:nvCxnSpPr>
+            <p:spPr bwMode="auto">
+              <a:xfrm>
+                <a:off x="2937459" y="5885044"/>
+                <a:ext cx="818890" cy="0"/>
+              </a:xfrm>
+              <a:prstGeom prst="straightConnector1">
+                <a:avLst/>
+              </a:prstGeom>
+              <a:noFill/>
+              <a:ln w="19050">
+                <a:solidFill>
+                  <a:schemeClr val="bg1"/>
+                </a:solidFill>
+                <a:round/>
+                <a:headEnd/>
+                <a:tailEnd type="arrow" w="med" len="med"/>
+              </a:ln>
+              <a:extLst>
+                <a:ext uri="{909E8E84-426E-40dd-AFC4-6F175D3DCCD1}">
+                  <a14:hiddenFill xmlns:a14="http://schemas.microsoft.com/office/drawing/2010/main">
+                    <a:noFill/>
+                  </a14:hiddenFill>
+                </a:ext>
+              </a:extLst>
+            </p:spPr>
+          </p:cxnSp>
+        </p:grpSp>
+        <p:sp>
+          <p:nvSpPr>
+            <p:cNvPr id="20" name="Rectangle 19"/>
+            <p:cNvSpPr/>
+            <p:nvPr/>
+          </p:nvSpPr>
+          <p:spPr>
+            <a:xfrm>
+              <a:off x="1330629" y="3725509"/>
+              <a:ext cx="2061878" cy="483674"/>
+            </a:xfrm>
+            <a:prstGeom prst="rect">
+              <a:avLst/>
+            </a:prstGeom>
+            <a:ln/>
+          </p:spPr>
+          <p:style>
+            <a:lnRef idx="2">
+              <a:schemeClr val="accent2">
+                <a:shade val="50000"/>
+              </a:schemeClr>
+            </a:lnRef>
+            <a:fillRef idx="1">
+              <a:schemeClr val="accent2"/>
+            </a:fillRef>
+            <a:effectRef idx="0">
+              <a:schemeClr val="accent2"/>
+            </a:effectRef>
+            <a:fontRef idx="minor">
+              <a:schemeClr val="lt1"/>
+            </a:fontRef>
+          </p:style>
+          <p:txBody>
+            <a:bodyPr rtlCol="0" anchor="ctr"/>
+            <a:lstStyle/>
+            <a:p>
+              <a:pPr algn="ctr"/>
+              <a:r>
+                <a:rPr lang="en-US" sz="1400" dirty="0" smtClean="0">
+                  <a:latin typeface="Myriad Pro"/>
+                  <a:cs typeface="Myriad Pro"/>
+                </a:rPr>
+                <a:t>…</a:t>
+              </a:r>
+              <a:endParaRPr lang="en-US" sz="1400" dirty="0">
+                <a:latin typeface="Myriad Pro"/>
+                <a:cs typeface="Myriad Pro"/>
+              </a:endParaRPr>
+            </a:p>
+          </p:txBody>
+        </p:sp>
+        <p:sp>
+          <p:nvSpPr>
+            <p:cNvPr id="21" name="Rectangle 20"/>
+            <p:cNvSpPr/>
+            <p:nvPr/>
+          </p:nvSpPr>
+          <p:spPr>
+            <a:xfrm>
+              <a:off x="5372863" y="2753799"/>
+              <a:ext cx="2061878" cy="483674"/>
+            </a:xfrm>
+            <a:prstGeom prst="rect">
+              <a:avLst/>
+            </a:prstGeom>
+            <a:ln/>
+          </p:spPr>
+          <p:style>
+            <a:lnRef idx="2">
+              <a:schemeClr val="accent1">
+                <a:shade val="50000"/>
+              </a:schemeClr>
+            </a:lnRef>
+            <a:fillRef idx="1">
+              <a:schemeClr val="accent1"/>
+            </a:fillRef>
+            <a:effectRef idx="0">
+              <a:schemeClr val="accent1"/>
+            </a:effectRef>
+            <a:fontRef idx="minor">
+              <a:schemeClr val="lt1"/>
+            </a:fontRef>
+          </p:style>
+          <p:txBody>
+            <a:bodyPr rtlCol="0" anchor="ctr"/>
+            <a:lstStyle/>
+            <a:p>
+              <a:r>
+                <a:rPr lang="en-US" sz="1400" dirty="0" smtClean="0">
+                  <a:latin typeface="Myriad Pro"/>
+                  <a:cs typeface="Myriad Pro"/>
+                </a:rPr>
+                <a:t>DEST</a:t>
+              </a:r>
+              <a:r>
+                <a:rPr lang="en-US" sz="1400" dirty="0" smtClean="0">
+                  <a:latin typeface="Myriad Pro"/>
+                  <a:cs typeface="Myriad Pro"/>
+                </a:rPr>
+                <a:t>:            …</a:t>
+              </a:r>
+              <a:endParaRPr lang="en-US" sz="1400" dirty="0">
+                <a:latin typeface="Myriad Pro"/>
+                <a:cs typeface="Myriad Pro"/>
+              </a:endParaRPr>
+            </a:p>
+          </p:txBody>
+        </p:sp>
+        <p:sp>
+          <p:nvSpPr>
+            <p:cNvPr id="22" name="Rectangle 21"/>
+            <p:cNvSpPr/>
+            <p:nvPr/>
+          </p:nvSpPr>
+          <p:spPr>
+            <a:xfrm>
+              <a:off x="5372865" y="3236869"/>
+              <a:ext cx="2061876" cy="483674"/>
+            </a:xfrm>
+            <a:prstGeom prst="rect">
+              <a:avLst/>
+            </a:prstGeom>
+            <a:ln/>
+          </p:spPr>
+          <p:style>
+            <a:lnRef idx="2">
+              <a:schemeClr val="accent1">
+                <a:shade val="50000"/>
+              </a:schemeClr>
+            </a:lnRef>
+            <a:fillRef idx="1">
+              <a:schemeClr val="accent1"/>
+            </a:fillRef>
+            <a:effectRef idx="0">
+              <a:schemeClr val="accent1"/>
+            </a:effectRef>
+            <a:fontRef idx="minor">
+              <a:schemeClr val="lt1"/>
+            </a:fontRef>
+          </p:style>
+          <p:txBody>
+            <a:bodyPr rtlCol="0" anchor="ctr"/>
+            <a:lstStyle/>
+            <a:p>
+              <a:r>
+                <a:rPr lang="en-US" sz="1400" dirty="0" smtClean="0">
+                  <a:latin typeface="Myriad Pro"/>
+                  <a:cs typeface="Myriad Pro"/>
+                </a:rPr>
+                <a:t>SRC:</a:t>
+              </a:r>
+              <a:endParaRPr lang="en-US" sz="1400" dirty="0">
+                <a:latin typeface="Myriad Pro"/>
+                <a:cs typeface="Myriad Pro"/>
+              </a:endParaRPr>
+            </a:p>
+          </p:txBody>
+        </p:sp>
+        <p:grpSp>
+          <p:nvGrpSpPr>
+            <p:cNvPr id="23" name="Group 22"/>
+            <p:cNvGrpSpPr/>
+            <p:nvPr/>
+          </p:nvGrpSpPr>
+          <p:grpSpPr>
+            <a:xfrm>
+              <a:off x="5895620" y="3316246"/>
+              <a:ext cx="1405907" cy="330802"/>
+              <a:chOff x="880057" y="5427842"/>
+              <a:chExt cx="3886203" cy="914400"/>
+            </a:xfrm>
+          </p:grpSpPr>
+          <p:sp>
+            <p:nvSpPr>
+              <p:cNvPr id="24" name="Oval 105"/>
+              <p:cNvSpPr>
+                <a:spLocks noChangeAspect="1"/>
+              </p:cNvSpPr>
+              <p:nvPr/>
+            </p:nvSpPr>
+            <p:spPr bwMode="auto">
+              <a:xfrm>
+                <a:off x="880057" y="5770742"/>
+                <a:ext cx="228600" cy="228600"/>
+              </a:xfrm>
+              <a:prstGeom prst="ellipse">
+                <a:avLst/>
+              </a:prstGeom>
+              <a:solidFill>
+                <a:srgbClr val="FFFFFF"/>
+              </a:solidFill>
+              <a:ln w="9525">
+                <a:solidFill>
+                  <a:schemeClr val="bg1"/>
+                </a:solidFill>
+                <a:round/>
+                <a:headEnd/>
+                <a:tailEnd/>
+              </a:ln>
+            </p:spPr>
+            <p:txBody>
+              <a:bodyPr/>
+              <a:lstStyle/>
+              <a:p>
+                <a:pPr defTabSz="3657600"/>
+                <a:endParaRPr lang="en-US" sz="1000">
+                  <a:solidFill>
+                    <a:srgbClr val="FEFEFE"/>
+                  </a:solidFill>
+                </a:endParaRPr>
+              </a:p>
+            </p:txBody>
+          </p:sp>
+          <p:sp>
+            <p:nvSpPr>
+              <p:cNvPr id="25" name="Oval 106"/>
+              <p:cNvSpPr>
+                <a:spLocks noChangeArrowheads="1"/>
+              </p:cNvSpPr>
+              <p:nvPr/>
+            </p:nvSpPr>
+            <p:spPr bwMode="auto">
+              <a:xfrm>
+                <a:off x="2023057" y="5427842"/>
+                <a:ext cx="914400" cy="914400"/>
+              </a:xfrm>
+              <a:prstGeom prst="ellipse">
+                <a:avLst/>
+              </a:prstGeom>
+              <a:noFill/>
+              <a:ln w="19050">
+                <a:solidFill>
+                  <a:schemeClr val="bg1"/>
+                </a:solidFill>
+                <a:round/>
+                <a:headEnd/>
+                <a:tailEnd/>
+              </a:ln>
+              <a:extLst>
+                <a:ext uri="{909E8E84-426E-40dd-AFC4-6F175D3DCCD1}">
+                  <a14:hiddenFill xmlns:a14="http://schemas.microsoft.com/office/drawing/2010/main">
+                    <a:solidFill>
+                      <a:srgbClr val="FFFFFF"/>
+                    </a:solidFill>
+                  </a14:hiddenFill>
+                </a:ext>
+              </a:extLst>
+            </p:spPr>
+            <p:txBody>
+              <a:bodyPr lIns="0" tIns="0" rIns="0" bIns="0" anchor="ctr"/>
+              <a:lstStyle/>
+              <a:p>
+                <a:pPr algn="ctr" defTabSz="3657600"/>
+                <a:r>
+                  <a:rPr lang="en-US" sz="1200" dirty="0" smtClean="0">
+                    <a:solidFill>
+                      <a:srgbClr val="FEFEFE"/>
+                    </a:solidFill>
+                  </a:rPr>
+                  <a:t>AD</a:t>
+                </a:r>
+                <a:endParaRPr lang="en-US" sz="1200" baseline="-25000" dirty="0">
+                  <a:solidFill>
+                    <a:srgbClr val="FEFEFE"/>
+                  </a:solidFill>
+                </a:endParaRPr>
+              </a:p>
+            </p:txBody>
+          </p:sp>
+          <p:cxnSp>
+            <p:nvCxnSpPr>
+              <p:cNvPr id="26" name="Straight Arrow Connector 107"/>
+              <p:cNvCxnSpPr>
+                <a:cxnSpLocks noChangeShapeType="1"/>
+                <a:stCxn id="24" idx="6"/>
+                <a:endCxn id="25" idx="2"/>
+              </p:cNvCxnSpPr>
+              <p:nvPr/>
+            </p:nvCxnSpPr>
+            <p:spPr bwMode="auto">
+              <a:xfrm>
+                <a:off x="1108657" y="5885042"/>
+                <a:ext cx="914400" cy="0"/>
+              </a:xfrm>
+              <a:prstGeom prst="straightConnector1">
+                <a:avLst/>
+              </a:prstGeom>
+              <a:noFill/>
+              <a:ln w="19050">
+                <a:solidFill>
+                  <a:schemeClr val="bg1"/>
+                </a:solidFill>
+                <a:round/>
+                <a:headEnd/>
+                <a:tailEnd type="arrow" w="med" len="med"/>
+              </a:ln>
+              <a:extLst>
+                <a:ext uri="{909E8E84-426E-40dd-AFC4-6F175D3DCCD1}">
+                  <a14:hiddenFill xmlns:a14="http://schemas.microsoft.com/office/drawing/2010/main">
+                    <a:noFill/>
+                  </a14:hiddenFill>
+                </a:ext>
+              </a:extLst>
+            </p:spPr>
+          </p:cxnSp>
+          <p:sp>
+            <p:nvSpPr>
+              <p:cNvPr id="27" name="Oval 108"/>
+              <p:cNvSpPr>
+                <a:spLocks noChangeArrowheads="1"/>
+              </p:cNvSpPr>
+              <p:nvPr/>
+            </p:nvSpPr>
+            <p:spPr bwMode="auto">
+              <a:xfrm>
+                <a:off x="3756349" y="5427842"/>
+                <a:ext cx="1009911" cy="914400"/>
+              </a:xfrm>
+              <a:prstGeom prst="ellipse">
+                <a:avLst/>
+              </a:prstGeom>
+              <a:noFill/>
+              <a:ln w="38100" cmpd="sng">
+                <a:solidFill>
+                  <a:schemeClr val="bg1"/>
+                </a:solidFill>
+                <a:round/>
+                <a:headEnd/>
+                <a:tailEnd/>
+              </a:ln>
+              <a:extLst>
+                <a:ext uri="{909E8E84-426E-40dd-AFC4-6F175D3DCCD1}">
+                  <a14:hiddenFill xmlns:a14="http://schemas.microsoft.com/office/drawing/2010/main">
+                    <a:solidFill>
+                      <a:srgbClr val="FFFFFF"/>
+                    </a:solidFill>
+                  </a14:hiddenFill>
+                </a:ext>
+              </a:extLst>
+            </p:spPr>
+            <p:txBody>
+              <a:bodyPr lIns="0" tIns="0" rIns="0" bIns="0" anchor="ctr"/>
+              <a:lstStyle/>
+              <a:p>
+                <a:pPr algn="ctr" defTabSz="3657600"/>
+                <a:r>
+                  <a:rPr lang="en-US" sz="1200" b="1" dirty="0" smtClean="0">
+                    <a:solidFill>
+                      <a:srgbClr val="FEFEFE"/>
+                    </a:solidFill>
+                  </a:rPr>
+                  <a:t>SID</a:t>
+                </a:r>
+                <a:endParaRPr lang="en-US" sz="1200" b="1" baseline="-25000" dirty="0">
+                  <a:solidFill>
+                    <a:srgbClr val="FEFEFE"/>
+                  </a:solidFill>
+                </a:endParaRPr>
+              </a:p>
+            </p:txBody>
+          </p:sp>
+          <p:cxnSp>
+            <p:nvCxnSpPr>
+              <p:cNvPr id="28" name="Straight Arrow Connector 109"/>
+              <p:cNvCxnSpPr>
+                <a:cxnSpLocks noChangeShapeType="1"/>
+                <a:stCxn id="25" idx="6"/>
+                <a:endCxn id="27" idx="2"/>
+              </p:cNvCxnSpPr>
+              <p:nvPr/>
+            </p:nvCxnSpPr>
+            <p:spPr bwMode="auto">
+              <a:xfrm>
+                <a:off x="2937459" y="5885044"/>
+                <a:ext cx="818890" cy="0"/>
+              </a:xfrm>
+              <a:prstGeom prst="straightConnector1">
+                <a:avLst/>
+              </a:prstGeom>
+              <a:noFill/>
+              <a:ln w="19050">
+                <a:solidFill>
+                  <a:schemeClr val="bg1"/>
+                </a:solidFill>
+                <a:round/>
+                <a:headEnd/>
+                <a:tailEnd type="arrow" w="med" len="med"/>
+              </a:ln>
+              <a:extLst>
+                <a:ext uri="{909E8E84-426E-40dd-AFC4-6F175D3DCCD1}">
+                  <a14:hiddenFill xmlns:a14="http://schemas.microsoft.com/office/drawing/2010/main">
+                    <a:noFill/>
+                  </a14:hiddenFill>
+                </a:ext>
+              </a:extLst>
+            </p:spPr>
+          </p:cxnSp>
+        </p:grpSp>
+        <p:sp>
+          <p:nvSpPr>
+            <p:cNvPr id="29" name="Rectangle 28"/>
+            <p:cNvSpPr/>
+            <p:nvPr/>
+          </p:nvSpPr>
+          <p:spPr>
+            <a:xfrm>
+              <a:off x="5372865" y="3724905"/>
+              <a:ext cx="2061878" cy="483674"/>
+            </a:xfrm>
+            <a:prstGeom prst="rect">
+              <a:avLst/>
+            </a:prstGeom>
+            <a:ln/>
+          </p:spPr>
+          <p:style>
+            <a:lnRef idx="2">
+              <a:schemeClr val="accent1">
+                <a:shade val="50000"/>
+              </a:schemeClr>
+            </a:lnRef>
+            <a:fillRef idx="1">
+              <a:schemeClr val="accent1"/>
+            </a:fillRef>
+            <a:effectRef idx="0">
+              <a:schemeClr val="accent1"/>
+            </a:effectRef>
+            <a:fontRef idx="minor">
+              <a:schemeClr val="lt1"/>
+            </a:fontRef>
+          </p:style>
+          <p:txBody>
+            <a:bodyPr rtlCol="0" anchor="ctr"/>
+            <a:lstStyle/>
+            <a:p>
+              <a:pPr algn="ctr"/>
+              <a:r>
+                <a:rPr lang="en-US" sz="1400" dirty="0" smtClean="0">
+                  <a:latin typeface="Myriad Pro"/>
+                  <a:cs typeface="Myriad Pro"/>
+                </a:rPr>
+                <a:t>…</a:t>
+              </a:r>
+              <a:endParaRPr lang="en-US" sz="1400" dirty="0">
+                <a:latin typeface="Myriad Pro"/>
+                <a:cs typeface="Myriad Pro"/>
+              </a:endParaRPr>
+            </a:p>
+          </p:txBody>
+        </p:sp>
+        <p:sp>
+          <p:nvSpPr>
+            <p:cNvPr id="39" name="Title 1"/>
+            <p:cNvSpPr txBox="1">
+              <a:spLocks/>
+            </p:cNvSpPr>
+            <p:nvPr/>
+          </p:nvSpPr>
+          <p:spPr>
+            <a:xfrm>
+              <a:off x="3392507" y="2869401"/>
+              <a:ext cx="1980356" cy="1143000"/>
+            </a:xfrm>
+            <a:prstGeom prst="rect">
+              <a:avLst/>
+            </a:prstGeom>
+          </p:spPr>
+          <p:txBody>
+            <a:bodyPr vert="horz" lIns="91440" tIns="45720" rIns="91440" bIns="45720" rtlCol="0" anchor="ctr">
+              <a:normAutofit/>
+            </a:bodyPr>
+            <a:lstStyle>
+              <a:lvl1pPr algn="ctr" defTabSz="457200" rtl="0" eaLnBrk="1" latinLnBrk="0" hangingPunct="1">
+                <a:spcBef>
+                  <a:spcPct val="0"/>
+                </a:spcBef>
+                <a:buNone/>
+                <a:defRPr sz="4800" kern="1200">
+                  <a:solidFill>
+                    <a:schemeClr val="tx1"/>
+                  </a:solidFill>
+                  <a:latin typeface="Myriad Pro"/>
+                  <a:ea typeface="+mj-ea"/>
+                  <a:cs typeface="Myriad Pro"/>
+                </a:defRPr>
+              </a:lvl1pPr>
+            </a:lstStyle>
+            <a:p>
+              <a:r>
+                <a:rPr lang="en-US" dirty="0" smtClean="0">
+                  <a:latin typeface="Wingdings"/>
+                  <a:ea typeface="Wingdings"/>
+                  <a:cs typeface="Wingdings"/>
+                  <a:sym typeface="Wingdings"/>
+                </a:rPr>
+                <a:t></a:t>
+              </a:r>
+              <a:endParaRPr lang="en-US" dirty="0"/>
+            </a:p>
+          </p:txBody>
+        </p:sp>
+      </p:grpSp>
     </p:spTree>
     <p:extLst>
       <p:ext uri="{BB962C8B-B14F-4D97-AF65-F5344CB8AC3E}">
@@ -16289,6 +18625,13 @@
   <p:clrMapOvr>
     <a:masterClrMapping/>
   </p:clrMapOvr>
+  <p:timing>
+    <p:tnLst>
+      <p:par>
+        <p:cTn xmlns:p14="http://schemas.microsoft.com/office/powerpoint/2010/main" id="1" dur="indefinite" restart="never" nodeType="tmRoot"/>
+      </p:par>
+    </p:tnLst>
+  </p:timing>
 </p:sld>
 </file>
 
@@ -16326,7 +18669,7 @@
           <a:p>
             <a:r>
               <a:rPr lang="en-US" dirty="0" smtClean="0"/>
-              <a:t>Socket API Extension</a:t>
+              <a:t>Control and Transparency</a:t>
             </a:r>
             <a:endParaRPr lang="en-US" dirty="0"/>
           </a:p>
@@ -16349,22 +18692,73 @@
           <a:p>
             <a:r>
               <a:rPr lang="en-US" dirty="0" smtClean="0"/>
-              <a:t>For developers</a:t>
+              <a:t>Global Controls</a:t>
+            </a:r>
+          </a:p>
+          <a:p>
+            <a:pPr lvl="1"/>
+            <a:r>
+              <a:rPr lang="en-US" dirty="0" smtClean="0"/>
+              <a:t>Control anonymity</a:t>
+            </a:r>
+          </a:p>
+          <a:p>
+            <a:pPr lvl="1"/>
+            <a:r>
+              <a:rPr lang="en-US" dirty="0" smtClean="0"/>
+              <a:t>Settings at the OS level</a:t>
             </a:r>
             <a:endParaRPr lang="en-US" dirty="0"/>
           </a:p>
         </p:txBody>
       </p:sp>
+      <p:pic>
+        <p:nvPicPr>
+          <p:cNvPr id="4" name="Picture 3" descr="Screen Shot 2011-12-07 at 9.22.28 PM.png"/>
+          <p:cNvPicPr>
+            <a:picLocks noChangeAspect="1"/>
+          </p:cNvPicPr>
+          <p:nvPr/>
+        </p:nvPicPr>
+        <p:blipFill>
+          <a:blip r:embed="rId3">
+            <a:extLst>
+              <a:ext uri="{28A0092B-C50C-407E-A947-70E740481C1C}">
+                <a14:useLocalDpi xmlns:a14="http://schemas.microsoft.com/office/drawing/2010/main" val="0"/>
+              </a:ext>
+            </a:extLst>
+          </a:blip>
+          <a:stretch>
+            <a:fillRect/>
+          </a:stretch>
+        </p:blipFill>
+        <p:spPr>
+          <a:xfrm>
+            <a:off x="4236284" y="1417638"/>
+            <a:ext cx="3384524" cy="5145084"/>
+          </a:xfrm>
+          <a:prstGeom prst="rect">
+            <a:avLst/>
+          </a:prstGeom>
+        </p:spPr>
+      </p:pic>
     </p:spTree>
     <p:extLst>
       <p:ext uri="{BB962C8B-B14F-4D97-AF65-F5344CB8AC3E}">
-        <p14:creationId xmlns:p14="http://schemas.microsoft.com/office/powerpoint/2010/main" val="162243270"/>
+        <p14:creationId xmlns:p14="http://schemas.microsoft.com/office/powerpoint/2010/main" val="1201774173"/>
       </p:ext>
     </p:extLst>
   </p:cSld>
   <p:clrMapOvr>
     <a:masterClrMapping/>
   </p:clrMapOvr>
+  <p:timing>
+    <p:tnLst>
+      <p:par>
+        <p:cTn xmlns:p14="http://schemas.microsoft.com/office/powerpoint/2010/main" id="1" dur="indefinite" restart="never" nodeType="tmRoot"/>
+      </p:par>
+    </p:tnLst>
+  </p:timing>
 </p:sld>
 </file>
 
@@ -16686,4 +19080,324 @@
   </a:objectDefaults>
   <a:extraClrSchemeLst/>
 </a:theme>
+</file>
+
+<file path=ppt/theme/theme2.xml><?xml version="1.0" encoding="utf-8"?>
+<a:theme xmlns:a="http://schemas.openxmlformats.org/drawingml/2006/main" name="Office Theme">
+  <a:themeElements>
+    <a:clrScheme name="Office">
+      <a:dk1>
+        <a:sysClr val="windowText" lastClr="000000"/>
+      </a:dk1>
+      <a:lt1>
+        <a:sysClr val="window" lastClr="FFFFFF"/>
+      </a:lt1>
+      <a:dk2>
+        <a:srgbClr val="1F497D"/>
+      </a:dk2>
+      <a:lt2>
+        <a:srgbClr val="EEECE1"/>
+      </a:lt2>
+      <a:accent1>
+        <a:srgbClr val="4F81BD"/>
+      </a:accent1>
+      <a:accent2>
+        <a:srgbClr val="C0504D"/>
+      </a:accent2>
+      <a:accent3>
+        <a:srgbClr val="9BBB59"/>
+      </a:accent3>
+      <a:accent4>
+        <a:srgbClr val="8064A2"/>
+      </a:accent4>
+      <a:accent5>
+        <a:srgbClr val="4BACC6"/>
+      </a:accent5>
+      <a:accent6>
+        <a:srgbClr val="F79646"/>
+      </a:accent6>
+      <a:hlink>
+        <a:srgbClr val="0000FF"/>
+      </a:hlink>
+      <a:folHlink>
+        <a:srgbClr val="800080"/>
+      </a:folHlink>
+    </a:clrScheme>
+    <a:fontScheme name="Office">
+      <a:majorFont>
+        <a:latin typeface="Calibri"/>
+        <a:ea typeface=""/>
+        <a:cs typeface=""/>
+        <a:font script="Jpan" typeface="ＭＳ Ｐゴシック"/>
+        <a:font script="Hang" typeface="맑은 고딕"/>
+        <a:font script="Hans" typeface="宋体"/>
+        <a:font script="Hant" typeface="新細明體"/>
+        <a:font script="Arab" typeface="Times New Roman"/>
+        <a:font script="Hebr" typeface="Times New Roman"/>
+        <a:font script="Thai" typeface="Angsana New"/>
+        <a:font script="Ethi" typeface="Nyala"/>
+        <a:font script="Beng" typeface="Vrinda"/>
+        <a:font script="Gujr" typeface="Shruti"/>
+        <a:font script="Khmr" typeface="MoolBoran"/>
+        <a:font script="Knda" typeface="Tunga"/>
+        <a:font script="Guru" typeface="Raavi"/>
+        <a:font script="Cans" typeface="Euphemia"/>
+        <a:font script="Cher" typeface="Plantagenet Cherokee"/>
+        <a:font script="Yiii" typeface="Microsoft Yi Baiti"/>
+        <a:font script="Tibt" typeface="Microsoft Himalaya"/>
+        <a:font script="Thaa" typeface="MV Boli"/>
+        <a:font script="Deva" typeface="Mangal"/>
+        <a:font script="Telu" typeface="Gautami"/>
+        <a:font script="Taml" typeface="Latha"/>
+        <a:font script="Syrc" typeface="Estrangelo Edessa"/>
+        <a:font script="Orya" typeface="Kalinga"/>
+        <a:font script="Mlym" typeface="Kartika"/>
+        <a:font script="Laoo" typeface="DokChampa"/>
+        <a:font script="Sinh" typeface="Iskoola Pota"/>
+        <a:font script="Mong" typeface="Mongolian Baiti"/>
+        <a:font script="Viet" typeface="Times New Roman"/>
+        <a:font script="Uigh" typeface="Microsoft Uighur"/>
+        <a:font script="Geor" typeface="Sylfaen"/>
+      </a:majorFont>
+      <a:minorFont>
+        <a:latin typeface="Calibri"/>
+        <a:ea typeface=""/>
+        <a:cs typeface=""/>
+        <a:font script="Jpan" typeface="ＭＳ Ｐゴシック"/>
+        <a:font script="Hang" typeface="맑은 고딕"/>
+        <a:font script="Hans" typeface="宋体"/>
+        <a:font script="Hant" typeface="新細明體"/>
+        <a:font script="Arab" typeface="Arial"/>
+        <a:font script="Hebr" typeface="Arial"/>
+        <a:font script="Thai" typeface="Cordia New"/>
+        <a:font script="Ethi" typeface="Nyala"/>
+        <a:font script="Beng" typeface="Vrinda"/>
+        <a:font script="Gujr" typeface="Shruti"/>
+        <a:font script="Khmr" typeface="DaunPenh"/>
+        <a:font script="Knda" typeface="Tunga"/>
+        <a:font script="Guru" typeface="Raavi"/>
+        <a:font script="Cans" typeface="Euphemia"/>
+        <a:font script="Cher" typeface="Plantagenet Cherokee"/>
+        <a:font script="Yiii" typeface="Microsoft Yi Baiti"/>
+        <a:font script="Tibt" typeface="Microsoft Himalaya"/>
+        <a:font script="Thaa" typeface="MV Boli"/>
+        <a:font script="Deva" typeface="Mangal"/>
+        <a:font script="Telu" typeface="Gautami"/>
+        <a:font script="Taml" typeface="Latha"/>
+        <a:font script="Syrc" typeface="Estrangelo Edessa"/>
+        <a:font script="Orya" typeface="Kalinga"/>
+        <a:font script="Mlym" typeface="Kartika"/>
+        <a:font script="Laoo" typeface="DokChampa"/>
+        <a:font script="Sinh" typeface="Iskoola Pota"/>
+        <a:font script="Mong" typeface="Mongolian Baiti"/>
+        <a:font script="Viet" typeface="Arial"/>
+        <a:font script="Uigh" typeface="Microsoft Uighur"/>
+        <a:font script="Geor" typeface="Sylfaen"/>
+      </a:minorFont>
+    </a:fontScheme>
+    <a:fmtScheme name="Office">
+      <a:fillStyleLst>
+        <a:solidFill>
+          <a:schemeClr val="phClr"/>
+        </a:solidFill>
+        <a:gradFill rotWithShape="1">
+          <a:gsLst>
+            <a:gs pos="0">
+              <a:schemeClr val="phClr">
+                <a:tint val="50000"/>
+                <a:satMod val="300000"/>
+              </a:schemeClr>
+            </a:gs>
+            <a:gs pos="35000">
+              <a:schemeClr val="phClr">
+                <a:tint val="37000"/>
+                <a:satMod val="300000"/>
+              </a:schemeClr>
+            </a:gs>
+            <a:gs pos="100000">
+              <a:schemeClr val="phClr">
+                <a:tint val="15000"/>
+                <a:satMod val="350000"/>
+              </a:schemeClr>
+            </a:gs>
+          </a:gsLst>
+          <a:lin ang="16200000" scaled="1"/>
+        </a:gradFill>
+        <a:gradFill rotWithShape="1">
+          <a:gsLst>
+            <a:gs pos="0">
+              <a:schemeClr val="phClr">
+                <a:tint val="100000"/>
+                <a:shade val="100000"/>
+                <a:satMod val="130000"/>
+              </a:schemeClr>
+            </a:gs>
+            <a:gs pos="100000">
+              <a:schemeClr val="phClr">
+                <a:tint val="50000"/>
+                <a:shade val="100000"/>
+                <a:satMod val="350000"/>
+              </a:schemeClr>
+            </a:gs>
+          </a:gsLst>
+          <a:lin ang="16200000" scaled="0"/>
+        </a:gradFill>
+      </a:fillStyleLst>
+      <a:lnStyleLst>
+        <a:ln w="9525" cap="flat" cmpd="sng" algn="ctr">
+          <a:solidFill>
+            <a:schemeClr val="phClr">
+              <a:shade val="95000"/>
+              <a:satMod val="105000"/>
+            </a:schemeClr>
+          </a:solidFill>
+          <a:prstDash val="solid"/>
+        </a:ln>
+        <a:ln w="25400" cap="flat" cmpd="sng" algn="ctr">
+          <a:solidFill>
+            <a:schemeClr val="phClr"/>
+          </a:solidFill>
+          <a:prstDash val="solid"/>
+        </a:ln>
+        <a:ln w="38100" cap="flat" cmpd="sng" algn="ctr">
+          <a:solidFill>
+            <a:schemeClr val="phClr"/>
+          </a:solidFill>
+          <a:prstDash val="solid"/>
+        </a:ln>
+      </a:lnStyleLst>
+      <a:effectStyleLst>
+        <a:effectStyle>
+          <a:effectLst>
+            <a:outerShdw blurRad="40000" dist="20000" dir="5400000" rotWithShape="0">
+              <a:srgbClr val="000000">
+                <a:alpha val="38000"/>
+              </a:srgbClr>
+            </a:outerShdw>
+          </a:effectLst>
+        </a:effectStyle>
+        <a:effectStyle>
+          <a:effectLst>
+            <a:outerShdw blurRad="40000" dist="23000" dir="5400000" rotWithShape="0">
+              <a:srgbClr val="000000">
+                <a:alpha val="35000"/>
+              </a:srgbClr>
+            </a:outerShdw>
+          </a:effectLst>
+        </a:effectStyle>
+        <a:effectStyle>
+          <a:effectLst>
+            <a:outerShdw blurRad="40000" dist="23000" dir="5400000" rotWithShape="0">
+              <a:srgbClr val="000000">
+                <a:alpha val="35000"/>
+              </a:srgbClr>
+            </a:outerShdw>
+          </a:effectLst>
+          <a:scene3d>
+            <a:camera prst="orthographicFront">
+              <a:rot lat="0" lon="0" rev="0"/>
+            </a:camera>
+            <a:lightRig rig="threePt" dir="t">
+              <a:rot lat="0" lon="0" rev="1200000"/>
+            </a:lightRig>
+          </a:scene3d>
+          <a:sp3d>
+            <a:bevelT w="63500" h="25400"/>
+          </a:sp3d>
+        </a:effectStyle>
+      </a:effectStyleLst>
+      <a:bgFillStyleLst>
+        <a:solidFill>
+          <a:schemeClr val="phClr"/>
+        </a:solidFill>
+        <a:gradFill rotWithShape="1">
+          <a:gsLst>
+            <a:gs pos="0">
+              <a:schemeClr val="phClr">
+                <a:tint val="40000"/>
+                <a:satMod val="350000"/>
+              </a:schemeClr>
+            </a:gs>
+            <a:gs pos="40000">
+              <a:schemeClr val="phClr">
+                <a:tint val="45000"/>
+                <a:shade val="99000"/>
+                <a:satMod val="350000"/>
+              </a:schemeClr>
+            </a:gs>
+            <a:gs pos="100000">
+              <a:schemeClr val="phClr">
+                <a:shade val="20000"/>
+                <a:satMod val="255000"/>
+              </a:schemeClr>
+            </a:gs>
+          </a:gsLst>
+          <a:path path="circle">
+            <a:fillToRect l="50000" t="-80000" r="50000" b="180000"/>
+          </a:path>
+        </a:gradFill>
+        <a:gradFill rotWithShape="1">
+          <a:gsLst>
+            <a:gs pos="0">
+              <a:schemeClr val="phClr">
+                <a:tint val="80000"/>
+                <a:satMod val="300000"/>
+              </a:schemeClr>
+            </a:gs>
+            <a:gs pos="100000">
+              <a:schemeClr val="phClr">
+                <a:shade val="30000"/>
+                <a:satMod val="200000"/>
+              </a:schemeClr>
+            </a:gs>
+          </a:gsLst>
+          <a:path path="circle">
+            <a:fillToRect l="50000" t="50000" r="50000" b="50000"/>
+          </a:path>
+        </a:gradFill>
+      </a:bgFillStyleLst>
+    </a:fmtScheme>
+  </a:themeElements>
+  <a:objectDefaults>
+    <a:spDef>
+      <a:spPr/>
+      <a:bodyPr/>
+      <a:lstStyle/>
+      <a:style>
+        <a:lnRef idx="1">
+          <a:schemeClr val="accent1"/>
+        </a:lnRef>
+        <a:fillRef idx="3">
+          <a:schemeClr val="accent1"/>
+        </a:fillRef>
+        <a:effectRef idx="2">
+          <a:schemeClr val="accent1"/>
+        </a:effectRef>
+        <a:fontRef idx="minor">
+          <a:schemeClr val="lt1"/>
+        </a:fontRef>
+      </a:style>
+    </a:spDef>
+    <a:lnDef>
+      <a:spPr/>
+      <a:bodyPr/>
+      <a:lstStyle/>
+      <a:style>
+        <a:lnRef idx="2">
+          <a:schemeClr val="accent1"/>
+        </a:lnRef>
+        <a:fillRef idx="0">
+          <a:schemeClr val="accent1"/>
+        </a:fillRef>
+        <a:effectRef idx="1">
+          <a:schemeClr val="accent1"/>
+        </a:effectRef>
+        <a:fontRef idx="minor">
+          <a:schemeClr val="tx1"/>
+        </a:fontRef>
+      </a:style>
+    </a:lnDef>
+  </a:objectDefaults>
+  <a:extraClrSchemeLst/>
+</a:theme>
 </file>
</xml_diff>